<commit_message>
Fixed a bug in the constraint code. Added all search space testing graphs to the presentation.
</commit_message>
<xml_diff>
--- a/CSE848_Hormasji_Reiff_ProjectPresentation.pptx
+++ b/CSE848_Hormasji_Reiff_ProjectPresentation.pptx
@@ -5,7 +5,7 @@
     <p:sldMasterId id="2147483648" r:id="rId1"/>
   </p:sldMasterIdLst>
   <p:notesMasterIdLst>
-    <p:notesMasterId r:id="rId33"/>
+    <p:notesMasterId r:id="rId34"/>
   </p:notesMasterIdLst>
   <p:sldIdLst>
     <p:sldId id="264" r:id="rId2"/>
@@ -32,13 +32,14 @@
     <p:sldId id="304" r:id="rId23"/>
     <p:sldId id="303" r:id="rId24"/>
     <p:sldId id="302" r:id="rId25"/>
-    <p:sldId id="301" r:id="rId26"/>
-    <p:sldId id="281" r:id="rId27"/>
-    <p:sldId id="308" r:id="rId28"/>
-    <p:sldId id="282" r:id="rId29"/>
-    <p:sldId id="284" r:id="rId30"/>
-    <p:sldId id="285" r:id="rId31"/>
-    <p:sldId id="286" r:id="rId32"/>
+    <p:sldId id="309" r:id="rId26"/>
+    <p:sldId id="301" r:id="rId27"/>
+    <p:sldId id="281" r:id="rId28"/>
+    <p:sldId id="308" r:id="rId29"/>
+    <p:sldId id="282" r:id="rId30"/>
+    <p:sldId id="284" r:id="rId31"/>
+    <p:sldId id="285" r:id="rId32"/>
+    <p:sldId id="286" r:id="rId33"/>
   </p:sldIdLst>
   <p:sldSz cx="9144000" cy="6858000" type="screen4x3"/>
   <p:notesSz cx="6858000" cy="9144000"/>
@@ -2859,6 +2860,31 @@
               </a:spcBef>
               <a:buNone/>
             </a:pPr>
+            <a:r>
+              <a:rPr lang="en" dirty="0" smtClean="0"/>
+              <a:t>TODO Here: Graphs of the evolution</a:t>
+            </a:r>
+            <a:r>
+              <a:rPr lang="en" baseline="0" dirty="0" smtClean="0"/>
+              <a:t> of the Pareto front for each of the individual objectives</a:t>
+            </a:r>
+            <a:endParaRPr lang="en" dirty="0" smtClean="0"/>
+          </a:p>
+          <a:p>
+            <a:pPr rtl="0">
+              <a:spcBef>
+                <a:spcPts val="0"/>
+              </a:spcBef>
+              <a:buNone/>
+            </a:pPr>
+            <a:r>
+              <a:rPr lang="en" dirty="0" smtClean="0"/>
+              <a:t>Motivation:</a:t>
+            </a:r>
+            <a:r>
+              <a:rPr lang="en" baseline="0" dirty="0" smtClean="0"/>
+              <a:t> Pareto front graphs did not appear correct for a maximization problem</a:t>
+            </a:r>
             <a:endParaRPr lang="en" dirty="0"/>
           </a:p>
         </p:txBody>
@@ -2866,7 +2892,7 @@
     </p:spTree>
     <p:extLst>
       <p:ext uri="{BB962C8B-B14F-4D97-AF65-F5344CB8AC3E}">
-        <p14:creationId xmlns:p14="http://schemas.microsoft.com/office/powerpoint/2010/main" val="2663739280"/>
+        <p14:creationId xmlns:p14="http://schemas.microsoft.com/office/powerpoint/2010/main" val="843987080"/>
       </p:ext>
     </p:extLst>
   </p:cSld>
@@ -2881,7 +2907,7 @@
   <p:cSld>
     <p:spTree>
       <p:nvGrpSpPr>
-        <p:cNvPr id="1" name="Shape 164"/>
+        <p:cNvPr id="1" name="Shape 158"/>
         <p:cNvGrpSpPr/>
         <p:nvPr/>
       </p:nvGrpSpPr>
@@ -2895,7 +2921,7 @@
       </p:grpSpPr>
       <p:sp>
         <p:nvSpPr>
-          <p:cNvPr id="165" name="Shape 165"/>
+          <p:cNvPr id="159" name="Shape 159"/>
           <p:cNvSpPr>
             <a:spLocks noGrp="1" noRot="1" noChangeAspect="1"/>
           </p:cNvSpPr>
@@ -2946,7 +2972,7 @@
       </p:sp>
       <p:sp>
         <p:nvSpPr>
-          <p:cNvPr id="166" name="Shape 166"/>
+          <p:cNvPr id="160" name="Shape 160"/>
           <p:cNvSpPr txBox="1">
             <a:spLocks noGrp="1"/>
           </p:cNvSpPr>
@@ -2982,7 +3008,7 @@
     </p:spTree>
     <p:extLst>
       <p:ext uri="{BB962C8B-B14F-4D97-AF65-F5344CB8AC3E}">
-        <p14:creationId xmlns:p14="http://schemas.microsoft.com/office/powerpoint/2010/main" val="2876005320"/>
+        <p14:creationId xmlns:p14="http://schemas.microsoft.com/office/powerpoint/2010/main" val="2663739280"/>
       </p:ext>
     </p:extLst>
   </p:cSld>
@@ -3098,6 +3124,122 @@
     </p:spTree>
     <p:extLst>
       <p:ext uri="{BB962C8B-B14F-4D97-AF65-F5344CB8AC3E}">
+        <p14:creationId xmlns:p14="http://schemas.microsoft.com/office/powerpoint/2010/main" val="2876005320"/>
+      </p:ext>
+    </p:extLst>
+  </p:cSld>
+  <p:clrMapOvr>
+    <a:masterClrMapping/>
+  </p:clrMapOvr>
+</p:notes>
+</file>
+
+<file path=ppt/notesSlides/notesSlide28.xml><?xml version="1.0" encoding="utf-8"?>
+<p:notes xmlns:a="http://schemas.openxmlformats.org/drawingml/2006/main" xmlns:r="http://schemas.openxmlformats.org/officeDocument/2006/relationships" xmlns:p="http://schemas.openxmlformats.org/presentationml/2006/main" showMasterSp="0" showMasterPhAnim="0">
+  <p:cSld>
+    <p:spTree>
+      <p:nvGrpSpPr>
+        <p:cNvPr id="1" name="Shape 164"/>
+        <p:cNvGrpSpPr/>
+        <p:nvPr/>
+      </p:nvGrpSpPr>
+      <p:grpSpPr>
+        <a:xfrm>
+          <a:off x="0" y="0"/>
+          <a:ext cx="0" cy="0"/>
+          <a:chOff x="0" y="0"/>
+          <a:chExt cx="0" cy="0"/>
+        </a:xfrm>
+      </p:grpSpPr>
+      <p:sp>
+        <p:nvSpPr>
+          <p:cNvPr id="165" name="Shape 165"/>
+          <p:cNvSpPr>
+            <a:spLocks noGrp="1" noRot="1" noChangeAspect="1"/>
+          </p:cNvSpPr>
+          <p:nvPr>
+            <p:ph type="sldImg" idx="2"/>
+          </p:nvPr>
+        </p:nvSpPr>
+        <p:spPr>
+          <a:xfrm>
+            <a:off x="1143000" y="685800"/>
+            <a:ext cx="4572000" cy="3429000"/>
+          </a:xfrm>
+          <a:custGeom>
+            <a:avLst/>
+            <a:gdLst/>
+            <a:ahLst/>
+            <a:cxnLst/>
+            <a:rect l="0" t="0" r="0" b="0"/>
+            <a:pathLst>
+              <a:path w="120000" h="120000" extrusionOk="0">
+                <a:moveTo>
+                  <a:pt x="0" y="0"/>
+                </a:moveTo>
+                <a:lnTo>
+                  <a:pt x="120000" y="0"/>
+                </a:lnTo>
+                <a:lnTo>
+                  <a:pt x="120000" y="120000"/>
+                </a:lnTo>
+                <a:lnTo>
+                  <a:pt x="0" y="120000"/>
+                </a:lnTo>
+                <a:close/>
+              </a:path>
+            </a:pathLst>
+          </a:custGeom>
+          <a:noFill/>
+          <a:ln w="9525" cap="flat" cmpd="sng">
+            <a:solidFill>
+              <a:srgbClr val="000000"/>
+            </a:solidFill>
+            <a:prstDash val="solid"/>
+            <a:round/>
+            <a:headEnd type="none" w="med" len="med"/>
+            <a:tailEnd type="none" w="med" len="med"/>
+          </a:ln>
+        </p:spPr>
+      </p:sp>
+      <p:sp>
+        <p:nvSpPr>
+          <p:cNvPr id="166" name="Shape 166"/>
+          <p:cNvSpPr txBox="1">
+            <a:spLocks noGrp="1"/>
+          </p:cNvSpPr>
+          <p:nvPr>
+            <p:ph type="body" idx="1"/>
+          </p:nvPr>
+        </p:nvSpPr>
+        <p:spPr>
+          <a:xfrm>
+            <a:off x="685800" y="4343400"/>
+            <a:ext cx="5486399" cy="4114800"/>
+          </a:xfrm>
+          <a:prstGeom prst="rect">
+            <a:avLst/>
+          </a:prstGeom>
+        </p:spPr>
+        <p:txBody>
+          <a:bodyPr lIns="91425" tIns="91425" rIns="91425" bIns="91425" anchor="t" anchorCtr="0">
+            <a:noAutofit/>
+          </a:bodyPr>
+          <a:lstStyle/>
+          <a:p>
+            <a:pPr rtl="0">
+              <a:spcBef>
+                <a:spcPts val="0"/>
+              </a:spcBef>
+              <a:buNone/>
+            </a:pPr>
+            <a:endParaRPr lang="en" dirty="0"/>
+          </a:p>
+        </p:txBody>
+      </p:sp>
+    </p:spTree>
+    <p:extLst>
+      <p:ext uri="{BB962C8B-B14F-4D97-AF65-F5344CB8AC3E}">
         <p14:creationId xmlns:p14="http://schemas.microsoft.com/office/powerpoint/2010/main" val="2011897862"/>
       </p:ext>
     </p:extLst>
@@ -3108,7 +3250,7 @@
 </p:notes>
 </file>
 
-<file path=ppt/notesSlides/notesSlide28.xml><?xml version="1.0" encoding="utf-8"?>
+<file path=ppt/notesSlides/notesSlide29.xml><?xml version="1.0" encoding="utf-8"?>
 <p:notes xmlns:a="http://schemas.openxmlformats.org/drawingml/2006/main" xmlns:r="http://schemas.openxmlformats.org/officeDocument/2006/relationships" xmlns:p="http://schemas.openxmlformats.org/presentationml/2006/main" showMasterSp="0" showMasterPhAnim="0">
   <p:cSld>
     <p:spTree>
@@ -3224,7 +3366,109 @@
 </p:notes>
 </file>
 
-<file path=ppt/notesSlides/notesSlide29.xml><?xml version="1.0" encoding="utf-8"?>
+<file path=ppt/notesSlides/notesSlide3.xml><?xml version="1.0" encoding="utf-8"?>
+<p:notes xmlns:a="http://schemas.openxmlformats.org/drawingml/2006/main" xmlns:r="http://schemas.openxmlformats.org/officeDocument/2006/relationships" xmlns:p="http://schemas.openxmlformats.org/presentationml/2006/main">
+  <p:cSld>
+    <p:spTree>
+      <p:nvGrpSpPr>
+        <p:cNvPr id="1" name=""/>
+        <p:cNvGrpSpPr/>
+        <p:nvPr/>
+      </p:nvGrpSpPr>
+      <p:grpSpPr>
+        <a:xfrm>
+          <a:off x="0" y="0"/>
+          <a:ext cx="0" cy="0"/>
+          <a:chOff x="0" y="0"/>
+          <a:chExt cx="0" cy="0"/>
+        </a:xfrm>
+      </p:grpSpPr>
+      <p:sp>
+        <p:nvSpPr>
+          <p:cNvPr id="2" name="Slide Image Placeholder 1"/>
+          <p:cNvSpPr>
+            <a:spLocks noGrp="1" noRot="1" noChangeAspect="1"/>
+          </p:cNvSpPr>
+          <p:nvPr>
+            <p:ph type="sldImg"/>
+          </p:nvPr>
+        </p:nvSpPr>
+        <p:spPr/>
+      </p:sp>
+      <p:sp>
+        <p:nvSpPr>
+          <p:cNvPr id="3" name="Notes Placeholder 2"/>
+          <p:cNvSpPr>
+            <a:spLocks noGrp="1"/>
+          </p:cNvSpPr>
+          <p:nvPr>
+            <p:ph type="body" idx="1"/>
+          </p:nvPr>
+        </p:nvSpPr>
+        <p:spPr/>
+        <p:txBody>
+          <a:bodyPr/>
+          <a:lstStyle/>
+          <a:p>
+            <a:r>
+              <a:rPr lang="en-US" dirty="0" smtClean="0"/>
+              <a:t>Image source: http://faganasset.com/wp-content/uploads/2015/04/stock-market-3.jpg</a:t>
+            </a:r>
+          </a:p>
+          <a:p>
+            <a:endParaRPr lang="en-US" dirty="0" smtClean="0"/>
+          </a:p>
+          <a:p>
+            <a:r>
+              <a:rPr lang="en-US" dirty="0" smtClean="0"/>
+              <a:t>Problem</a:t>
+            </a:r>
+            <a:r>
+              <a:rPr lang="en-US" baseline="0" dirty="0" smtClean="0"/>
+              <a:t> motivated by previous work in this area done using an outdated Multi-objective Genetic Algorithm (VEGA). Students tasked themselves with implementing the work done in U-NSGA-III, comparing to the results provided in the paper, and improving upon the work by performing more analysis and adding another objective function.</a:t>
+            </a:r>
+            <a:endParaRPr lang="en-US" dirty="0" smtClean="0"/>
+          </a:p>
+        </p:txBody>
+      </p:sp>
+      <p:sp>
+        <p:nvSpPr>
+          <p:cNvPr id="4" name="Slide Number Placeholder 3"/>
+          <p:cNvSpPr>
+            <a:spLocks noGrp="1"/>
+          </p:cNvSpPr>
+          <p:nvPr>
+            <p:ph type="sldNum" sz="quarter" idx="10"/>
+          </p:nvPr>
+        </p:nvSpPr>
+        <p:spPr/>
+        <p:txBody>
+          <a:bodyPr/>
+          <a:lstStyle/>
+          <a:p>
+            <a:fld id="{9A41F1D6-4599-4B85-B113-377F36F3BC98}" type="slidenum">
+              <a:rPr lang="en-US" smtClean="0"/>
+              <a:pPr/>
+              <a:t>3</a:t>
+            </a:fld>
+            <a:endParaRPr lang="en-US"/>
+          </a:p>
+        </p:txBody>
+      </p:sp>
+    </p:spTree>
+    <p:extLst>
+      <p:ext uri="{BB962C8B-B14F-4D97-AF65-F5344CB8AC3E}">
+        <p14:creationId xmlns:p14="http://schemas.microsoft.com/office/powerpoint/2010/main" val="1334582004"/>
+      </p:ext>
+    </p:extLst>
+  </p:cSld>
+  <p:clrMapOvr>
+    <a:masterClrMapping/>
+  </p:clrMapOvr>
+</p:notes>
+</file>
+
+<file path=ppt/notesSlides/notesSlide30.xml><?xml version="1.0" encoding="utf-8"?>
 <p:notes xmlns:a="http://schemas.openxmlformats.org/drawingml/2006/main" xmlns:r="http://schemas.openxmlformats.org/officeDocument/2006/relationships" xmlns:p="http://schemas.openxmlformats.org/presentationml/2006/main" showMasterSp="0" showMasterPhAnim="0">
   <p:cSld>
     <p:spTree>
@@ -3340,109 +3584,7 @@
 </p:notes>
 </file>
 
-<file path=ppt/notesSlides/notesSlide3.xml><?xml version="1.0" encoding="utf-8"?>
-<p:notes xmlns:a="http://schemas.openxmlformats.org/drawingml/2006/main" xmlns:r="http://schemas.openxmlformats.org/officeDocument/2006/relationships" xmlns:p="http://schemas.openxmlformats.org/presentationml/2006/main">
-  <p:cSld>
-    <p:spTree>
-      <p:nvGrpSpPr>
-        <p:cNvPr id="1" name=""/>
-        <p:cNvGrpSpPr/>
-        <p:nvPr/>
-      </p:nvGrpSpPr>
-      <p:grpSpPr>
-        <a:xfrm>
-          <a:off x="0" y="0"/>
-          <a:ext cx="0" cy="0"/>
-          <a:chOff x="0" y="0"/>
-          <a:chExt cx="0" cy="0"/>
-        </a:xfrm>
-      </p:grpSpPr>
-      <p:sp>
-        <p:nvSpPr>
-          <p:cNvPr id="2" name="Slide Image Placeholder 1"/>
-          <p:cNvSpPr>
-            <a:spLocks noGrp="1" noRot="1" noChangeAspect="1"/>
-          </p:cNvSpPr>
-          <p:nvPr>
-            <p:ph type="sldImg"/>
-          </p:nvPr>
-        </p:nvSpPr>
-        <p:spPr/>
-      </p:sp>
-      <p:sp>
-        <p:nvSpPr>
-          <p:cNvPr id="3" name="Notes Placeholder 2"/>
-          <p:cNvSpPr>
-            <a:spLocks noGrp="1"/>
-          </p:cNvSpPr>
-          <p:nvPr>
-            <p:ph type="body" idx="1"/>
-          </p:nvPr>
-        </p:nvSpPr>
-        <p:spPr/>
-        <p:txBody>
-          <a:bodyPr/>
-          <a:lstStyle/>
-          <a:p>
-            <a:r>
-              <a:rPr lang="en-US" dirty="0" smtClean="0"/>
-              <a:t>Image source: http://faganasset.com/wp-content/uploads/2015/04/stock-market-3.jpg</a:t>
-            </a:r>
-          </a:p>
-          <a:p>
-            <a:endParaRPr lang="en-US" dirty="0" smtClean="0"/>
-          </a:p>
-          <a:p>
-            <a:r>
-              <a:rPr lang="en-US" dirty="0" smtClean="0"/>
-              <a:t>Problem</a:t>
-            </a:r>
-            <a:r>
-              <a:rPr lang="en-US" baseline="0" dirty="0" smtClean="0"/>
-              <a:t> motivated by previous work in this area done using an outdated Multi-objective Genetic Algorithm (VEGA). Students tasked themselves with implementing the work done in U-NSGA-III, comparing to the results provided in the paper, and improving upon the work by performing more analysis and adding another objective function.</a:t>
-            </a:r>
-            <a:endParaRPr lang="en-US" dirty="0" smtClean="0"/>
-          </a:p>
-        </p:txBody>
-      </p:sp>
-      <p:sp>
-        <p:nvSpPr>
-          <p:cNvPr id="4" name="Slide Number Placeholder 3"/>
-          <p:cNvSpPr>
-            <a:spLocks noGrp="1"/>
-          </p:cNvSpPr>
-          <p:nvPr>
-            <p:ph type="sldNum" sz="quarter" idx="10"/>
-          </p:nvPr>
-        </p:nvSpPr>
-        <p:spPr/>
-        <p:txBody>
-          <a:bodyPr/>
-          <a:lstStyle/>
-          <a:p>
-            <a:fld id="{9A41F1D6-4599-4B85-B113-377F36F3BC98}" type="slidenum">
-              <a:rPr lang="en-US" smtClean="0"/>
-              <a:pPr/>
-              <a:t>3</a:t>
-            </a:fld>
-            <a:endParaRPr lang="en-US"/>
-          </a:p>
-        </p:txBody>
-      </p:sp>
-    </p:spTree>
-    <p:extLst>
-      <p:ext uri="{BB962C8B-B14F-4D97-AF65-F5344CB8AC3E}">
-        <p14:creationId xmlns:p14="http://schemas.microsoft.com/office/powerpoint/2010/main" val="1334582004"/>
-      </p:ext>
-    </p:extLst>
-  </p:cSld>
-  <p:clrMapOvr>
-    <a:masterClrMapping/>
-  </p:clrMapOvr>
-</p:notes>
-</file>
-
-<file path=ppt/notesSlides/notesSlide30.xml><?xml version="1.0" encoding="utf-8"?>
+<file path=ppt/notesSlides/notesSlide31.xml><?xml version="1.0" encoding="utf-8"?>
 <p:notes xmlns:a="http://schemas.openxmlformats.org/drawingml/2006/main" xmlns:r="http://schemas.openxmlformats.org/officeDocument/2006/relationships" xmlns:p="http://schemas.openxmlformats.org/presentationml/2006/main" showMasterSp="0" showMasterPhAnim="0">
   <p:cSld>
     <p:spTree>
@@ -3558,7 +3700,7 @@
 </p:notes>
 </file>
 
-<file path=ppt/notesSlides/notesSlide31.xml><?xml version="1.0" encoding="utf-8"?>
+<file path=ppt/notesSlides/notesSlide32.xml><?xml version="1.0" encoding="utf-8"?>
 <p:notes xmlns:a="http://schemas.openxmlformats.org/drawingml/2006/main" xmlns:r="http://schemas.openxmlformats.org/officeDocument/2006/relationships" xmlns:p="http://schemas.openxmlformats.org/presentationml/2006/main" showMasterSp="0" showMasterPhAnim="0">
   <p:cSld>
     <p:spTree>
@@ -8034,8 +8176,8 @@
           </a:p>
         </p:txBody>
       </p:sp>
-      <mc:AlternateContent xmlns:mc="http://schemas.openxmlformats.org/markup-compatibility/2006">
-        <mc:Choice xmlns:a14="http://schemas.microsoft.com/office/drawing/2010/main" Requires="a14">
+      <mc:AlternateContent xmlns:mc="http://schemas.openxmlformats.org/markup-compatibility/2006" xmlns:a14="http://schemas.microsoft.com/office/drawing/2010/main">
+        <mc:Choice Requires="a14">
           <p:sp>
             <p:nvSpPr>
               <p:cNvPr id="5" name="Text Placeholder 4"/>
@@ -8433,7 +8575,7 @@
             </p:txBody>
           </p:sp>
         </mc:Choice>
-        <mc:Fallback>
+        <mc:Fallback xmlns="">
           <p:sp>
             <p:nvSpPr>
               <p:cNvPr id="5" name="Text Placeholder 4"/>
@@ -8713,11 +8855,7 @@
           <a:p>
             <a:r>
               <a:rPr lang="en-US" sz="2000" dirty="0" smtClean="0"/>
-              <a:t>Maximizing </a:t>
-            </a:r>
-            <a:r>
-              <a:rPr lang="en-US" sz="2000" dirty="0" smtClean="0"/>
-              <a:t>Profit: Annual Return</a:t>
+              <a:t>Maximizing Profit: Annual Return</a:t>
             </a:r>
           </a:p>
           <a:p>
@@ -8740,19 +8878,7 @@
           <a:p>
             <a:r>
               <a:rPr lang="en-US" sz="2000" dirty="0" smtClean="0"/>
-              <a:t>Maximizing Return on </a:t>
-            </a:r>
-            <a:r>
-              <a:rPr lang="en-US" sz="2000" dirty="0" smtClean="0"/>
-              <a:t>Risk</a:t>
-            </a:r>
-            <a:r>
-              <a:rPr lang="en-US" sz="2000" dirty="0" smtClean="0"/>
-              <a:t>: </a:t>
-            </a:r>
-            <a:r>
-              <a:rPr lang="en-US" sz="2000" dirty="0" smtClean="0"/>
-              <a:t>Sharpe Ratio</a:t>
+              <a:t>Maximizing Return on Risk: Sharpe Ratio</a:t>
             </a:r>
           </a:p>
           <a:p>
@@ -8919,7 +9045,7 @@
           <p:nvPr>
             <p:extLst>
               <p:ext uri="{D42A27DB-BD31-4B8C-83A1-F6EECF244321}">
-                <p14:modId xmlns:p14="http://schemas.microsoft.com/office/powerpoint/2010/main" val="815712161"/>
+                <p14:modId xmlns:p14="http://schemas.microsoft.com/office/powerpoint/2010/main" val="2357842987"/>
               </p:ext>
             </p:extLst>
           </p:nvPr>
@@ -10098,10 +10224,10 @@
                     <a:p>
                       <a:pPr algn="ctr" fontAlgn="ctr"/>
                       <a:r>
-                        <a:rPr lang="en-US" sz="1600" u="none" strike="noStrike" dirty="0">
-                          <a:effectLst/>
-                        </a:rPr>
-                        <a:t>N/A</a:t>
+                        <a:rPr lang="en-US" sz="1600" u="none" strike="noStrike" dirty="0" smtClean="0">
+                          <a:effectLst/>
+                        </a:rPr>
+                        <a:t>14</a:t>
                       </a:r>
                       <a:endParaRPr lang="en-US" sz="1600" b="0" i="0" u="none" strike="noStrike" dirty="0">
                         <a:solidFill>
@@ -10215,12 +10341,12 @@
                     <a:p>
                       <a:pPr algn="ctr" fontAlgn="ctr"/>
                       <a:r>
-                        <a:rPr lang="en-US" sz="1600" u="none" strike="noStrike">
-                          <a:effectLst/>
-                        </a:rPr>
-                        <a:t>N/A</a:t>
-                      </a:r>
-                      <a:endParaRPr lang="en-US" sz="1600" b="0" i="0" u="none" strike="noStrike">
+                        <a:rPr lang="en-US" sz="1600" u="none" strike="noStrike" dirty="0" smtClean="0">
+                          <a:effectLst/>
+                        </a:rPr>
+                        <a:t>30</a:t>
+                      </a:r>
+                      <a:endParaRPr lang="en-US" sz="1600" b="0" i="0" u="none" strike="noStrike" dirty="0">
                         <a:solidFill>
                           <a:srgbClr val="000000"/>
                         </a:solidFill>
@@ -10332,12 +10458,12 @@
                     <a:p>
                       <a:pPr algn="ctr" fontAlgn="ctr"/>
                       <a:r>
-                        <a:rPr lang="en-US" sz="1600" u="none" strike="noStrike">
-                          <a:effectLst/>
-                        </a:rPr>
-                        <a:t>N/A</a:t>
-                      </a:r>
-                      <a:endParaRPr lang="en-US" sz="1600" b="0" i="0" u="none" strike="noStrike">
+                        <a:rPr lang="en-US" sz="1600" u="none" strike="noStrike" dirty="0" smtClean="0">
+                          <a:effectLst/>
+                        </a:rPr>
+                        <a:t>70</a:t>
+                      </a:r>
+                      <a:endParaRPr lang="en-US" sz="1600" b="0" i="0" u="none" strike="noStrike" dirty="0">
                         <a:solidFill>
                           <a:srgbClr val="000000"/>
                         </a:solidFill>
@@ -10449,12 +10575,12 @@
                     <a:p>
                       <a:pPr algn="ctr" fontAlgn="ctr"/>
                       <a:r>
-                        <a:rPr lang="en-US" sz="1600" u="none" strike="noStrike">
-                          <a:effectLst/>
-                        </a:rPr>
-                        <a:t>N/A</a:t>
-                      </a:r>
-                      <a:endParaRPr lang="en-US" sz="1600" b="0" i="0" u="none" strike="noStrike">
+                        <a:rPr lang="en-US" sz="1600" u="none" strike="noStrike" dirty="0" smtClean="0">
+                          <a:effectLst/>
+                        </a:rPr>
+                        <a:t>14</a:t>
+                      </a:r>
+                      <a:endParaRPr lang="en-US" sz="1600" b="0" i="0" u="none" strike="noStrike" dirty="0">
                         <a:solidFill>
                           <a:srgbClr val="000000"/>
                         </a:solidFill>
@@ -12853,7 +12979,7 @@
           <p:nvPr>
             <p:extLst>
               <p:ext uri="{D42A27DB-BD31-4B8C-83A1-F6EECF244321}">
-                <p14:modId xmlns:p14="http://schemas.microsoft.com/office/powerpoint/2010/main" val="3001563487"/>
+                <p14:modId xmlns:p14="http://schemas.microsoft.com/office/powerpoint/2010/main" val="1369277139"/>
               </p:ext>
             </p:extLst>
           </p:nvPr>
@@ -14190,12 +14316,12 @@
                     <a:p>
                       <a:pPr algn="ctr" fontAlgn="ctr"/>
                       <a:r>
-                        <a:rPr lang="en-US" sz="1600" u="none" strike="noStrike">
-                          <a:effectLst/>
-                        </a:rPr>
-                        <a:t>N/A</a:t>
-                      </a:r>
-                      <a:endParaRPr lang="en-US" sz="1600" b="0" i="0" u="none" strike="noStrike">
+                        <a:rPr lang="en-US" sz="1600" u="none" strike="noStrike" dirty="0" smtClean="0">
+                          <a:effectLst/>
+                        </a:rPr>
+                        <a:t>14</a:t>
+                      </a:r>
+                      <a:endParaRPr lang="en-US" sz="1600" b="0" i="0" u="none" strike="noStrike" dirty="0">
                         <a:solidFill>
                           <a:srgbClr val="000000"/>
                         </a:solidFill>
@@ -14330,12 +14456,12 @@
                     <a:p>
                       <a:pPr algn="ctr" fontAlgn="ctr"/>
                       <a:r>
-                        <a:rPr lang="en-US" sz="1600" u="none" strike="noStrike">
-                          <a:effectLst/>
-                        </a:rPr>
-                        <a:t>N/A</a:t>
-                      </a:r>
-                      <a:endParaRPr lang="en-US" sz="1600" b="0" i="0" u="none" strike="noStrike">
+                        <a:rPr lang="en-US" sz="1600" u="none" strike="noStrike" dirty="0" smtClean="0">
+                          <a:effectLst/>
+                        </a:rPr>
+                        <a:t>30</a:t>
+                      </a:r>
+                      <a:endParaRPr lang="en-US" sz="1600" b="0" i="0" u="none" strike="noStrike" dirty="0">
                         <a:solidFill>
                           <a:srgbClr val="000000"/>
                         </a:solidFill>
@@ -14470,12 +14596,12 @@
                     <a:p>
                       <a:pPr algn="ctr" fontAlgn="ctr"/>
                       <a:r>
-                        <a:rPr lang="en-US" sz="1600" u="none" strike="noStrike">
-                          <a:effectLst/>
-                        </a:rPr>
-                        <a:t>N/A</a:t>
-                      </a:r>
-                      <a:endParaRPr lang="en-US" sz="1600" b="0" i="0" u="none" strike="noStrike">
+                        <a:rPr lang="en-US" sz="1600" u="none" strike="noStrike" dirty="0" smtClean="0">
+                          <a:effectLst/>
+                        </a:rPr>
+                        <a:t>70</a:t>
+                      </a:r>
+                      <a:endParaRPr lang="en-US" sz="1600" b="0" i="0" u="none" strike="noStrike" dirty="0">
                         <a:solidFill>
                           <a:srgbClr val="000000"/>
                         </a:solidFill>
@@ -14610,12 +14736,12 @@
                     <a:p>
                       <a:pPr algn="ctr" fontAlgn="ctr"/>
                       <a:r>
-                        <a:rPr lang="en-US" sz="1600" u="none" strike="noStrike">
-                          <a:effectLst/>
-                        </a:rPr>
-                        <a:t>N/A</a:t>
-                      </a:r>
-                      <a:endParaRPr lang="en-US" sz="1600" b="0" i="0" u="none" strike="noStrike">
+                        <a:rPr lang="en-US" sz="1600" u="none" strike="noStrike" dirty="0" smtClean="0">
+                          <a:effectLst/>
+                        </a:rPr>
+                        <a:t>14</a:t>
+                      </a:r>
+                      <a:endParaRPr lang="en-US" sz="1600" b="0" i="0" u="none" strike="noStrike" dirty="0">
                         <a:solidFill>
                           <a:srgbClr val="000000"/>
                         </a:solidFill>
@@ -15341,7 +15467,7 @@
       </p:sp>
       <p:pic>
         <p:nvPicPr>
-          <p:cNvPr id="2" name="Picture 1"/>
+          <p:cNvPr id="4" name="Picture 3"/>
           <p:cNvPicPr>
             <a:picLocks noChangeAspect="1"/>
           </p:cNvPicPr>
@@ -15361,8 +15487,8 @@
         </p:blipFill>
         <p:spPr>
           <a:xfrm>
-            <a:off x="967899" y="1571658"/>
-            <a:ext cx="7208202" cy="4666582"/>
+            <a:off x="676275" y="1446626"/>
+            <a:ext cx="7791450" cy="4591050"/>
           </a:xfrm>
           <a:prstGeom prst="rect">
             <a:avLst/>
@@ -15442,6 +15568,145 @@
             </a:pPr>
             <a:r>
               <a:rPr lang="en" sz="4000" dirty="0" smtClean="0"/>
+              <a:t>Search Space/Pareto Front Analysis</a:t>
+            </a:r>
+            <a:endParaRPr lang="en" sz="4000" dirty="0"/>
+          </a:p>
+        </p:txBody>
+      </p:sp>
+      <p:pic>
+        <p:nvPicPr>
+          <p:cNvPr id="5" name="Picture 4"/>
+          <p:cNvPicPr>
+            <a:picLocks noChangeAspect="1"/>
+          </p:cNvPicPr>
+          <p:nvPr/>
+        </p:nvPicPr>
+        <p:blipFill>
+          <a:blip r:embed="rId3">
+            <a:extLst>
+              <a:ext uri="{28A0092B-C50C-407E-A947-70E740481C1C}">
+                <a14:useLocalDpi xmlns:a14="http://schemas.microsoft.com/office/drawing/2010/main" val="0"/>
+              </a:ext>
+            </a:extLst>
+          </a:blip>
+          <a:stretch>
+            <a:fillRect/>
+          </a:stretch>
+        </p:blipFill>
+        <p:spPr>
+          <a:xfrm>
+            <a:off x="0" y="3787015"/>
+            <a:ext cx="4506890" cy="2655649"/>
+          </a:xfrm>
+          <a:prstGeom prst="rect">
+            <a:avLst/>
+          </a:prstGeom>
+        </p:spPr>
+      </p:pic>
+      <p:pic>
+        <p:nvPicPr>
+          <p:cNvPr id="2" name="Picture 1"/>
+          <p:cNvPicPr>
+            <a:picLocks noChangeAspect="1"/>
+          </p:cNvPicPr>
+          <p:nvPr/>
+        </p:nvPicPr>
+        <p:blipFill>
+          <a:blip r:embed="rId4">
+            <a:extLst>
+              <a:ext uri="{28A0092B-C50C-407E-A947-70E740481C1C}">
+                <a14:useLocalDpi xmlns:a14="http://schemas.microsoft.com/office/drawing/2010/main" val="0"/>
+              </a:ext>
+            </a:extLst>
+          </a:blip>
+          <a:stretch>
+            <a:fillRect/>
+          </a:stretch>
+        </p:blipFill>
+        <p:spPr>
+          <a:xfrm>
+            <a:off x="4506890" y="3787015"/>
+            <a:ext cx="4615058" cy="2747058"/>
+          </a:xfrm>
+          <a:prstGeom prst="rect">
+            <a:avLst/>
+          </a:prstGeom>
+        </p:spPr>
+      </p:pic>
+    </p:spTree>
+    <p:extLst>
+      <p:ext uri="{BB962C8B-B14F-4D97-AF65-F5344CB8AC3E}">
+        <p14:creationId xmlns:p14="http://schemas.microsoft.com/office/powerpoint/2010/main" val="4091981834"/>
+      </p:ext>
+    </p:extLst>
+  </p:cSld>
+  <p:clrMapOvr>
+    <a:masterClrMapping/>
+  </p:clrMapOvr>
+  <p:transition spd="slow">
+    <p:cut/>
+  </p:transition>
+  <p:timing>
+    <p:tnLst>
+      <p:par>
+        <p:cTn id="1" dur="indefinite" restart="never" nodeType="tmRoot"/>
+      </p:par>
+    </p:tnLst>
+  </p:timing>
+</p:sld>
+</file>
+
+<file path=ppt/slides/slide26.xml><?xml version="1.0" encoding="utf-8"?>
+<p:sld xmlns:a="http://schemas.openxmlformats.org/drawingml/2006/main" xmlns:r="http://schemas.openxmlformats.org/officeDocument/2006/relationships" xmlns:p="http://schemas.openxmlformats.org/presentationml/2006/main">
+  <p:cSld>
+    <p:spTree>
+      <p:nvGrpSpPr>
+        <p:cNvPr id="1" name="Shape 154"/>
+        <p:cNvGrpSpPr/>
+        <p:nvPr/>
+      </p:nvGrpSpPr>
+      <p:grpSpPr>
+        <a:xfrm>
+          <a:off x="0" y="0"/>
+          <a:ext cx="0" cy="0"/>
+          <a:chOff x="0" y="0"/>
+          <a:chExt cx="0" cy="0"/>
+        </a:xfrm>
+      </p:grpSpPr>
+      <p:sp>
+        <p:nvSpPr>
+          <p:cNvPr id="155" name="Shape 155"/>
+          <p:cNvSpPr txBox="1">
+            <a:spLocks noGrp="1"/>
+          </p:cNvSpPr>
+          <p:nvPr>
+            <p:ph type="title"/>
+          </p:nvPr>
+        </p:nvSpPr>
+        <p:spPr>
+          <a:xfrm>
+            <a:off x="311701" y="593367"/>
+            <a:ext cx="8520599" cy="763599"/>
+          </a:xfrm>
+          <a:prstGeom prst="rect">
+            <a:avLst/>
+          </a:prstGeom>
+        </p:spPr>
+        <p:txBody>
+          <a:bodyPr lIns="91425" tIns="91425" rIns="91425" bIns="91425" anchor="t" anchorCtr="0">
+            <a:noAutofit/>
+          </a:bodyPr>
+          <a:lstStyle/>
+          <a:p>
+            <a:pPr algn="l">
+              <a:buClr>
+                <a:schemeClr val="dk1"/>
+              </a:buClr>
+              <a:buSzPct val="39285"/>
+            </a:pPr>
+            <a:r>
+              <a:rPr lang="en" sz="4000" dirty="0" smtClean="0"/>
               <a:t>Comparison to Buy &amp; Hold Strategy</a:t>
             </a:r>
             <a:endParaRPr lang="en" sz="4000" dirty="0"/>
@@ -15496,153 +15761,6 @@
         <p14:creationId xmlns:p14="http://schemas.microsoft.com/office/powerpoint/2010/main" val="1037680873"/>
       </p:ext>
     </p:extLst>
-  </p:cSld>
-  <p:clrMapOvr>
-    <a:masterClrMapping/>
-  </p:clrMapOvr>
-  <p:transition spd="slow">
-    <p:cut/>
-  </p:transition>
-  <p:timing>
-    <p:tnLst>
-      <p:par>
-        <p:cTn id="1" dur="indefinite" restart="never" nodeType="tmRoot"/>
-      </p:par>
-    </p:tnLst>
-  </p:timing>
-</p:sld>
-</file>
-
-<file path=ppt/slides/slide26.xml><?xml version="1.0" encoding="utf-8"?>
-<p:sld xmlns:a="http://schemas.openxmlformats.org/drawingml/2006/main" xmlns:r="http://schemas.openxmlformats.org/officeDocument/2006/relationships" xmlns:p="http://schemas.openxmlformats.org/presentationml/2006/main">
-  <p:cSld>
-    <p:spTree>
-      <p:nvGrpSpPr>
-        <p:cNvPr id="1" name="Shape 161"/>
-        <p:cNvGrpSpPr/>
-        <p:nvPr/>
-      </p:nvGrpSpPr>
-      <p:grpSpPr>
-        <a:xfrm>
-          <a:off x="0" y="0"/>
-          <a:ext cx="0" cy="0"/>
-          <a:chOff x="0" y="0"/>
-          <a:chExt cx="0" cy="0"/>
-        </a:xfrm>
-      </p:grpSpPr>
-      <p:sp>
-        <p:nvSpPr>
-          <p:cNvPr id="162" name="Shape 162"/>
-          <p:cNvSpPr txBox="1">
-            <a:spLocks noGrp="1"/>
-          </p:cNvSpPr>
-          <p:nvPr>
-            <p:ph type="title"/>
-          </p:nvPr>
-        </p:nvSpPr>
-        <p:spPr>
-          <a:xfrm>
-            <a:off x="311701" y="593367"/>
-            <a:ext cx="8520599" cy="763599"/>
-          </a:xfrm>
-          <a:prstGeom prst="rect">
-            <a:avLst/>
-          </a:prstGeom>
-        </p:spPr>
-        <p:txBody>
-          <a:bodyPr lIns="91425" tIns="91425" rIns="91425" bIns="91425" anchor="t" anchorCtr="0">
-            <a:noAutofit/>
-          </a:bodyPr>
-          <a:lstStyle/>
-          <a:p>
-            <a:pPr algn="l">
-              <a:buClr>
-                <a:schemeClr val="dk1"/>
-              </a:buClr>
-              <a:buSzPct val="39285"/>
-            </a:pPr>
-            <a:r>
-              <a:rPr lang="en" sz="4000" dirty="0"/>
-              <a:t>Limitations of the </a:t>
-            </a:r>
-            <a:r>
-              <a:rPr lang="en" sz="4000" dirty="0" smtClean="0"/>
-              <a:t>Solution</a:t>
-            </a:r>
-            <a:endParaRPr lang="en" sz="4000" dirty="0"/>
-          </a:p>
-        </p:txBody>
-      </p:sp>
-      <p:sp>
-        <p:nvSpPr>
-          <p:cNvPr id="163" name="Shape 163"/>
-          <p:cNvSpPr txBox="1">
-            <a:spLocks noGrp="1"/>
-          </p:cNvSpPr>
-          <p:nvPr>
-            <p:ph type="body" idx="1"/>
-          </p:nvPr>
-        </p:nvSpPr>
-        <p:spPr>
-          <a:xfrm>
-            <a:off x="311701" y="1536633"/>
-            <a:ext cx="8520599" cy="4555200"/>
-          </a:xfrm>
-          <a:prstGeom prst="rect">
-            <a:avLst/>
-          </a:prstGeom>
-        </p:spPr>
-        <p:txBody>
-          <a:bodyPr lIns="91425" tIns="91425" rIns="91425" bIns="91425" anchor="t" anchorCtr="0">
-            <a:noAutofit/>
-          </a:bodyPr>
-          <a:lstStyle/>
-          <a:p>
-            <a:pPr marL="457200" lvl="0" indent="-228600" rtl="0">
-              <a:spcBef>
-                <a:spcPts val="0"/>
-              </a:spcBef>
-              <a:spcAft>
-                <a:spcPts val="800"/>
-              </a:spcAft>
-              <a:buChar char="●"/>
-            </a:pPr>
-            <a:r>
-              <a:rPr lang="en" sz="2000" dirty="0" smtClean="0"/>
-              <a:t>Evolution of integer values using real-valued paramters</a:t>
-            </a:r>
-          </a:p>
-          <a:p>
-            <a:pPr marL="457200" lvl="0" indent="-228600" rtl="0">
-              <a:spcBef>
-                <a:spcPts val="0"/>
-              </a:spcBef>
-              <a:spcAft>
-                <a:spcPts val="800"/>
-              </a:spcAft>
-              <a:buChar char="●"/>
-            </a:pPr>
-            <a:r>
-              <a:rPr lang="en" sz="2000" smtClean="0"/>
-              <a:t>Potential affect of inflation on the values of the dataset</a:t>
-            </a:r>
-            <a:endParaRPr lang="en" sz="2000" dirty="0" smtClean="0"/>
-          </a:p>
-          <a:p>
-            <a:pPr marL="457200" lvl="0" indent="-228600" rtl="0">
-              <a:spcBef>
-                <a:spcPts val="0"/>
-              </a:spcBef>
-              <a:spcAft>
-                <a:spcPts val="800"/>
-              </a:spcAft>
-              <a:buChar char="●"/>
-            </a:pPr>
-            <a:endParaRPr lang="en" sz="2000" dirty="0"/>
-          </a:p>
-        </p:txBody>
-      </p:sp>
-    </p:spTree>
   </p:cSld>
   <p:clrMapOvr>
     <a:masterClrMapping/>
@@ -15709,8 +15827,12 @@
               <a:buSzPct val="39285"/>
             </a:pPr>
             <a:r>
+              <a:rPr lang="en" sz="4000" dirty="0"/>
+              <a:t>Limitations of the </a:t>
+            </a:r>
+            <a:r>
               <a:rPr lang="en" sz="4000" dirty="0" smtClean="0"/>
-              <a:t>Conclusions</a:t>
+              <a:t>Solution</a:t>
             </a:r>
             <a:endParaRPr lang="en" sz="4000" dirty="0"/>
           </a:p>
@@ -15752,6 +15874,149 @@
             </a:pPr>
             <a:r>
               <a:rPr lang="en" sz="2000" dirty="0" smtClean="0"/>
+              <a:t>Evolution of integer values using real-valued paramters</a:t>
+            </a:r>
+          </a:p>
+          <a:p>
+            <a:pPr marL="457200" lvl="0" indent="-228600" rtl="0">
+              <a:spcBef>
+                <a:spcPts val="0"/>
+              </a:spcBef>
+              <a:spcAft>
+                <a:spcPts val="800"/>
+              </a:spcAft>
+              <a:buChar char="●"/>
+            </a:pPr>
+            <a:r>
+              <a:rPr lang="en" sz="2000" smtClean="0"/>
+              <a:t>Potential affect of inflation on the values of the dataset</a:t>
+            </a:r>
+            <a:endParaRPr lang="en" sz="2000" dirty="0" smtClean="0"/>
+          </a:p>
+          <a:p>
+            <a:pPr marL="457200" lvl="0" indent="-228600" rtl="0">
+              <a:spcBef>
+                <a:spcPts val="0"/>
+              </a:spcBef>
+              <a:spcAft>
+                <a:spcPts val="800"/>
+              </a:spcAft>
+              <a:buChar char="●"/>
+            </a:pPr>
+            <a:endParaRPr lang="en" sz="2000" dirty="0"/>
+          </a:p>
+        </p:txBody>
+      </p:sp>
+    </p:spTree>
+  </p:cSld>
+  <p:clrMapOvr>
+    <a:masterClrMapping/>
+  </p:clrMapOvr>
+  <p:transition spd="slow">
+    <p:cut/>
+  </p:transition>
+  <p:timing>
+    <p:tnLst>
+      <p:par>
+        <p:cTn id="1" dur="indefinite" restart="never" nodeType="tmRoot"/>
+      </p:par>
+    </p:tnLst>
+  </p:timing>
+</p:sld>
+</file>
+
+<file path=ppt/slides/slide28.xml><?xml version="1.0" encoding="utf-8"?>
+<p:sld xmlns:a="http://schemas.openxmlformats.org/drawingml/2006/main" xmlns:r="http://schemas.openxmlformats.org/officeDocument/2006/relationships" xmlns:p="http://schemas.openxmlformats.org/presentationml/2006/main">
+  <p:cSld>
+    <p:spTree>
+      <p:nvGrpSpPr>
+        <p:cNvPr id="1" name="Shape 161"/>
+        <p:cNvGrpSpPr/>
+        <p:nvPr/>
+      </p:nvGrpSpPr>
+      <p:grpSpPr>
+        <a:xfrm>
+          <a:off x="0" y="0"/>
+          <a:ext cx="0" cy="0"/>
+          <a:chOff x="0" y="0"/>
+          <a:chExt cx="0" cy="0"/>
+        </a:xfrm>
+      </p:grpSpPr>
+      <p:sp>
+        <p:nvSpPr>
+          <p:cNvPr id="162" name="Shape 162"/>
+          <p:cNvSpPr txBox="1">
+            <a:spLocks noGrp="1"/>
+          </p:cNvSpPr>
+          <p:nvPr>
+            <p:ph type="title"/>
+          </p:nvPr>
+        </p:nvSpPr>
+        <p:spPr>
+          <a:xfrm>
+            <a:off x="311701" y="593367"/>
+            <a:ext cx="8520599" cy="763599"/>
+          </a:xfrm>
+          <a:prstGeom prst="rect">
+            <a:avLst/>
+          </a:prstGeom>
+        </p:spPr>
+        <p:txBody>
+          <a:bodyPr lIns="91425" tIns="91425" rIns="91425" bIns="91425" anchor="t" anchorCtr="0">
+            <a:noAutofit/>
+          </a:bodyPr>
+          <a:lstStyle/>
+          <a:p>
+            <a:pPr algn="l">
+              <a:buClr>
+                <a:schemeClr val="dk1"/>
+              </a:buClr>
+              <a:buSzPct val="39285"/>
+            </a:pPr>
+            <a:r>
+              <a:rPr lang="en" sz="4000" dirty="0" smtClean="0"/>
+              <a:t>Conclusions</a:t>
+            </a:r>
+            <a:endParaRPr lang="en" sz="4000" dirty="0"/>
+          </a:p>
+        </p:txBody>
+      </p:sp>
+      <p:sp>
+        <p:nvSpPr>
+          <p:cNvPr id="163" name="Shape 163"/>
+          <p:cNvSpPr txBox="1">
+            <a:spLocks noGrp="1"/>
+          </p:cNvSpPr>
+          <p:nvPr>
+            <p:ph type="body" idx="1"/>
+          </p:nvPr>
+        </p:nvSpPr>
+        <p:spPr>
+          <a:xfrm>
+            <a:off x="311701" y="1536633"/>
+            <a:ext cx="8520599" cy="4555200"/>
+          </a:xfrm>
+          <a:prstGeom prst="rect">
+            <a:avLst/>
+          </a:prstGeom>
+        </p:spPr>
+        <p:txBody>
+          <a:bodyPr lIns="91425" tIns="91425" rIns="91425" bIns="91425" anchor="t" anchorCtr="0">
+            <a:noAutofit/>
+          </a:bodyPr>
+          <a:lstStyle/>
+          <a:p>
+            <a:pPr marL="457200" lvl="0" indent="-228600" rtl="0">
+              <a:spcBef>
+                <a:spcPts val="0"/>
+              </a:spcBef>
+              <a:spcAft>
+                <a:spcPts val="800"/>
+              </a:spcAft>
+              <a:buChar char="●"/>
+            </a:pPr>
+            <a:r>
+              <a:rPr lang="en" sz="2000" dirty="0" smtClean="0"/>
               <a:t>TODO</a:t>
             </a:r>
           </a:p>
@@ -15792,7 +16057,7 @@
 </p:sld>
 </file>
 
-<file path=ppt/slides/slide28.xml><?xml version="1.0" encoding="utf-8"?>
+<file path=ppt/slides/slide29.xml><?xml version="1.0" encoding="utf-8"?>
 <p:sld xmlns:a="http://schemas.openxmlformats.org/drawingml/2006/main" xmlns:r="http://schemas.openxmlformats.org/officeDocument/2006/relationships" xmlns:p="http://schemas.openxmlformats.org/presentationml/2006/main">
   <p:cSld>
     <p:spTree>
@@ -15914,7 +16179,6 @@
               <a:rPr lang="en" sz="1800" dirty="0" smtClean="0"/>
               <a:t>Requires ideal and reference points</a:t>
             </a:r>
-            <a:endParaRPr lang="en" sz="1800" dirty="0" smtClean="0"/>
           </a:p>
           <a:p>
             <a:pPr marL="457200" lvl="0" indent="-228600" rtl="0">
@@ -15953,80 +16217,6 @@
             <a:r>
               <a:rPr lang="en" sz="2000" dirty="0" smtClean="0"/>
               <a:t>Research alternative objective functions to use in place of Annual Return and Sharpe Ratio</a:t>
-            </a:r>
-            <a:endParaRPr lang="en" sz="2000" dirty="0" smtClean="0"/>
-          </a:p>
-        </p:txBody>
-      </p:sp>
-    </p:spTree>
-  </p:cSld>
-  <p:clrMapOvr>
-    <a:masterClrMapping/>
-  </p:clrMapOvr>
-  <p:transition spd="slow">
-    <p:cut/>
-  </p:transition>
-  <p:timing>
-    <p:tnLst>
-      <p:par>
-        <p:cTn id="1" dur="indefinite" restart="never" nodeType="tmRoot"/>
-      </p:par>
-    </p:tnLst>
-  </p:timing>
-</p:sld>
-</file>
-
-<file path=ppt/slides/slide29.xml><?xml version="1.0" encoding="utf-8"?>
-<p:sld xmlns:a="http://schemas.openxmlformats.org/drawingml/2006/main" xmlns:r="http://schemas.openxmlformats.org/officeDocument/2006/relationships" xmlns:p="http://schemas.openxmlformats.org/presentationml/2006/main">
-  <p:cSld>
-    <p:spTree>
-      <p:nvGrpSpPr>
-        <p:cNvPr id="1" name="Shape 179"/>
-        <p:cNvGrpSpPr/>
-        <p:nvPr/>
-      </p:nvGrpSpPr>
-      <p:grpSpPr>
-        <a:xfrm>
-          <a:off x="0" y="0"/>
-          <a:ext cx="0" cy="0"/>
-          <a:chOff x="0" y="0"/>
-          <a:chExt cx="0" cy="0"/>
-        </a:xfrm>
-      </p:grpSpPr>
-      <p:sp>
-        <p:nvSpPr>
-          <p:cNvPr id="180" name="Shape 180"/>
-          <p:cNvSpPr txBox="1">
-            <a:spLocks noGrp="1"/>
-          </p:cNvSpPr>
-          <p:nvPr>
-            <p:ph type="title"/>
-          </p:nvPr>
-        </p:nvSpPr>
-        <p:spPr>
-          <a:xfrm>
-            <a:off x="311701" y="2867800"/>
-            <a:ext cx="8520599" cy="1122400"/>
-          </a:xfrm>
-          <a:prstGeom prst="rect">
-            <a:avLst/>
-          </a:prstGeom>
-        </p:spPr>
-        <p:txBody>
-          <a:bodyPr lIns="91425" tIns="91425" rIns="91425" bIns="91425" anchor="ctr" anchorCtr="0">
-            <a:noAutofit/>
-          </a:bodyPr>
-          <a:lstStyle/>
-          <a:p>
-            <a:pPr>
-              <a:spcBef>
-                <a:spcPts val="0"/>
-              </a:spcBef>
-              <a:buNone/>
-            </a:pPr>
-            <a:r>
-              <a:rPr lang="en" sz="4400" dirty="0"/>
-              <a:t>Questions?</a:t>
             </a:r>
           </a:p>
         </p:txBody>
@@ -16178,6 +16368,79 @@
 </file>
 
 <file path=ppt/slides/slide30.xml><?xml version="1.0" encoding="utf-8"?>
+<p:sld xmlns:a="http://schemas.openxmlformats.org/drawingml/2006/main" xmlns:r="http://schemas.openxmlformats.org/officeDocument/2006/relationships" xmlns:p="http://schemas.openxmlformats.org/presentationml/2006/main">
+  <p:cSld>
+    <p:spTree>
+      <p:nvGrpSpPr>
+        <p:cNvPr id="1" name="Shape 179"/>
+        <p:cNvGrpSpPr/>
+        <p:nvPr/>
+      </p:nvGrpSpPr>
+      <p:grpSpPr>
+        <a:xfrm>
+          <a:off x="0" y="0"/>
+          <a:ext cx="0" cy="0"/>
+          <a:chOff x="0" y="0"/>
+          <a:chExt cx="0" cy="0"/>
+        </a:xfrm>
+      </p:grpSpPr>
+      <p:sp>
+        <p:nvSpPr>
+          <p:cNvPr id="180" name="Shape 180"/>
+          <p:cNvSpPr txBox="1">
+            <a:spLocks noGrp="1"/>
+          </p:cNvSpPr>
+          <p:nvPr>
+            <p:ph type="title"/>
+          </p:nvPr>
+        </p:nvSpPr>
+        <p:spPr>
+          <a:xfrm>
+            <a:off x="311701" y="2867800"/>
+            <a:ext cx="8520599" cy="1122400"/>
+          </a:xfrm>
+          <a:prstGeom prst="rect">
+            <a:avLst/>
+          </a:prstGeom>
+        </p:spPr>
+        <p:txBody>
+          <a:bodyPr lIns="91425" tIns="91425" rIns="91425" bIns="91425" anchor="ctr" anchorCtr="0">
+            <a:noAutofit/>
+          </a:bodyPr>
+          <a:lstStyle/>
+          <a:p>
+            <a:pPr>
+              <a:spcBef>
+                <a:spcPts val="0"/>
+              </a:spcBef>
+              <a:buNone/>
+            </a:pPr>
+            <a:r>
+              <a:rPr lang="en" sz="4400" dirty="0"/>
+              <a:t>Questions?</a:t>
+            </a:r>
+          </a:p>
+        </p:txBody>
+      </p:sp>
+    </p:spTree>
+  </p:cSld>
+  <p:clrMapOvr>
+    <a:masterClrMapping/>
+  </p:clrMapOvr>
+  <p:transition spd="slow">
+    <p:cut/>
+  </p:transition>
+  <p:timing>
+    <p:tnLst>
+      <p:par>
+        <p:cTn id="1" dur="indefinite" restart="never" nodeType="tmRoot"/>
+      </p:par>
+    </p:tnLst>
+  </p:timing>
+</p:sld>
+</file>
+
+<file path=ppt/slides/slide31.xml><?xml version="1.0" encoding="utf-8"?>
 <p:sld xmlns:a="http://schemas.openxmlformats.org/drawingml/2006/main" xmlns:r="http://schemas.openxmlformats.org/officeDocument/2006/relationships" xmlns:p="http://schemas.openxmlformats.org/presentationml/2006/main" show="0">
   <p:cSld>
     <p:spTree>
@@ -16318,7 +16581,7 @@
 </p:sld>
 </file>
 
-<file path=ppt/slides/slide31.xml><?xml version="1.0" encoding="utf-8"?>
+<file path=ppt/slides/slide32.xml><?xml version="1.0" encoding="utf-8"?>
 <p:sld xmlns:a="http://schemas.openxmlformats.org/drawingml/2006/main" xmlns:r="http://schemas.openxmlformats.org/officeDocument/2006/relationships" xmlns:p="http://schemas.openxmlformats.org/presentationml/2006/main" show="0">
   <p:cSld>
     <p:spTree>
@@ -16921,19 +17184,7 @@
             <a:pPr algn="l"/>
             <a:r>
               <a:rPr lang="en" sz="4000" dirty="0" smtClean="0"/>
-              <a:t>NSGA </a:t>
-            </a:r>
-            <a:r>
-              <a:rPr lang="en" sz="4000" dirty="0" smtClean="0"/>
-              <a:t>and </a:t>
-            </a:r>
-            <a:r>
-              <a:rPr lang="en" sz="4000" dirty="0" smtClean="0"/>
-              <a:t>NSGA</a:t>
-            </a:r>
-            <a:r>
-              <a:rPr lang="en" sz="4000" dirty="0" smtClean="0"/>
-              <a:t>-II</a:t>
+              <a:t>NSGA and NSGA-II</a:t>
             </a:r>
             <a:endParaRPr lang="en" sz="4000" dirty="0"/>
           </a:p>
@@ -17095,7 +17346,6 @@
               <a:rPr lang="en" sz="2000" dirty="0" smtClean="0"/>
               <a:t>TODO</a:t>
             </a:r>
-            <a:endParaRPr lang="en" sz="2000" dirty="0" smtClean="0"/>
           </a:p>
         </p:txBody>
       </p:sp>
@@ -17208,7 +17458,6 @@
               <a:rPr lang="en" sz="2000" dirty="0" smtClean="0"/>
               <a:t>TODO</a:t>
             </a:r>
-            <a:endParaRPr lang="en" sz="2000" dirty="0" smtClean="0"/>
           </a:p>
         </p:txBody>
       </p:sp>

</xml_diff>

<commit_message>
Committing the code to be run for the long run. Doing a 500 individual run for 200 generations 20 times.
</commit_message>
<xml_diff>
--- a/CSE848_Hormasji_Reiff_ProjectPresentation.pptx
+++ b/CSE848_Hormasji_Reiff_ProjectPresentation.pptx
@@ -5,7 +5,7 @@
     <p:sldMasterId id="2147483648" r:id="rId1"/>
   </p:sldMasterIdLst>
   <p:notesMasterIdLst>
-    <p:notesMasterId r:id="rId34"/>
+    <p:notesMasterId r:id="rId33"/>
   </p:notesMasterIdLst>
   <p:sldIdLst>
     <p:sldId id="264" r:id="rId2"/>
@@ -31,15 +31,14 @@
     <p:sldId id="280" r:id="rId22"/>
     <p:sldId id="304" r:id="rId23"/>
     <p:sldId id="303" r:id="rId24"/>
-    <p:sldId id="302" r:id="rId25"/>
-    <p:sldId id="309" r:id="rId26"/>
-    <p:sldId id="301" r:id="rId27"/>
-    <p:sldId id="281" r:id="rId28"/>
-    <p:sldId id="308" r:id="rId29"/>
-    <p:sldId id="282" r:id="rId30"/>
-    <p:sldId id="284" r:id="rId31"/>
-    <p:sldId id="285" r:id="rId32"/>
-    <p:sldId id="286" r:id="rId33"/>
+    <p:sldId id="309" r:id="rId25"/>
+    <p:sldId id="301" r:id="rId26"/>
+    <p:sldId id="281" r:id="rId27"/>
+    <p:sldId id="308" r:id="rId28"/>
+    <p:sldId id="282" r:id="rId29"/>
+    <p:sldId id="284" r:id="rId30"/>
+    <p:sldId id="285" r:id="rId31"/>
+    <p:sldId id="286" r:id="rId32"/>
   </p:sldIdLst>
   <p:sldSz cx="9144000" cy="6858000" type="screen4x3"/>
   <p:notesSz cx="6858000" cy="9144000"/>
@@ -2721,24 +2720,11 @@
             </a:pPr>
             <a:r>
               <a:rPr lang="en" dirty="0" smtClean="0"/>
-              <a:t>TODO Here: Graphs of the evolution</a:t>
-            </a:r>
-            <a:r>
-              <a:rPr lang="en" baseline="0" dirty="0" smtClean="0"/>
-              <a:t> of the Pareto front for each of the individual objectives</a:t>
-            </a:r>
-            <a:endParaRPr lang="en" dirty="0" smtClean="0"/>
-          </a:p>
-          <a:p>
-            <a:pPr rtl="0">
-              <a:spcBef>
-                <a:spcPts val="0"/>
-              </a:spcBef>
-              <a:buNone/>
-            </a:pPr>
+              <a:t>Motivation</a:t>
+            </a:r>
             <a:r>
               <a:rPr lang="en" dirty="0" smtClean="0"/>
-              <a:t>Motivation:</a:t>
+              <a:t>:</a:t>
             </a:r>
             <a:r>
               <a:rPr lang="en" baseline="0" dirty="0" smtClean="0"/>
@@ -2751,7 +2737,7 @@
     </p:spTree>
     <p:extLst>
       <p:ext uri="{BB962C8B-B14F-4D97-AF65-F5344CB8AC3E}">
-        <p14:creationId xmlns:p14="http://schemas.microsoft.com/office/powerpoint/2010/main" val="1207704042"/>
+        <p14:creationId xmlns:p14="http://schemas.microsoft.com/office/powerpoint/2010/main" val="843987080"/>
       </p:ext>
     </p:extLst>
   </p:cSld>
@@ -2860,31 +2846,6 @@
               </a:spcBef>
               <a:buNone/>
             </a:pPr>
-            <a:r>
-              <a:rPr lang="en" dirty="0" smtClean="0"/>
-              <a:t>TODO Here: Graphs of the evolution</a:t>
-            </a:r>
-            <a:r>
-              <a:rPr lang="en" baseline="0" dirty="0" smtClean="0"/>
-              <a:t> of the Pareto front for each of the individual objectives</a:t>
-            </a:r>
-            <a:endParaRPr lang="en" dirty="0" smtClean="0"/>
-          </a:p>
-          <a:p>
-            <a:pPr rtl="0">
-              <a:spcBef>
-                <a:spcPts val="0"/>
-              </a:spcBef>
-              <a:buNone/>
-            </a:pPr>
-            <a:r>
-              <a:rPr lang="en" dirty="0" smtClean="0"/>
-              <a:t>Motivation:</a:t>
-            </a:r>
-            <a:r>
-              <a:rPr lang="en" baseline="0" dirty="0" smtClean="0"/>
-              <a:t> Pareto front graphs did not appear correct for a maximization problem</a:t>
-            </a:r>
             <a:endParaRPr lang="en" dirty="0"/>
           </a:p>
         </p:txBody>
@@ -2892,7 +2853,7 @@
     </p:spTree>
     <p:extLst>
       <p:ext uri="{BB962C8B-B14F-4D97-AF65-F5344CB8AC3E}">
-        <p14:creationId xmlns:p14="http://schemas.microsoft.com/office/powerpoint/2010/main" val="843987080"/>
+        <p14:creationId xmlns:p14="http://schemas.microsoft.com/office/powerpoint/2010/main" val="2663739280"/>
       </p:ext>
     </p:extLst>
   </p:cSld>
@@ -2907,7 +2868,7 @@
   <p:cSld>
     <p:spTree>
       <p:nvGrpSpPr>
-        <p:cNvPr id="1" name="Shape 158"/>
+        <p:cNvPr id="1" name="Shape 164"/>
         <p:cNvGrpSpPr/>
         <p:nvPr/>
       </p:nvGrpSpPr>
@@ -2921,7 +2882,7 @@
       </p:grpSpPr>
       <p:sp>
         <p:nvSpPr>
-          <p:cNvPr id="159" name="Shape 159"/>
+          <p:cNvPr id="165" name="Shape 165"/>
           <p:cNvSpPr>
             <a:spLocks noGrp="1" noRot="1" noChangeAspect="1"/>
           </p:cNvSpPr>
@@ -2972,7 +2933,7 @@
       </p:sp>
       <p:sp>
         <p:nvSpPr>
-          <p:cNvPr id="160" name="Shape 160"/>
+          <p:cNvPr id="166" name="Shape 166"/>
           <p:cNvSpPr txBox="1">
             <a:spLocks noGrp="1"/>
           </p:cNvSpPr>
@@ -3008,7 +2969,7 @@
     </p:spTree>
     <p:extLst>
       <p:ext uri="{BB962C8B-B14F-4D97-AF65-F5344CB8AC3E}">
-        <p14:creationId xmlns:p14="http://schemas.microsoft.com/office/powerpoint/2010/main" val="2663739280"/>
+        <p14:creationId xmlns:p14="http://schemas.microsoft.com/office/powerpoint/2010/main" val="2876005320"/>
       </p:ext>
     </p:extLst>
   </p:cSld>
@@ -3124,7 +3085,7 @@
     </p:spTree>
     <p:extLst>
       <p:ext uri="{BB962C8B-B14F-4D97-AF65-F5344CB8AC3E}">
-        <p14:creationId xmlns:p14="http://schemas.microsoft.com/office/powerpoint/2010/main" val="2876005320"/>
+        <p14:creationId xmlns:p14="http://schemas.microsoft.com/office/powerpoint/2010/main" val="2011897862"/>
       </p:ext>
     </p:extLst>
   </p:cSld>
@@ -3135,122 +3096,6 @@
 </file>
 
 <file path=ppt/notesSlides/notesSlide28.xml><?xml version="1.0" encoding="utf-8"?>
-<p:notes xmlns:a="http://schemas.openxmlformats.org/drawingml/2006/main" xmlns:r="http://schemas.openxmlformats.org/officeDocument/2006/relationships" xmlns:p="http://schemas.openxmlformats.org/presentationml/2006/main" showMasterSp="0" showMasterPhAnim="0">
-  <p:cSld>
-    <p:spTree>
-      <p:nvGrpSpPr>
-        <p:cNvPr id="1" name="Shape 164"/>
-        <p:cNvGrpSpPr/>
-        <p:nvPr/>
-      </p:nvGrpSpPr>
-      <p:grpSpPr>
-        <a:xfrm>
-          <a:off x="0" y="0"/>
-          <a:ext cx="0" cy="0"/>
-          <a:chOff x="0" y="0"/>
-          <a:chExt cx="0" cy="0"/>
-        </a:xfrm>
-      </p:grpSpPr>
-      <p:sp>
-        <p:nvSpPr>
-          <p:cNvPr id="165" name="Shape 165"/>
-          <p:cNvSpPr>
-            <a:spLocks noGrp="1" noRot="1" noChangeAspect="1"/>
-          </p:cNvSpPr>
-          <p:nvPr>
-            <p:ph type="sldImg" idx="2"/>
-          </p:nvPr>
-        </p:nvSpPr>
-        <p:spPr>
-          <a:xfrm>
-            <a:off x="1143000" y="685800"/>
-            <a:ext cx="4572000" cy="3429000"/>
-          </a:xfrm>
-          <a:custGeom>
-            <a:avLst/>
-            <a:gdLst/>
-            <a:ahLst/>
-            <a:cxnLst/>
-            <a:rect l="0" t="0" r="0" b="0"/>
-            <a:pathLst>
-              <a:path w="120000" h="120000" extrusionOk="0">
-                <a:moveTo>
-                  <a:pt x="0" y="0"/>
-                </a:moveTo>
-                <a:lnTo>
-                  <a:pt x="120000" y="0"/>
-                </a:lnTo>
-                <a:lnTo>
-                  <a:pt x="120000" y="120000"/>
-                </a:lnTo>
-                <a:lnTo>
-                  <a:pt x="0" y="120000"/>
-                </a:lnTo>
-                <a:close/>
-              </a:path>
-            </a:pathLst>
-          </a:custGeom>
-          <a:noFill/>
-          <a:ln w="9525" cap="flat" cmpd="sng">
-            <a:solidFill>
-              <a:srgbClr val="000000"/>
-            </a:solidFill>
-            <a:prstDash val="solid"/>
-            <a:round/>
-            <a:headEnd type="none" w="med" len="med"/>
-            <a:tailEnd type="none" w="med" len="med"/>
-          </a:ln>
-        </p:spPr>
-      </p:sp>
-      <p:sp>
-        <p:nvSpPr>
-          <p:cNvPr id="166" name="Shape 166"/>
-          <p:cNvSpPr txBox="1">
-            <a:spLocks noGrp="1"/>
-          </p:cNvSpPr>
-          <p:nvPr>
-            <p:ph type="body" idx="1"/>
-          </p:nvPr>
-        </p:nvSpPr>
-        <p:spPr>
-          <a:xfrm>
-            <a:off x="685800" y="4343400"/>
-            <a:ext cx="5486399" cy="4114800"/>
-          </a:xfrm>
-          <a:prstGeom prst="rect">
-            <a:avLst/>
-          </a:prstGeom>
-        </p:spPr>
-        <p:txBody>
-          <a:bodyPr lIns="91425" tIns="91425" rIns="91425" bIns="91425" anchor="t" anchorCtr="0">
-            <a:noAutofit/>
-          </a:bodyPr>
-          <a:lstStyle/>
-          <a:p>
-            <a:pPr rtl="0">
-              <a:spcBef>
-                <a:spcPts val="0"/>
-              </a:spcBef>
-              <a:buNone/>
-            </a:pPr>
-            <a:endParaRPr lang="en" dirty="0"/>
-          </a:p>
-        </p:txBody>
-      </p:sp>
-    </p:spTree>
-    <p:extLst>
-      <p:ext uri="{BB962C8B-B14F-4D97-AF65-F5344CB8AC3E}">
-        <p14:creationId xmlns:p14="http://schemas.microsoft.com/office/powerpoint/2010/main" val="2011897862"/>
-      </p:ext>
-    </p:extLst>
-  </p:cSld>
-  <p:clrMapOvr>
-    <a:masterClrMapping/>
-  </p:clrMapOvr>
-</p:notes>
-</file>
-
-<file path=ppt/notesSlides/notesSlide29.xml><?xml version="1.0" encoding="utf-8"?>
 <p:notes xmlns:a="http://schemas.openxmlformats.org/drawingml/2006/main" xmlns:r="http://schemas.openxmlformats.org/officeDocument/2006/relationships" xmlns:p="http://schemas.openxmlformats.org/presentationml/2006/main" showMasterSp="0" showMasterPhAnim="0">
   <p:cSld>
     <p:spTree>
@@ -3366,109 +3211,7 @@
 </p:notes>
 </file>
 
-<file path=ppt/notesSlides/notesSlide3.xml><?xml version="1.0" encoding="utf-8"?>
-<p:notes xmlns:a="http://schemas.openxmlformats.org/drawingml/2006/main" xmlns:r="http://schemas.openxmlformats.org/officeDocument/2006/relationships" xmlns:p="http://schemas.openxmlformats.org/presentationml/2006/main">
-  <p:cSld>
-    <p:spTree>
-      <p:nvGrpSpPr>
-        <p:cNvPr id="1" name=""/>
-        <p:cNvGrpSpPr/>
-        <p:nvPr/>
-      </p:nvGrpSpPr>
-      <p:grpSpPr>
-        <a:xfrm>
-          <a:off x="0" y="0"/>
-          <a:ext cx="0" cy="0"/>
-          <a:chOff x="0" y="0"/>
-          <a:chExt cx="0" cy="0"/>
-        </a:xfrm>
-      </p:grpSpPr>
-      <p:sp>
-        <p:nvSpPr>
-          <p:cNvPr id="2" name="Slide Image Placeholder 1"/>
-          <p:cNvSpPr>
-            <a:spLocks noGrp="1" noRot="1" noChangeAspect="1"/>
-          </p:cNvSpPr>
-          <p:nvPr>
-            <p:ph type="sldImg"/>
-          </p:nvPr>
-        </p:nvSpPr>
-        <p:spPr/>
-      </p:sp>
-      <p:sp>
-        <p:nvSpPr>
-          <p:cNvPr id="3" name="Notes Placeholder 2"/>
-          <p:cNvSpPr>
-            <a:spLocks noGrp="1"/>
-          </p:cNvSpPr>
-          <p:nvPr>
-            <p:ph type="body" idx="1"/>
-          </p:nvPr>
-        </p:nvSpPr>
-        <p:spPr/>
-        <p:txBody>
-          <a:bodyPr/>
-          <a:lstStyle/>
-          <a:p>
-            <a:r>
-              <a:rPr lang="en-US" dirty="0" smtClean="0"/>
-              <a:t>Image source: http://faganasset.com/wp-content/uploads/2015/04/stock-market-3.jpg</a:t>
-            </a:r>
-          </a:p>
-          <a:p>
-            <a:endParaRPr lang="en-US" dirty="0" smtClean="0"/>
-          </a:p>
-          <a:p>
-            <a:r>
-              <a:rPr lang="en-US" dirty="0" smtClean="0"/>
-              <a:t>Problem</a:t>
-            </a:r>
-            <a:r>
-              <a:rPr lang="en-US" baseline="0" dirty="0" smtClean="0"/>
-              <a:t> motivated by previous work in this area done using an outdated Multi-objective Genetic Algorithm (VEGA). Students tasked themselves with implementing the work done in U-NSGA-III, comparing to the results provided in the paper, and improving upon the work by performing more analysis and adding another objective function.</a:t>
-            </a:r>
-            <a:endParaRPr lang="en-US" dirty="0" smtClean="0"/>
-          </a:p>
-        </p:txBody>
-      </p:sp>
-      <p:sp>
-        <p:nvSpPr>
-          <p:cNvPr id="4" name="Slide Number Placeholder 3"/>
-          <p:cNvSpPr>
-            <a:spLocks noGrp="1"/>
-          </p:cNvSpPr>
-          <p:nvPr>
-            <p:ph type="sldNum" sz="quarter" idx="10"/>
-          </p:nvPr>
-        </p:nvSpPr>
-        <p:spPr/>
-        <p:txBody>
-          <a:bodyPr/>
-          <a:lstStyle/>
-          <a:p>
-            <a:fld id="{9A41F1D6-4599-4B85-B113-377F36F3BC98}" type="slidenum">
-              <a:rPr lang="en-US" smtClean="0"/>
-              <a:pPr/>
-              <a:t>3</a:t>
-            </a:fld>
-            <a:endParaRPr lang="en-US"/>
-          </a:p>
-        </p:txBody>
-      </p:sp>
-    </p:spTree>
-    <p:extLst>
-      <p:ext uri="{BB962C8B-B14F-4D97-AF65-F5344CB8AC3E}">
-        <p14:creationId xmlns:p14="http://schemas.microsoft.com/office/powerpoint/2010/main" val="1334582004"/>
-      </p:ext>
-    </p:extLst>
-  </p:cSld>
-  <p:clrMapOvr>
-    <a:masterClrMapping/>
-  </p:clrMapOvr>
-</p:notes>
-</file>
-
-<file path=ppt/notesSlides/notesSlide30.xml><?xml version="1.0" encoding="utf-8"?>
+<file path=ppt/notesSlides/notesSlide29.xml><?xml version="1.0" encoding="utf-8"?>
 <p:notes xmlns:a="http://schemas.openxmlformats.org/drawingml/2006/main" xmlns:r="http://schemas.openxmlformats.org/officeDocument/2006/relationships" xmlns:p="http://schemas.openxmlformats.org/presentationml/2006/main" showMasterSp="0" showMasterPhAnim="0">
   <p:cSld>
     <p:spTree>
@@ -3584,7 +3327,109 @@
 </p:notes>
 </file>
 
-<file path=ppt/notesSlides/notesSlide31.xml><?xml version="1.0" encoding="utf-8"?>
+<file path=ppt/notesSlides/notesSlide3.xml><?xml version="1.0" encoding="utf-8"?>
+<p:notes xmlns:a="http://schemas.openxmlformats.org/drawingml/2006/main" xmlns:r="http://schemas.openxmlformats.org/officeDocument/2006/relationships" xmlns:p="http://schemas.openxmlformats.org/presentationml/2006/main">
+  <p:cSld>
+    <p:spTree>
+      <p:nvGrpSpPr>
+        <p:cNvPr id="1" name=""/>
+        <p:cNvGrpSpPr/>
+        <p:nvPr/>
+      </p:nvGrpSpPr>
+      <p:grpSpPr>
+        <a:xfrm>
+          <a:off x="0" y="0"/>
+          <a:ext cx="0" cy="0"/>
+          <a:chOff x="0" y="0"/>
+          <a:chExt cx="0" cy="0"/>
+        </a:xfrm>
+      </p:grpSpPr>
+      <p:sp>
+        <p:nvSpPr>
+          <p:cNvPr id="2" name="Slide Image Placeholder 1"/>
+          <p:cNvSpPr>
+            <a:spLocks noGrp="1" noRot="1" noChangeAspect="1"/>
+          </p:cNvSpPr>
+          <p:nvPr>
+            <p:ph type="sldImg"/>
+          </p:nvPr>
+        </p:nvSpPr>
+        <p:spPr/>
+      </p:sp>
+      <p:sp>
+        <p:nvSpPr>
+          <p:cNvPr id="3" name="Notes Placeholder 2"/>
+          <p:cNvSpPr>
+            <a:spLocks noGrp="1"/>
+          </p:cNvSpPr>
+          <p:nvPr>
+            <p:ph type="body" idx="1"/>
+          </p:nvPr>
+        </p:nvSpPr>
+        <p:spPr/>
+        <p:txBody>
+          <a:bodyPr/>
+          <a:lstStyle/>
+          <a:p>
+            <a:r>
+              <a:rPr lang="en-US" dirty="0" smtClean="0"/>
+              <a:t>Image source: http://faganasset.com/wp-content/uploads/2015/04/stock-market-3.jpg</a:t>
+            </a:r>
+          </a:p>
+          <a:p>
+            <a:endParaRPr lang="en-US" dirty="0" smtClean="0"/>
+          </a:p>
+          <a:p>
+            <a:r>
+              <a:rPr lang="en-US" dirty="0" smtClean="0"/>
+              <a:t>Problem</a:t>
+            </a:r>
+            <a:r>
+              <a:rPr lang="en-US" baseline="0" dirty="0" smtClean="0"/>
+              <a:t> motivated by previous work in this area done using an outdated Multi-objective Genetic Algorithm (VEGA). Students tasked themselves with implementing the work done in U-NSGA-III, comparing to the results provided in the paper, and improving upon the work by performing more analysis and adding another objective function.</a:t>
+            </a:r>
+            <a:endParaRPr lang="en-US" dirty="0" smtClean="0"/>
+          </a:p>
+        </p:txBody>
+      </p:sp>
+      <p:sp>
+        <p:nvSpPr>
+          <p:cNvPr id="4" name="Slide Number Placeholder 3"/>
+          <p:cNvSpPr>
+            <a:spLocks noGrp="1"/>
+          </p:cNvSpPr>
+          <p:nvPr>
+            <p:ph type="sldNum" sz="quarter" idx="10"/>
+          </p:nvPr>
+        </p:nvSpPr>
+        <p:spPr/>
+        <p:txBody>
+          <a:bodyPr/>
+          <a:lstStyle/>
+          <a:p>
+            <a:fld id="{9A41F1D6-4599-4B85-B113-377F36F3BC98}" type="slidenum">
+              <a:rPr lang="en-US" smtClean="0"/>
+              <a:pPr/>
+              <a:t>3</a:t>
+            </a:fld>
+            <a:endParaRPr lang="en-US"/>
+          </a:p>
+        </p:txBody>
+      </p:sp>
+    </p:spTree>
+    <p:extLst>
+      <p:ext uri="{BB962C8B-B14F-4D97-AF65-F5344CB8AC3E}">
+        <p14:creationId xmlns:p14="http://schemas.microsoft.com/office/powerpoint/2010/main" val="1334582004"/>
+      </p:ext>
+    </p:extLst>
+  </p:cSld>
+  <p:clrMapOvr>
+    <a:masterClrMapping/>
+  </p:clrMapOvr>
+</p:notes>
+</file>
+
+<file path=ppt/notesSlides/notesSlide30.xml><?xml version="1.0" encoding="utf-8"?>
 <p:notes xmlns:a="http://schemas.openxmlformats.org/drawingml/2006/main" xmlns:r="http://schemas.openxmlformats.org/officeDocument/2006/relationships" xmlns:p="http://schemas.openxmlformats.org/presentationml/2006/main" showMasterSp="0" showMasterPhAnim="0">
   <p:cSld>
     <p:spTree>
@@ -3700,7 +3545,7 @@
 </p:notes>
 </file>
 
-<file path=ppt/notesSlides/notesSlide32.xml><?xml version="1.0" encoding="utf-8"?>
+<file path=ppt/notesSlides/notesSlide31.xml><?xml version="1.0" encoding="utf-8"?>
 <p:notes xmlns:a="http://schemas.openxmlformats.org/drawingml/2006/main" xmlns:r="http://schemas.openxmlformats.org/officeDocument/2006/relationships" xmlns:p="http://schemas.openxmlformats.org/presentationml/2006/main" showMasterSp="0" showMasterPhAnim="0">
   <p:cSld>
     <p:spTree>
@@ -15467,7 +15312,7 @@
       </p:sp>
       <p:pic>
         <p:nvPicPr>
-          <p:cNvPr id="4" name="Picture 3"/>
+          <p:cNvPr id="5" name="Picture 4"/>
           <p:cNvPicPr>
             <a:picLocks noChangeAspect="1"/>
           </p:cNvPicPr>
@@ -15487,8 +15332,98 @@
         </p:blipFill>
         <p:spPr>
           <a:xfrm>
-            <a:off x="676275" y="1446626"/>
-            <a:ext cx="7791450" cy="4591050"/>
+            <a:off x="0" y="3787015"/>
+            <a:ext cx="4506890" cy="2655649"/>
+          </a:xfrm>
+          <a:prstGeom prst="rect">
+            <a:avLst/>
+          </a:prstGeom>
+        </p:spPr>
+      </p:pic>
+      <p:pic>
+        <p:nvPicPr>
+          <p:cNvPr id="2" name="Picture 1"/>
+          <p:cNvPicPr>
+            <a:picLocks noChangeAspect="1"/>
+          </p:cNvPicPr>
+          <p:nvPr/>
+        </p:nvPicPr>
+        <p:blipFill>
+          <a:blip r:embed="rId4">
+            <a:extLst>
+              <a:ext uri="{28A0092B-C50C-407E-A947-70E740481C1C}">
+                <a14:useLocalDpi xmlns:a14="http://schemas.microsoft.com/office/drawing/2010/main" val="0"/>
+              </a:ext>
+            </a:extLst>
+          </a:blip>
+          <a:stretch>
+            <a:fillRect/>
+          </a:stretch>
+        </p:blipFill>
+        <p:spPr>
+          <a:xfrm>
+            <a:off x="4506890" y="3787015"/>
+            <a:ext cx="4615058" cy="2747058"/>
+          </a:xfrm>
+          <a:prstGeom prst="rect">
+            <a:avLst/>
+          </a:prstGeom>
+        </p:spPr>
+      </p:pic>
+      <p:pic>
+        <p:nvPicPr>
+          <p:cNvPr id="7" name="Picture 6"/>
+          <p:cNvPicPr>
+            <a:picLocks noChangeAspect="1"/>
+          </p:cNvPicPr>
+          <p:nvPr/>
+        </p:nvPicPr>
+        <p:blipFill>
+          <a:blip r:embed="rId5">
+            <a:extLst>
+              <a:ext uri="{28A0092B-C50C-407E-A947-70E740481C1C}">
+                <a14:useLocalDpi xmlns:a14="http://schemas.microsoft.com/office/drawing/2010/main" val="0"/>
+              </a:ext>
+            </a:extLst>
+          </a:blip>
+          <a:stretch>
+            <a:fillRect/>
+          </a:stretch>
+        </p:blipFill>
+        <p:spPr>
+          <a:xfrm>
+            <a:off x="0" y="1292136"/>
+            <a:ext cx="4506890" cy="2494879"/>
+          </a:xfrm>
+          <a:prstGeom prst="rect">
+            <a:avLst/>
+          </a:prstGeom>
+        </p:spPr>
+      </p:pic>
+      <p:pic>
+        <p:nvPicPr>
+          <p:cNvPr id="8" name="Picture 7"/>
+          <p:cNvPicPr>
+            <a:picLocks noChangeAspect="1"/>
+          </p:cNvPicPr>
+          <p:nvPr/>
+        </p:nvPicPr>
+        <p:blipFill>
+          <a:blip r:embed="rId6">
+            <a:extLst>
+              <a:ext uri="{28A0092B-C50C-407E-A947-70E740481C1C}">
+                <a14:useLocalDpi xmlns:a14="http://schemas.microsoft.com/office/drawing/2010/main" val="0"/>
+              </a:ext>
+            </a:extLst>
+          </a:blip>
+          <a:stretch>
+            <a:fillRect/>
+          </a:stretch>
+        </p:blipFill>
+        <p:spPr>
+          <a:xfrm>
+            <a:off x="4532449" y="1249555"/>
+            <a:ext cx="4481331" cy="2537460"/>
           </a:xfrm>
           <a:prstGeom prst="rect">
             <a:avLst/>
@@ -15498,7 +15433,7 @@
     </p:spTree>
     <p:extLst>
       <p:ext uri="{BB962C8B-B14F-4D97-AF65-F5344CB8AC3E}">
-        <p14:creationId xmlns:p14="http://schemas.microsoft.com/office/powerpoint/2010/main" val="2796561852"/>
+        <p14:creationId xmlns:p14="http://schemas.microsoft.com/office/powerpoint/2010/main" val="4091981834"/>
       </p:ext>
     </p:extLst>
   </p:cSld>
@@ -15568,145 +15503,6 @@
             </a:pPr>
             <a:r>
               <a:rPr lang="en" sz="4000" dirty="0" smtClean="0"/>
-              <a:t>Search Space/Pareto Front Analysis</a:t>
-            </a:r>
-            <a:endParaRPr lang="en" sz="4000" dirty="0"/>
-          </a:p>
-        </p:txBody>
-      </p:sp>
-      <p:pic>
-        <p:nvPicPr>
-          <p:cNvPr id="5" name="Picture 4"/>
-          <p:cNvPicPr>
-            <a:picLocks noChangeAspect="1"/>
-          </p:cNvPicPr>
-          <p:nvPr/>
-        </p:nvPicPr>
-        <p:blipFill>
-          <a:blip r:embed="rId3">
-            <a:extLst>
-              <a:ext uri="{28A0092B-C50C-407E-A947-70E740481C1C}">
-                <a14:useLocalDpi xmlns:a14="http://schemas.microsoft.com/office/drawing/2010/main" val="0"/>
-              </a:ext>
-            </a:extLst>
-          </a:blip>
-          <a:stretch>
-            <a:fillRect/>
-          </a:stretch>
-        </p:blipFill>
-        <p:spPr>
-          <a:xfrm>
-            <a:off x="0" y="3787015"/>
-            <a:ext cx="4506890" cy="2655649"/>
-          </a:xfrm>
-          <a:prstGeom prst="rect">
-            <a:avLst/>
-          </a:prstGeom>
-        </p:spPr>
-      </p:pic>
-      <p:pic>
-        <p:nvPicPr>
-          <p:cNvPr id="2" name="Picture 1"/>
-          <p:cNvPicPr>
-            <a:picLocks noChangeAspect="1"/>
-          </p:cNvPicPr>
-          <p:nvPr/>
-        </p:nvPicPr>
-        <p:blipFill>
-          <a:blip r:embed="rId4">
-            <a:extLst>
-              <a:ext uri="{28A0092B-C50C-407E-A947-70E740481C1C}">
-                <a14:useLocalDpi xmlns:a14="http://schemas.microsoft.com/office/drawing/2010/main" val="0"/>
-              </a:ext>
-            </a:extLst>
-          </a:blip>
-          <a:stretch>
-            <a:fillRect/>
-          </a:stretch>
-        </p:blipFill>
-        <p:spPr>
-          <a:xfrm>
-            <a:off x="4506890" y="3787015"/>
-            <a:ext cx="4615058" cy="2747058"/>
-          </a:xfrm>
-          <a:prstGeom prst="rect">
-            <a:avLst/>
-          </a:prstGeom>
-        </p:spPr>
-      </p:pic>
-    </p:spTree>
-    <p:extLst>
-      <p:ext uri="{BB962C8B-B14F-4D97-AF65-F5344CB8AC3E}">
-        <p14:creationId xmlns:p14="http://schemas.microsoft.com/office/powerpoint/2010/main" val="4091981834"/>
-      </p:ext>
-    </p:extLst>
-  </p:cSld>
-  <p:clrMapOvr>
-    <a:masterClrMapping/>
-  </p:clrMapOvr>
-  <p:transition spd="slow">
-    <p:cut/>
-  </p:transition>
-  <p:timing>
-    <p:tnLst>
-      <p:par>
-        <p:cTn id="1" dur="indefinite" restart="never" nodeType="tmRoot"/>
-      </p:par>
-    </p:tnLst>
-  </p:timing>
-</p:sld>
-</file>
-
-<file path=ppt/slides/slide26.xml><?xml version="1.0" encoding="utf-8"?>
-<p:sld xmlns:a="http://schemas.openxmlformats.org/drawingml/2006/main" xmlns:r="http://schemas.openxmlformats.org/officeDocument/2006/relationships" xmlns:p="http://schemas.openxmlformats.org/presentationml/2006/main">
-  <p:cSld>
-    <p:spTree>
-      <p:nvGrpSpPr>
-        <p:cNvPr id="1" name="Shape 154"/>
-        <p:cNvGrpSpPr/>
-        <p:nvPr/>
-      </p:nvGrpSpPr>
-      <p:grpSpPr>
-        <a:xfrm>
-          <a:off x="0" y="0"/>
-          <a:ext cx="0" cy="0"/>
-          <a:chOff x="0" y="0"/>
-          <a:chExt cx="0" cy="0"/>
-        </a:xfrm>
-      </p:grpSpPr>
-      <p:sp>
-        <p:nvSpPr>
-          <p:cNvPr id="155" name="Shape 155"/>
-          <p:cNvSpPr txBox="1">
-            <a:spLocks noGrp="1"/>
-          </p:cNvSpPr>
-          <p:nvPr>
-            <p:ph type="title"/>
-          </p:nvPr>
-        </p:nvSpPr>
-        <p:spPr>
-          <a:xfrm>
-            <a:off x="311701" y="593367"/>
-            <a:ext cx="8520599" cy="763599"/>
-          </a:xfrm>
-          <a:prstGeom prst="rect">
-            <a:avLst/>
-          </a:prstGeom>
-        </p:spPr>
-        <p:txBody>
-          <a:bodyPr lIns="91425" tIns="91425" rIns="91425" bIns="91425" anchor="t" anchorCtr="0">
-            <a:noAutofit/>
-          </a:bodyPr>
-          <a:lstStyle/>
-          <a:p>
-            <a:pPr algn="l">
-              <a:buClr>
-                <a:schemeClr val="dk1"/>
-              </a:buClr>
-              <a:buSzPct val="39285"/>
-            </a:pPr>
-            <a:r>
-              <a:rPr lang="en" sz="4000" dirty="0" smtClean="0"/>
               <a:t>Comparison to Buy &amp; Hold Strategy</a:t>
             </a:r>
             <a:endParaRPr lang="en" sz="4000" dirty="0"/>
@@ -15761,6 +15557,153 @@
         <p14:creationId xmlns:p14="http://schemas.microsoft.com/office/powerpoint/2010/main" val="1037680873"/>
       </p:ext>
     </p:extLst>
+  </p:cSld>
+  <p:clrMapOvr>
+    <a:masterClrMapping/>
+  </p:clrMapOvr>
+  <p:transition spd="slow">
+    <p:cut/>
+  </p:transition>
+  <p:timing>
+    <p:tnLst>
+      <p:par>
+        <p:cTn id="1" dur="indefinite" restart="never" nodeType="tmRoot"/>
+      </p:par>
+    </p:tnLst>
+  </p:timing>
+</p:sld>
+</file>
+
+<file path=ppt/slides/slide26.xml><?xml version="1.0" encoding="utf-8"?>
+<p:sld xmlns:a="http://schemas.openxmlformats.org/drawingml/2006/main" xmlns:r="http://schemas.openxmlformats.org/officeDocument/2006/relationships" xmlns:p="http://schemas.openxmlformats.org/presentationml/2006/main">
+  <p:cSld>
+    <p:spTree>
+      <p:nvGrpSpPr>
+        <p:cNvPr id="1" name="Shape 161"/>
+        <p:cNvGrpSpPr/>
+        <p:nvPr/>
+      </p:nvGrpSpPr>
+      <p:grpSpPr>
+        <a:xfrm>
+          <a:off x="0" y="0"/>
+          <a:ext cx="0" cy="0"/>
+          <a:chOff x="0" y="0"/>
+          <a:chExt cx="0" cy="0"/>
+        </a:xfrm>
+      </p:grpSpPr>
+      <p:sp>
+        <p:nvSpPr>
+          <p:cNvPr id="162" name="Shape 162"/>
+          <p:cNvSpPr txBox="1">
+            <a:spLocks noGrp="1"/>
+          </p:cNvSpPr>
+          <p:nvPr>
+            <p:ph type="title"/>
+          </p:nvPr>
+        </p:nvSpPr>
+        <p:spPr>
+          <a:xfrm>
+            <a:off x="311701" y="593367"/>
+            <a:ext cx="8520599" cy="763599"/>
+          </a:xfrm>
+          <a:prstGeom prst="rect">
+            <a:avLst/>
+          </a:prstGeom>
+        </p:spPr>
+        <p:txBody>
+          <a:bodyPr lIns="91425" tIns="91425" rIns="91425" bIns="91425" anchor="t" anchorCtr="0">
+            <a:noAutofit/>
+          </a:bodyPr>
+          <a:lstStyle/>
+          <a:p>
+            <a:pPr algn="l">
+              <a:buClr>
+                <a:schemeClr val="dk1"/>
+              </a:buClr>
+              <a:buSzPct val="39285"/>
+            </a:pPr>
+            <a:r>
+              <a:rPr lang="en" sz="4000" dirty="0"/>
+              <a:t>Limitations of the </a:t>
+            </a:r>
+            <a:r>
+              <a:rPr lang="en" sz="4000" dirty="0" smtClean="0"/>
+              <a:t>Solution</a:t>
+            </a:r>
+            <a:endParaRPr lang="en" sz="4000" dirty="0"/>
+          </a:p>
+        </p:txBody>
+      </p:sp>
+      <p:sp>
+        <p:nvSpPr>
+          <p:cNvPr id="163" name="Shape 163"/>
+          <p:cNvSpPr txBox="1">
+            <a:spLocks noGrp="1"/>
+          </p:cNvSpPr>
+          <p:nvPr>
+            <p:ph type="body" idx="1"/>
+          </p:nvPr>
+        </p:nvSpPr>
+        <p:spPr>
+          <a:xfrm>
+            <a:off x="311701" y="1536633"/>
+            <a:ext cx="8520599" cy="4555200"/>
+          </a:xfrm>
+          <a:prstGeom prst="rect">
+            <a:avLst/>
+          </a:prstGeom>
+        </p:spPr>
+        <p:txBody>
+          <a:bodyPr lIns="91425" tIns="91425" rIns="91425" bIns="91425" anchor="t" anchorCtr="0">
+            <a:noAutofit/>
+          </a:bodyPr>
+          <a:lstStyle/>
+          <a:p>
+            <a:pPr marL="457200" lvl="0" indent="-228600" rtl="0">
+              <a:spcBef>
+                <a:spcPts val="0"/>
+              </a:spcBef>
+              <a:spcAft>
+                <a:spcPts val="800"/>
+              </a:spcAft>
+              <a:buChar char="●"/>
+            </a:pPr>
+            <a:r>
+              <a:rPr lang="en" sz="2000" dirty="0" smtClean="0"/>
+              <a:t>Evolution of integer values using real-valued paramters</a:t>
+            </a:r>
+          </a:p>
+          <a:p>
+            <a:pPr marL="457200" lvl="0" indent="-228600" rtl="0">
+              <a:spcBef>
+                <a:spcPts val="0"/>
+              </a:spcBef>
+              <a:spcAft>
+                <a:spcPts val="800"/>
+              </a:spcAft>
+              <a:buChar char="●"/>
+            </a:pPr>
+            <a:r>
+              <a:rPr lang="en" sz="2000" smtClean="0"/>
+              <a:t>Potential affect of inflation on the values of the dataset</a:t>
+            </a:r>
+            <a:endParaRPr lang="en" sz="2000" dirty="0" smtClean="0"/>
+          </a:p>
+          <a:p>
+            <a:pPr marL="457200" lvl="0" indent="-228600" rtl="0">
+              <a:spcBef>
+                <a:spcPts val="0"/>
+              </a:spcBef>
+              <a:spcAft>
+                <a:spcPts val="800"/>
+              </a:spcAft>
+              <a:buChar char="●"/>
+            </a:pPr>
+            <a:endParaRPr lang="en" sz="2000" dirty="0"/>
+          </a:p>
+        </p:txBody>
+      </p:sp>
+    </p:spTree>
   </p:cSld>
   <p:clrMapOvr>
     <a:masterClrMapping/>
@@ -15827,12 +15770,8 @@
               <a:buSzPct val="39285"/>
             </a:pPr>
             <a:r>
-              <a:rPr lang="en" sz="4000" dirty="0"/>
-              <a:t>Limitations of the </a:t>
-            </a:r>
-            <a:r>
               <a:rPr lang="en" sz="4000" dirty="0" smtClean="0"/>
-              <a:t>Solution</a:t>
+              <a:t>Conclusions</a:t>
             </a:r>
             <a:endParaRPr lang="en" sz="4000" dirty="0"/>
           </a:p>
@@ -15874,149 +15813,6 @@
             </a:pPr>
             <a:r>
               <a:rPr lang="en" sz="2000" dirty="0" smtClean="0"/>
-              <a:t>Evolution of integer values using real-valued paramters</a:t>
-            </a:r>
-          </a:p>
-          <a:p>
-            <a:pPr marL="457200" lvl="0" indent="-228600" rtl="0">
-              <a:spcBef>
-                <a:spcPts val="0"/>
-              </a:spcBef>
-              <a:spcAft>
-                <a:spcPts val="800"/>
-              </a:spcAft>
-              <a:buChar char="●"/>
-            </a:pPr>
-            <a:r>
-              <a:rPr lang="en" sz="2000" smtClean="0"/>
-              <a:t>Potential affect of inflation on the values of the dataset</a:t>
-            </a:r>
-            <a:endParaRPr lang="en" sz="2000" dirty="0" smtClean="0"/>
-          </a:p>
-          <a:p>
-            <a:pPr marL="457200" lvl="0" indent="-228600" rtl="0">
-              <a:spcBef>
-                <a:spcPts val="0"/>
-              </a:spcBef>
-              <a:spcAft>
-                <a:spcPts val="800"/>
-              </a:spcAft>
-              <a:buChar char="●"/>
-            </a:pPr>
-            <a:endParaRPr lang="en" sz="2000" dirty="0"/>
-          </a:p>
-        </p:txBody>
-      </p:sp>
-    </p:spTree>
-  </p:cSld>
-  <p:clrMapOvr>
-    <a:masterClrMapping/>
-  </p:clrMapOvr>
-  <p:transition spd="slow">
-    <p:cut/>
-  </p:transition>
-  <p:timing>
-    <p:tnLst>
-      <p:par>
-        <p:cTn id="1" dur="indefinite" restart="never" nodeType="tmRoot"/>
-      </p:par>
-    </p:tnLst>
-  </p:timing>
-</p:sld>
-</file>
-
-<file path=ppt/slides/slide28.xml><?xml version="1.0" encoding="utf-8"?>
-<p:sld xmlns:a="http://schemas.openxmlformats.org/drawingml/2006/main" xmlns:r="http://schemas.openxmlformats.org/officeDocument/2006/relationships" xmlns:p="http://schemas.openxmlformats.org/presentationml/2006/main">
-  <p:cSld>
-    <p:spTree>
-      <p:nvGrpSpPr>
-        <p:cNvPr id="1" name="Shape 161"/>
-        <p:cNvGrpSpPr/>
-        <p:nvPr/>
-      </p:nvGrpSpPr>
-      <p:grpSpPr>
-        <a:xfrm>
-          <a:off x="0" y="0"/>
-          <a:ext cx="0" cy="0"/>
-          <a:chOff x="0" y="0"/>
-          <a:chExt cx="0" cy="0"/>
-        </a:xfrm>
-      </p:grpSpPr>
-      <p:sp>
-        <p:nvSpPr>
-          <p:cNvPr id="162" name="Shape 162"/>
-          <p:cNvSpPr txBox="1">
-            <a:spLocks noGrp="1"/>
-          </p:cNvSpPr>
-          <p:nvPr>
-            <p:ph type="title"/>
-          </p:nvPr>
-        </p:nvSpPr>
-        <p:spPr>
-          <a:xfrm>
-            <a:off x="311701" y="593367"/>
-            <a:ext cx="8520599" cy="763599"/>
-          </a:xfrm>
-          <a:prstGeom prst="rect">
-            <a:avLst/>
-          </a:prstGeom>
-        </p:spPr>
-        <p:txBody>
-          <a:bodyPr lIns="91425" tIns="91425" rIns="91425" bIns="91425" anchor="t" anchorCtr="0">
-            <a:noAutofit/>
-          </a:bodyPr>
-          <a:lstStyle/>
-          <a:p>
-            <a:pPr algn="l">
-              <a:buClr>
-                <a:schemeClr val="dk1"/>
-              </a:buClr>
-              <a:buSzPct val="39285"/>
-            </a:pPr>
-            <a:r>
-              <a:rPr lang="en" sz="4000" dirty="0" smtClean="0"/>
-              <a:t>Conclusions</a:t>
-            </a:r>
-            <a:endParaRPr lang="en" sz="4000" dirty="0"/>
-          </a:p>
-        </p:txBody>
-      </p:sp>
-      <p:sp>
-        <p:nvSpPr>
-          <p:cNvPr id="163" name="Shape 163"/>
-          <p:cNvSpPr txBox="1">
-            <a:spLocks noGrp="1"/>
-          </p:cNvSpPr>
-          <p:nvPr>
-            <p:ph type="body" idx="1"/>
-          </p:nvPr>
-        </p:nvSpPr>
-        <p:spPr>
-          <a:xfrm>
-            <a:off x="311701" y="1536633"/>
-            <a:ext cx="8520599" cy="4555200"/>
-          </a:xfrm>
-          <a:prstGeom prst="rect">
-            <a:avLst/>
-          </a:prstGeom>
-        </p:spPr>
-        <p:txBody>
-          <a:bodyPr lIns="91425" tIns="91425" rIns="91425" bIns="91425" anchor="t" anchorCtr="0">
-            <a:noAutofit/>
-          </a:bodyPr>
-          <a:lstStyle/>
-          <a:p>
-            <a:pPr marL="457200" lvl="0" indent="-228600" rtl="0">
-              <a:spcBef>
-                <a:spcPts val="0"/>
-              </a:spcBef>
-              <a:spcAft>
-                <a:spcPts val="800"/>
-              </a:spcAft>
-              <a:buChar char="●"/>
-            </a:pPr>
-            <a:r>
-              <a:rPr lang="en" sz="2000" dirty="0" smtClean="0"/>
               <a:t>TODO</a:t>
             </a:r>
           </a:p>
@@ -16057,7 +15853,7 @@
 </p:sld>
 </file>
 
-<file path=ppt/slides/slide29.xml><?xml version="1.0" encoding="utf-8"?>
+<file path=ppt/slides/slide28.xml><?xml version="1.0" encoding="utf-8"?>
 <p:sld xmlns:a="http://schemas.openxmlformats.org/drawingml/2006/main" xmlns:r="http://schemas.openxmlformats.org/officeDocument/2006/relationships" xmlns:p="http://schemas.openxmlformats.org/presentationml/2006/main">
   <p:cSld>
     <p:spTree>
@@ -16217,6 +16013,79 @@
             <a:r>
               <a:rPr lang="en" sz="2000" dirty="0" smtClean="0"/>
               <a:t>Research alternative objective functions to use in place of Annual Return and Sharpe Ratio</a:t>
+            </a:r>
+          </a:p>
+        </p:txBody>
+      </p:sp>
+    </p:spTree>
+  </p:cSld>
+  <p:clrMapOvr>
+    <a:masterClrMapping/>
+  </p:clrMapOvr>
+  <p:transition spd="slow">
+    <p:cut/>
+  </p:transition>
+  <p:timing>
+    <p:tnLst>
+      <p:par>
+        <p:cTn id="1" dur="indefinite" restart="never" nodeType="tmRoot"/>
+      </p:par>
+    </p:tnLst>
+  </p:timing>
+</p:sld>
+</file>
+
+<file path=ppt/slides/slide29.xml><?xml version="1.0" encoding="utf-8"?>
+<p:sld xmlns:a="http://schemas.openxmlformats.org/drawingml/2006/main" xmlns:r="http://schemas.openxmlformats.org/officeDocument/2006/relationships" xmlns:p="http://schemas.openxmlformats.org/presentationml/2006/main">
+  <p:cSld>
+    <p:spTree>
+      <p:nvGrpSpPr>
+        <p:cNvPr id="1" name="Shape 179"/>
+        <p:cNvGrpSpPr/>
+        <p:nvPr/>
+      </p:nvGrpSpPr>
+      <p:grpSpPr>
+        <a:xfrm>
+          <a:off x="0" y="0"/>
+          <a:ext cx="0" cy="0"/>
+          <a:chOff x="0" y="0"/>
+          <a:chExt cx="0" cy="0"/>
+        </a:xfrm>
+      </p:grpSpPr>
+      <p:sp>
+        <p:nvSpPr>
+          <p:cNvPr id="180" name="Shape 180"/>
+          <p:cNvSpPr txBox="1">
+            <a:spLocks noGrp="1"/>
+          </p:cNvSpPr>
+          <p:nvPr>
+            <p:ph type="title"/>
+          </p:nvPr>
+        </p:nvSpPr>
+        <p:spPr>
+          <a:xfrm>
+            <a:off x="311701" y="2867800"/>
+            <a:ext cx="8520599" cy="1122400"/>
+          </a:xfrm>
+          <a:prstGeom prst="rect">
+            <a:avLst/>
+          </a:prstGeom>
+        </p:spPr>
+        <p:txBody>
+          <a:bodyPr lIns="91425" tIns="91425" rIns="91425" bIns="91425" anchor="ctr" anchorCtr="0">
+            <a:noAutofit/>
+          </a:bodyPr>
+          <a:lstStyle/>
+          <a:p>
+            <a:pPr>
+              <a:spcBef>
+                <a:spcPts val="0"/>
+              </a:spcBef>
+              <a:buNone/>
+            </a:pPr>
+            <a:r>
+              <a:rPr lang="en" sz="4400" dirty="0"/>
+              <a:t>Questions?</a:t>
             </a:r>
           </a:p>
         </p:txBody>
@@ -16368,79 +16237,6 @@
 </file>
 
 <file path=ppt/slides/slide30.xml><?xml version="1.0" encoding="utf-8"?>
-<p:sld xmlns:a="http://schemas.openxmlformats.org/drawingml/2006/main" xmlns:r="http://schemas.openxmlformats.org/officeDocument/2006/relationships" xmlns:p="http://schemas.openxmlformats.org/presentationml/2006/main">
-  <p:cSld>
-    <p:spTree>
-      <p:nvGrpSpPr>
-        <p:cNvPr id="1" name="Shape 179"/>
-        <p:cNvGrpSpPr/>
-        <p:nvPr/>
-      </p:nvGrpSpPr>
-      <p:grpSpPr>
-        <a:xfrm>
-          <a:off x="0" y="0"/>
-          <a:ext cx="0" cy="0"/>
-          <a:chOff x="0" y="0"/>
-          <a:chExt cx="0" cy="0"/>
-        </a:xfrm>
-      </p:grpSpPr>
-      <p:sp>
-        <p:nvSpPr>
-          <p:cNvPr id="180" name="Shape 180"/>
-          <p:cNvSpPr txBox="1">
-            <a:spLocks noGrp="1"/>
-          </p:cNvSpPr>
-          <p:nvPr>
-            <p:ph type="title"/>
-          </p:nvPr>
-        </p:nvSpPr>
-        <p:spPr>
-          <a:xfrm>
-            <a:off x="311701" y="2867800"/>
-            <a:ext cx="8520599" cy="1122400"/>
-          </a:xfrm>
-          <a:prstGeom prst="rect">
-            <a:avLst/>
-          </a:prstGeom>
-        </p:spPr>
-        <p:txBody>
-          <a:bodyPr lIns="91425" tIns="91425" rIns="91425" bIns="91425" anchor="ctr" anchorCtr="0">
-            <a:noAutofit/>
-          </a:bodyPr>
-          <a:lstStyle/>
-          <a:p>
-            <a:pPr>
-              <a:spcBef>
-                <a:spcPts val="0"/>
-              </a:spcBef>
-              <a:buNone/>
-            </a:pPr>
-            <a:r>
-              <a:rPr lang="en" sz="4400" dirty="0"/>
-              <a:t>Questions?</a:t>
-            </a:r>
-          </a:p>
-        </p:txBody>
-      </p:sp>
-    </p:spTree>
-  </p:cSld>
-  <p:clrMapOvr>
-    <a:masterClrMapping/>
-  </p:clrMapOvr>
-  <p:transition spd="slow">
-    <p:cut/>
-  </p:transition>
-  <p:timing>
-    <p:tnLst>
-      <p:par>
-        <p:cTn id="1" dur="indefinite" restart="never" nodeType="tmRoot"/>
-      </p:par>
-    </p:tnLst>
-  </p:timing>
-</p:sld>
-</file>
-
-<file path=ppt/slides/slide31.xml><?xml version="1.0" encoding="utf-8"?>
 <p:sld xmlns:a="http://schemas.openxmlformats.org/drawingml/2006/main" xmlns:r="http://schemas.openxmlformats.org/officeDocument/2006/relationships" xmlns:p="http://schemas.openxmlformats.org/presentationml/2006/main" show="0">
   <p:cSld>
     <p:spTree>
@@ -16581,7 +16377,7 @@
 </p:sld>
 </file>
 
-<file path=ppt/slides/slide32.xml><?xml version="1.0" encoding="utf-8"?>
+<file path=ppt/slides/slide31.xml><?xml version="1.0" encoding="utf-8"?>
 <p:sld xmlns:a="http://schemas.openxmlformats.org/drawingml/2006/main" xmlns:r="http://schemas.openxmlformats.org/officeDocument/2006/relationships" xmlns:p="http://schemas.openxmlformats.org/presentationml/2006/main" show="0">
   <p:cSld>
     <p:spTree>

</xml_diff>

<commit_message>
Adding an initial version of a file to do all summary statistics for us. Still working on this.
</commit_message>
<xml_diff>
--- a/CSE848_Hormasji_Reiff_ProjectPresentation.pptx
+++ b/CSE848_Hormasji_Reiff_ProjectPresentation.pptx
@@ -282,7 +282,7 @@
             <a:fld id="{3DF477A2-2853-4D73-8D65-65AEF76BBBA8}" type="datetimeFigureOut">
               <a:rPr lang="en-US" smtClean="0"/>
               <a:pPr/>
-              <a:t>12/5/2015</a:t>
+              <a:t>12/6/2015</a:t>
             </a:fld>
             <a:endParaRPr lang="en-US"/>
           </a:p>
@@ -2720,11 +2720,7 @@
             </a:pPr>
             <a:r>
               <a:rPr lang="en" dirty="0" smtClean="0"/>
-              <a:t>Motivation</a:t>
-            </a:r>
-            <a:r>
-              <a:rPr lang="en" dirty="0" smtClean="0"/>
-              <a:t>:</a:t>
+              <a:t>Motivation:</a:t>
             </a:r>
             <a:r>
               <a:rPr lang="en" baseline="0" dirty="0" smtClean="0"/>
@@ -4598,7 +4594,7 @@
               <a:pPr>
                 <a:defRPr/>
               </a:pPr>
-              <a:t>12/5/2015</a:t>
+              <a:t>12/6/2015</a:t>
             </a:fld>
             <a:endParaRPr lang="en-US"/>
           </a:p>
@@ -4927,7 +4923,7 @@
               <a:pPr>
                 <a:defRPr/>
               </a:pPr>
-              <a:t>12/5/2015</a:t>
+              <a:t>12/6/2015</a:t>
             </a:fld>
             <a:endParaRPr lang="en-US"/>
           </a:p>
@@ -5265,7 +5261,7 @@
               <a:pPr>
                 <a:defRPr/>
               </a:pPr>
-              <a:t>12/5/2015</a:t>
+              <a:t>12/6/2015</a:t>
             </a:fld>
             <a:endParaRPr lang="en-US"/>
           </a:p>
@@ -5733,7 +5729,7 @@
               <a:pPr>
                 <a:defRPr/>
               </a:pPr>
-              <a:t>12/5/2015</a:t>
+              <a:t>12/6/2015</a:t>
             </a:fld>
             <a:endParaRPr lang="en-US"/>
           </a:p>
@@ -6071,7 +6067,7 @@
               <a:pPr>
                 <a:defRPr/>
               </a:pPr>
-              <a:t>12/5/2015</a:t>
+              <a:t>12/6/2015</a:t>
             </a:fld>
             <a:endParaRPr lang="en-US"/>
           </a:p>
@@ -7078,7 +7074,7 @@
               <a:pPr>
                 <a:defRPr/>
               </a:pPr>
-              <a:t>12/5/2015</a:t>
+              <a:t>12/6/2015</a:t>
             </a:fld>
             <a:endParaRPr lang="en-US" dirty="0"/>
           </a:p>
@@ -8006,7 +8002,11 @@
             </a:pPr>
             <a:r>
               <a:rPr lang="en" sz="4000" dirty="0" smtClean="0"/>
-              <a:t>Indicators [2]</a:t>
+              <a:t>Indicators </a:t>
+            </a:r>
+            <a:r>
+              <a:rPr lang="en" sz="4000" dirty="0" smtClean="0"/>
+              <a:t>[5]</a:t>
             </a:r>
             <a:endParaRPr lang="en" sz="4000" dirty="0"/>
           </a:p>
@@ -11296,14 +11296,14 @@
           <p:nvPr>
             <p:extLst>
               <p:ext uri="{D42A27DB-BD31-4B8C-83A1-F6EECF244321}">
-                <p14:modId xmlns:p14="http://schemas.microsoft.com/office/powerpoint/2010/main" val="1633338605"/>
+                <p14:modId xmlns:p14="http://schemas.microsoft.com/office/powerpoint/2010/main" val="221664738"/>
               </p:ext>
             </p:extLst>
           </p:nvPr>
         </p:nvGraphicFramePr>
         <p:xfrm>
           <a:off x="1854835" y="2133599"/>
-          <a:ext cx="5434330" cy="2519046"/>
+          <a:ext cx="5434330" cy="2937145"/>
         </p:xfrm>
         <a:graphic>
           <a:graphicData uri="http://schemas.openxmlformats.org/drawingml/2006/table">
@@ -11442,12 +11442,18 @@
                     <a:p>
                       <a:pPr algn="l" rtl="0" fontAlgn="ctr"/>
                       <a:r>
-                        <a:rPr lang="en-US" sz="2000" u="none" strike="noStrike">
-                          <a:effectLst/>
-                        </a:rPr>
-                        <a:t>800</a:t>
-                      </a:r>
-                      <a:endParaRPr lang="en-US" sz="2000" b="0" i="0" u="none" strike="noStrike">
+                        <a:rPr lang="en-US" sz="2000" u="none" strike="noStrike" dirty="0">
+                          <a:effectLst/>
+                        </a:rPr>
+                        <a:t>5</a:t>
+                      </a:r>
+                      <a:r>
+                        <a:rPr lang="en-US" sz="2000" u="none" strike="noStrike" dirty="0" smtClean="0">
+                          <a:effectLst/>
+                        </a:rPr>
+                        <a:t>00</a:t>
+                      </a:r>
+                      <a:endParaRPr lang="en-US" sz="2000" b="0" i="0" u="none" strike="noStrike" dirty="0">
                         <a:solidFill>
                           <a:srgbClr val="000000"/>
                         </a:solidFill>
@@ -11490,12 +11496,18 @@
                     <a:p>
                       <a:pPr algn="l" rtl="0" fontAlgn="ctr"/>
                       <a:r>
-                        <a:rPr lang="en-US" sz="2000" u="none" strike="noStrike">
-                          <a:effectLst/>
-                        </a:rPr>
-                        <a:t>799</a:t>
-                      </a:r>
-                      <a:endParaRPr lang="en-US" sz="2000" b="0" i="0" u="none" strike="noStrike">
+                        <a:rPr lang="en-US" sz="2000" u="none" strike="noStrike" dirty="0">
+                          <a:effectLst/>
+                        </a:rPr>
+                        <a:t>4</a:t>
+                      </a:r>
+                      <a:r>
+                        <a:rPr lang="en-US" sz="2000" u="none" strike="noStrike" dirty="0" smtClean="0">
+                          <a:effectLst/>
+                        </a:rPr>
+                        <a:t>99</a:t>
+                      </a:r>
+                      <a:endParaRPr lang="en-US" sz="2000" b="0" i="0" u="none" strike="noStrike" dirty="0">
                         <a:solidFill>
                           <a:srgbClr val="000000"/>
                         </a:solidFill>
@@ -11590,6 +11602,72 @@
                           <a:effectLst/>
                         </a:rPr>
                         <a:t>0.05</a:t>
+                      </a:r>
+                      <a:endParaRPr lang="en-US" sz="2000" b="0" i="0" u="none" strike="noStrike" dirty="0">
+                        <a:solidFill>
+                          <a:srgbClr val="000000"/>
+                        </a:solidFill>
+                        <a:effectLst/>
+                        <a:latin typeface="Calibri" panose="020F0502020204030204" pitchFamily="34" charset="0"/>
+                      </a:endParaRPr>
+                    </a:p>
+                  </a:txBody>
+                  <a:tcPr marL="7620" marR="7620" marT="7620" marB="0" anchor="ctr"/>
+                </a:tc>
+              </a:tr>
+              <a:tr h="418099">
+                <a:tc>
+                  <a:txBody>
+                    <a:bodyPr/>
+                    <a:lstStyle/>
+                    <a:p>
+                      <a:pPr algn="l" rtl="0" fontAlgn="ctr"/>
+                      <a:r>
+                        <a:rPr lang="en-US" sz="2000" b="0" i="0" u="none" strike="noStrike" dirty="0" smtClean="0">
+                          <a:solidFill>
+                            <a:srgbClr val="000000"/>
+                          </a:solidFill>
+                          <a:effectLst/>
+                          <a:latin typeface="Calibri" panose="020F0502020204030204" pitchFamily="34" charset="0"/>
+                        </a:rPr>
+                        <a:t>Number</a:t>
+                      </a:r>
+                      <a:r>
+                        <a:rPr lang="en-US" sz="2000" b="0" i="0" u="none" strike="noStrike" baseline="0" dirty="0" smtClean="0">
+                          <a:solidFill>
+                            <a:srgbClr val="000000"/>
+                          </a:solidFill>
+                          <a:effectLst/>
+                          <a:latin typeface="Calibri" panose="020F0502020204030204" pitchFamily="34" charset="0"/>
+                        </a:rPr>
+                        <a:t> of Runs</a:t>
+                      </a:r>
+                      <a:endParaRPr lang="en-US" sz="2000" b="0" i="0" u="none" strike="noStrike" dirty="0">
+                        <a:solidFill>
+                          <a:srgbClr val="000000"/>
+                        </a:solidFill>
+                        <a:effectLst/>
+                        <a:latin typeface="Calibri" panose="020F0502020204030204" pitchFamily="34" charset="0"/>
+                      </a:endParaRPr>
+                    </a:p>
+                  </a:txBody>
+                  <a:tcPr marL="7620" marR="7620" marT="7620" marB="0" anchor="ctr"/>
+                </a:tc>
+                <a:tc>
+                  <a:txBody>
+                    <a:bodyPr/>
+                    <a:lstStyle/>
+                    <a:p>
+                      <a:pPr algn="l" rtl="0" fontAlgn="ctr"/>
+                      <a:r>
+                        <a:rPr lang="en-US" sz="2000" b="0" i="0" u="none" strike="noStrike" smtClean="0">
+                          <a:solidFill>
+                            <a:srgbClr val="000000"/>
+                          </a:solidFill>
+                          <a:effectLst/>
+                          <a:latin typeface="Calibri" panose="020F0502020204030204" pitchFamily="34" charset="0"/>
+                        </a:rPr>
+                        <a:t>20</a:t>
                       </a:r>
                       <a:endParaRPr lang="en-US" sz="2000" b="0" i="0" u="none" strike="noStrike" dirty="0">
                         <a:solidFill>
@@ -16316,6 +16394,58 @@
           </a:bodyPr>
           <a:lstStyle/>
           <a:p>
+            <a:pPr>
+              <a:spcAft>
+                <a:spcPts val="800"/>
+              </a:spcAft>
+              <a:buNone/>
+            </a:pPr>
+            <a:r>
+              <a:rPr lang="en" sz="2000" dirty="0" smtClean="0"/>
+              <a:t>[1] </a:t>
+            </a:r>
+            <a:r>
+              <a:rPr lang="en" sz="2000" dirty="0"/>
+              <a:t>H. Jain and K. Deb. An Evolutionary Many-Objective Optimization Algorithm Using Reference-point Based Non-dominated Sorting Approach, Part II: Handling Constraints and Extending to an Adaptive Approach. </a:t>
+            </a:r>
+          </a:p>
+          <a:p>
+            <a:pPr>
+              <a:spcAft>
+                <a:spcPts val="800"/>
+              </a:spcAft>
+              <a:buNone/>
+            </a:pPr>
+            <a:r>
+              <a:rPr lang="en" sz="2000" dirty="0" smtClean="0"/>
+              <a:t>[2] </a:t>
+            </a:r>
+            <a:r>
+              <a:rPr lang="en" sz="2000" dirty="0"/>
+              <a:t>H. Seada and K. Deb. Effect of Selection Operator on NSGA-III in Single, Multi, and Many-Objective Optimization</a:t>
+            </a:r>
+            <a:r>
+              <a:rPr lang="en" sz="2000" dirty="0" smtClean="0"/>
+              <a:t>.</a:t>
+            </a:r>
+          </a:p>
+          <a:p>
+            <a:pPr>
+              <a:spcAft>
+                <a:spcPts val="800"/>
+              </a:spcAft>
+              <a:buNone/>
+            </a:pPr>
+            <a:r>
+              <a:rPr lang="en" sz="2000" dirty="0" smtClean="0"/>
+              <a:t>[3] </a:t>
+            </a:r>
+            <a:r>
+              <a:rPr lang="en" sz="2000" dirty="0"/>
+              <a:t>K. Deb. An Evolutionary Many-Objective Optimization Algorithm Using Reference-point Based Non-dominated Sorting Approach, Part I: Solving Problems with Box Constraints.</a:t>
+            </a:r>
+          </a:p>
+          <a:p>
             <a:pPr rtl="0">
               <a:spcBef>
                 <a:spcPts val="0"/>
@@ -16325,37 +16455,7 @@
               </a:spcAft>
               <a:buNone/>
             </a:pPr>
-            <a:r>
-              <a:rPr lang="en" sz="2000" dirty="0"/>
-              <a:t>[1</a:t>
-            </a:r>
-            <a:r>
-              <a:rPr lang="en" sz="2000" dirty="0" smtClean="0"/>
-              <a:t>] N. Srinivas and K. Deb. Multiobjective Optimization Using Nondominated Sorting in Genetic Algorithms. </a:t>
-            </a:r>
-          </a:p>
-          <a:p>
-            <a:pPr rtl="0">
-              <a:spcBef>
-                <a:spcPts val="0"/>
-              </a:spcBef>
-              <a:spcAft>
-                <a:spcPts val="800"/>
-              </a:spcAft>
-              <a:buNone/>
-            </a:pPr>
-            <a:r>
-              <a:rPr lang="en" sz="2000" dirty="0" smtClean="0"/>
-              <a:t>[2] M.B. Fayek, H.M. El-Boghdadi, and S.M. Omran. Multi-Objective Optimization of Technical Stock Market Indicators using G</a:t>
-            </a:r>
-            <a:r>
-              <a:rPr lang="en-US" sz="2000" dirty="0"/>
-              <a:t>A</a:t>
-            </a:r>
-            <a:r>
-              <a:rPr lang="en" sz="2000" dirty="0" smtClean="0"/>
-              <a:t>s.</a:t>
-            </a:r>
+            <a:endParaRPr lang="en" sz="2000" dirty="0" smtClean="0"/>
           </a:p>
         </p:txBody>
       </p:sp>
@@ -16465,12 +16565,73 @@
             </a:pPr>
             <a:r>
               <a:rPr lang="en" sz="2000" dirty="0"/>
-              <a:t>[</a:t>
+              <a:t>[4] K. Deb. A Fast and Elitist, Multiobjective Genetic Algorithm: NSGA-II</a:t>
             </a:r>
             <a:r>
               <a:rPr lang="en" sz="2000" dirty="0" smtClean="0"/>
-              <a:t>5]</a:t>
-            </a:r>
+              <a:t>.</a:t>
+            </a:r>
+          </a:p>
+          <a:p>
+            <a:pPr>
+              <a:spcAft>
+                <a:spcPts val="800"/>
+              </a:spcAft>
+              <a:buNone/>
+            </a:pPr>
+            <a:r>
+              <a:rPr lang="en" sz="2000" dirty="0" smtClean="0"/>
+              <a:t>[5] </a:t>
+            </a:r>
+            <a:r>
+              <a:rPr lang="en" sz="2000" dirty="0"/>
+              <a:t>M.B. Fayek, H.M. El-Boghdadi, and S.M. Omran. Multi-Objective Optimization of Technical Stock Market Indicators using G</a:t>
+            </a:r>
+            <a:r>
+              <a:rPr lang="en-US" sz="2000" dirty="0"/>
+              <a:t>A</a:t>
+            </a:r>
+            <a:r>
+              <a:rPr lang="en" sz="2000" dirty="0"/>
+              <a:t>s</a:t>
+            </a:r>
+            <a:r>
+              <a:rPr lang="en" sz="2000" dirty="0" smtClean="0"/>
+              <a:t>.</a:t>
+            </a:r>
+          </a:p>
+          <a:p>
+            <a:pPr>
+              <a:spcAft>
+                <a:spcPts val="800"/>
+              </a:spcAft>
+              <a:buNone/>
+            </a:pPr>
+            <a:r>
+              <a:rPr lang="en" sz="2000" dirty="0" smtClean="0"/>
+              <a:t>[6] </a:t>
+            </a:r>
+            <a:r>
+              <a:rPr lang="en" sz="2000" dirty="0"/>
+              <a:t>N. Srinivas and K. Deb. Multiobjective Optimization Using Nondominated Sorting in Genetic Algorithms. </a:t>
+            </a:r>
+          </a:p>
+          <a:p>
+            <a:pPr>
+              <a:spcAft>
+                <a:spcPts val="800"/>
+              </a:spcAft>
+              <a:buNone/>
+            </a:pPr>
+            <a:endParaRPr lang="en" sz="2000" dirty="0"/>
+          </a:p>
+          <a:p>
+            <a:pPr>
+              <a:spcAft>
+                <a:spcPts val="800"/>
+              </a:spcAft>
+              <a:buNone/>
+            </a:pPr>
             <a:endParaRPr lang="en" sz="2000" dirty="0"/>
           </a:p>
         </p:txBody>
@@ -16598,7 +16759,11 @@
             <a:pPr algn="l"/>
             <a:r>
               <a:rPr lang="en-US" sz="4000" dirty="0" smtClean="0"/>
-              <a:t>Why Use Multi-Objective Algorithms? [1]</a:t>
+              <a:t>Why Use Multi-Objective Algorithms? </a:t>
+            </a:r>
+            <a:r>
+              <a:rPr lang="en-US" sz="4000" dirty="0" smtClean="0"/>
+              <a:t>[6]</a:t>
             </a:r>
             <a:endParaRPr lang="en-US" sz="4000" dirty="0"/>
           </a:p>
@@ -16729,7 +16894,11 @@
             <a:pPr algn="l"/>
             <a:r>
               <a:rPr lang="en" sz="4000" dirty="0" smtClean="0"/>
-              <a:t>Terminology [1]</a:t>
+              <a:t>Terminology </a:t>
+            </a:r>
+            <a:r>
+              <a:rPr lang="en" sz="4000" dirty="0" smtClean="0"/>
+              <a:t>[6]</a:t>
             </a:r>
             <a:endParaRPr lang="en" sz="4000" dirty="0"/>
           </a:p>

</xml_diff>

<commit_message>
Updating the presentation with all of my changes.
</commit_message>
<xml_diff>
--- a/CSE848_Hormasji_Reiff_ProjectPresentation.pptx
+++ b/CSE848_Hormasji_Reiff_ProjectPresentation.pptx
@@ -251,7 +251,7 @@
             </a:lvl1pPr>
           </a:lstStyle>
           <a:p>
-            <a:endParaRPr lang="en-US"/>
+            <a:endParaRPr lang="en-US" dirty="0"/>
           </a:p>
         </p:txBody>
       </p:sp>
@@ -287,7 +287,7 @@
               <a:pPr/>
               <a:t>12/7/2015</a:t>
             </a:fld>
-            <a:endParaRPr lang="en-US"/>
+            <a:endParaRPr lang="en-US" dirty="0"/>
           </a:p>
         </p:txBody>
       </p:sp>
@@ -320,7 +320,7 @@
           <a:bodyPr vert="horz" lIns="91440" tIns="45720" rIns="91440" bIns="45720" rtlCol="0" anchor="ctr"/>
           <a:lstStyle/>
           <a:p>
-            <a:endParaRPr lang="en-US"/>
+            <a:endParaRPr lang="en-US" dirty="0"/>
           </a:p>
         </p:txBody>
       </p:sp>
@@ -411,7 +411,7 @@
             </a:lvl1pPr>
           </a:lstStyle>
           <a:p>
-            <a:endParaRPr lang="en-US"/>
+            <a:endParaRPr lang="en-US" dirty="0"/>
           </a:p>
         </p:txBody>
       </p:sp>
@@ -447,7 +447,7 @@
               <a:pPr/>
               <a:t>‹#›</a:t>
             </a:fld>
-            <a:endParaRPr lang="en-US"/>
+            <a:endParaRPr lang="en-US" dirty="0"/>
           </a:p>
         </p:txBody>
       </p:sp>
@@ -653,7 +653,7 @@
               </a:spcBef>
               <a:buNone/>
             </a:pPr>
-            <a:endParaRPr/>
+            <a:endParaRPr dirty="0"/>
           </a:p>
         </p:txBody>
       </p:sp>
@@ -1136,23 +1136,7 @@
             </a:r>
             <a:r>
               <a:rPr lang="en-US" baseline="0" dirty="0" smtClean="0"/>
-              <a:t> details: using U-NSGA-III written in Java by </a:t>
-            </a:r>
-            <a:r>
-              <a:rPr lang="en-US" baseline="0" dirty="0" err="1" smtClean="0"/>
-              <a:t>Haitham</a:t>
-            </a:r>
-            <a:r>
-              <a:rPr lang="en-US" baseline="0" dirty="0" smtClean="0"/>
-              <a:t> </a:t>
-            </a:r>
-            <a:r>
-              <a:rPr lang="en-US" baseline="0" dirty="0" err="1" smtClean="0"/>
-              <a:t>Seada</a:t>
-            </a:r>
-            <a:r>
-              <a:rPr lang="en-US" baseline="0" dirty="0" smtClean="0"/>
-              <a:t> in collaboration with Professor Deb</a:t>
+              <a:t> details: using U-NSGA-III written in Java by Haitham Seada in collaboration with Professor Deb</a:t>
             </a:r>
           </a:p>
           <a:p>
@@ -1207,7 +1191,7 @@
               <a:pPr/>
               <a:t>13</a:t>
             </a:fld>
-            <a:endParaRPr lang="en-US"/>
+            <a:endParaRPr lang="en-US" dirty="0"/>
           </a:p>
         </p:txBody>
       </p:sp>
@@ -1984,23 +1968,7 @@
             </a:r>
             <a:r>
               <a:rPr lang="en-US" baseline="0" dirty="0" smtClean="0"/>
-              <a:t> details: using U-NSGA-III written in Java by </a:t>
-            </a:r>
-            <a:r>
-              <a:rPr lang="en-US" baseline="0" dirty="0" err="1" smtClean="0"/>
-              <a:t>Haitham</a:t>
-            </a:r>
-            <a:r>
-              <a:rPr lang="en-US" baseline="0" dirty="0" smtClean="0"/>
-              <a:t> </a:t>
-            </a:r>
-            <a:r>
-              <a:rPr lang="en-US" baseline="0" dirty="0" err="1" smtClean="0"/>
-              <a:t>Seada</a:t>
-            </a:r>
-            <a:r>
-              <a:rPr lang="en-US" baseline="0" dirty="0" smtClean="0"/>
-              <a:t> in collaboration with Professor Deb</a:t>
+              <a:t> details: using U-NSGA-III written in Java by Haitham Seada in collaboration with Professor Deb</a:t>
             </a:r>
           </a:p>
           <a:p>
@@ -2898,7 +2866,7 @@
               <a:rPr lang="en" baseline="0" dirty="0" smtClean="0">
                 <a:sym typeface="Wingdings" panose="05000000000000000000" pitchFamily="2" charset="2"/>
               </a:rPr>
-              <a:t> provides multiple options to the decision maker</a:t>
+              <a:t> wide range of values contributing to the various objective function alternatives</a:t>
             </a:r>
             <a:endParaRPr lang="en" baseline="0" dirty="0" smtClean="0"/>
           </a:p>
@@ -2925,8 +2893,36 @@
             </a:pPr>
             <a:r>
               <a:rPr lang="en" baseline="0" dirty="0" smtClean="0"/>
-              <a:t>Many averages not directly at the midpoint of the range, showing convergence of individuals to a value</a:t>
-            </a:r>
+              <a:t>Many averages not directly at the midpoint of the range, showing convergence of individuals to a </a:t>
+            </a:r>
+            <a:r>
+              <a:rPr lang="en" baseline="0" dirty="0" smtClean="0"/>
+              <a:t>value</a:t>
+            </a:r>
+          </a:p>
+          <a:p>
+            <a:pPr marL="171450" indent="-171450" rtl="0">
+              <a:spcBef>
+                <a:spcPts val="0"/>
+              </a:spcBef>
+              <a:buFont typeface="Arial" panose="020B0604020202020204" pitchFamily="34" charset="0"/>
+              <a:buChar char="•"/>
+            </a:pPr>
+            <a:endParaRPr lang="en" baseline="0" dirty="0" smtClean="0"/>
+          </a:p>
+          <a:p>
+            <a:pPr marL="0" indent="0" rtl="0">
+              <a:spcBef>
+                <a:spcPts val="0"/>
+              </a:spcBef>
+              <a:buFont typeface="Arial" panose="020B0604020202020204" pitchFamily="34" charset="0"/>
+              <a:buNone/>
+            </a:pPr>
+            <a:r>
+              <a:rPr lang="en" baseline="0" dirty="0" smtClean="0"/>
+              <a:t>Looking for a better way to summarize the data!</a:t>
+            </a:r>
+            <a:endParaRPr lang="en" baseline="0" dirty="0" smtClean="0"/>
           </a:p>
         </p:txBody>
       </p:sp>
@@ -3721,6 +3717,153 @@
               <a:t>Objective 1 and Objective 3 may be correlated because as one increases, so does the other (similar phenomenon not seen for Objective 2 and Objective 3)</a:t>
             </a:r>
           </a:p>
+          <a:p>
+            <a:pPr marL="171450" indent="-171450" rtl="0">
+              <a:spcBef>
+                <a:spcPts val="0"/>
+              </a:spcBef>
+              <a:buFont typeface="Arial" panose="020B0604020202020204" pitchFamily="34" charset="0"/>
+              <a:buChar char="•"/>
+            </a:pPr>
+            <a:endParaRPr lang="en" baseline="0" dirty="0" smtClean="0"/>
+          </a:p>
+          <a:p>
+            <a:pPr rtl="0" eaLnBrk="1" fontAlgn="b" latinLnBrk="0" hangingPunct="1"/>
+            <a:r>
+              <a:rPr lang="en" baseline="0" dirty="0" smtClean="0"/>
+              <a:t>Statistics versus: </a:t>
+            </a:r>
+            <a:r>
+              <a:rPr lang="en-US" sz="1200" b="1" i="0" u="none" strike="noStrike" kern="1200" dirty="0" smtClean="0">
+                <a:solidFill>
+                  <a:schemeClr val="tx1"/>
+                </a:solidFill>
+                <a:effectLst/>
+                <a:latin typeface="+mn-lt"/>
+                <a:ea typeface="+mn-ea"/>
+                <a:cs typeface="+mn-cs"/>
+              </a:rPr>
+              <a:t> </a:t>
+            </a:r>
+            <a:r>
+              <a:rPr lang="en-US" sz="1200" b="0" i="0" u="none" strike="noStrike" kern="1200" dirty="0" smtClean="0">
+                <a:solidFill>
+                  <a:schemeClr val="tx1"/>
+                </a:solidFill>
+                <a:effectLst/>
+                <a:latin typeface="+mn-lt"/>
+                <a:ea typeface="+mn-ea"/>
+                <a:cs typeface="+mn-cs"/>
+              </a:rPr>
+              <a:t>12.4389%,</a:t>
+            </a:r>
+            <a:r>
+              <a:rPr lang="en-US" sz="1200" b="0" i="0" u="none" strike="noStrike" kern="1200" baseline="0" dirty="0" smtClean="0">
+                <a:solidFill>
+                  <a:schemeClr val="tx1"/>
+                </a:solidFill>
+                <a:effectLst/>
+                <a:latin typeface="+mn-lt"/>
+                <a:ea typeface="+mn-ea"/>
+                <a:cs typeface="+mn-cs"/>
+              </a:rPr>
+              <a:t> </a:t>
+            </a:r>
+            <a:r>
+              <a:rPr lang="en-US" sz="1200" b="0" i="0" u="none" strike="noStrike" kern="1200" dirty="0" smtClean="0">
+                <a:solidFill>
+                  <a:schemeClr val="tx1"/>
+                </a:solidFill>
+                <a:effectLst/>
+                <a:latin typeface="+mn-lt"/>
+                <a:ea typeface="+mn-ea"/>
+                <a:cs typeface="+mn-cs"/>
+              </a:rPr>
+              <a:t>0.8436%</a:t>
+            </a:r>
+            <a:r>
+              <a:rPr lang="en-US" sz="1200" b="0" i="0" u="none" strike="noStrike" kern="1200" baseline="0" dirty="0" smtClean="0">
+                <a:solidFill>
+                  <a:schemeClr val="tx1"/>
+                </a:solidFill>
+                <a:effectLst/>
+                <a:latin typeface="+mn-lt"/>
+                <a:ea typeface="+mn-ea"/>
+                <a:cs typeface="+mn-cs"/>
+              </a:rPr>
+              <a:t>, </a:t>
+            </a:r>
+            <a:r>
+              <a:rPr lang="en-US" sz="1200" b="0" i="0" u="none" strike="noStrike" kern="1200" dirty="0" smtClean="0">
+                <a:solidFill>
+                  <a:schemeClr val="tx1"/>
+                </a:solidFill>
+                <a:effectLst/>
+                <a:latin typeface="+mn-lt"/>
+                <a:ea typeface="+mn-ea"/>
+                <a:cs typeface="+mn-cs"/>
+              </a:rPr>
+              <a:t>31.8321%; 1.3536,</a:t>
+            </a:r>
+            <a:r>
+              <a:rPr lang="en-US" sz="1200" b="0" i="0" u="none" strike="noStrike" kern="1200" baseline="0" dirty="0" smtClean="0">
+                <a:solidFill>
+                  <a:schemeClr val="tx1"/>
+                </a:solidFill>
+                <a:effectLst/>
+                <a:latin typeface="+mn-lt"/>
+                <a:ea typeface="+mn-ea"/>
+                <a:cs typeface="+mn-cs"/>
+              </a:rPr>
+              <a:t> </a:t>
+            </a:r>
+            <a:r>
+              <a:rPr lang="en-US" sz="1200" b="0" i="0" u="none" strike="noStrike" kern="1200" dirty="0" smtClean="0">
+                <a:solidFill>
+                  <a:schemeClr val="tx1"/>
+                </a:solidFill>
+                <a:effectLst/>
+                <a:latin typeface="+mn-lt"/>
+                <a:ea typeface="+mn-ea"/>
+                <a:cs typeface="+mn-cs"/>
+              </a:rPr>
+              <a:t>0.6838,</a:t>
+            </a:r>
+            <a:r>
+              <a:rPr lang="en-US" sz="1200" b="0" i="0" u="none" strike="noStrike" kern="1200" baseline="0" dirty="0" smtClean="0">
+                <a:solidFill>
+                  <a:schemeClr val="tx1"/>
+                </a:solidFill>
+                <a:effectLst/>
+                <a:latin typeface="+mn-lt"/>
+                <a:ea typeface="+mn-ea"/>
+                <a:cs typeface="+mn-cs"/>
+              </a:rPr>
+              <a:t> </a:t>
+            </a:r>
+            <a:r>
+              <a:rPr lang="en-US" sz="1200" b="0" i="0" u="none" strike="noStrike" kern="1200" dirty="0" smtClean="0">
+                <a:solidFill>
+                  <a:schemeClr val="tx1"/>
+                </a:solidFill>
+                <a:effectLst/>
+                <a:latin typeface="+mn-lt"/>
+                <a:ea typeface="+mn-ea"/>
+                <a:cs typeface="+mn-cs"/>
+              </a:rPr>
+              <a:t>3.044</a:t>
+            </a:r>
+          </a:p>
+          <a:p>
+            <a:pPr marL="0" indent="0" rtl="0">
+              <a:spcBef>
+                <a:spcPts val="0"/>
+              </a:spcBef>
+              <a:buFont typeface="Arial" panose="020B0604020202020204" pitchFamily="34" charset="0"/>
+              <a:buNone/>
+            </a:pPr>
+            <a:endParaRPr lang="en" baseline="0" dirty="0" smtClean="0"/>
+          </a:p>
         </p:txBody>
       </p:sp>
     </p:spTree>
@@ -3937,7 +4080,7 @@
               <a:pPr/>
               <a:t>3</a:t>
             </a:fld>
-            <a:endParaRPr lang="en-US"/>
+            <a:endParaRPr lang="en-US" dirty="0"/>
           </a:p>
         </p:txBody>
       </p:sp>
@@ -4047,12 +4190,47 @@
           </a:bodyPr>
           <a:lstStyle/>
           <a:p>
-            <a:pPr rtl="0">
+            <a:pPr marL="171450" indent="-171450" rtl="0">
               <a:spcBef>
                 <a:spcPts val="0"/>
               </a:spcBef>
-              <a:buNone/>
+              <a:buFont typeface="Arial" panose="020B0604020202020204" pitchFamily="34" charset="0"/>
+              <a:buChar char="•"/>
             </a:pPr>
+            <a:r>
+              <a:rPr lang="en" dirty="0" smtClean="0"/>
+              <a:t>Bullet #1a:</a:t>
+            </a:r>
+            <a:r>
+              <a:rPr lang="en" baseline="0" dirty="0" smtClean="0"/>
+              <a:t> the search space produced an unexpected front of alternatives</a:t>
+            </a:r>
+          </a:p>
+          <a:p>
+            <a:pPr marL="171450" indent="-171450" rtl="0">
+              <a:spcBef>
+                <a:spcPts val="0"/>
+              </a:spcBef>
+              <a:buFont typeface="Arial" panose="020B0604020202020204" pitchFamily="34" charset="0"/>
+              <a:buChar char="•"/>
+            </a:pPr>
+            <a:r>
+              <a:rPr lang="en" baseline="0" dirty="0" smtClean="0"/>
+              <a:t>Bullet #2a: (as showed in comparison to the Day Trading strategy)</a:t>
+            </a:r>
+          </a:p>
+          <a:p>
+            <a:pPr marL="171450" indent="-171450" rtl="0">
+              <a:spcBef>
+                <a:spcPts val="0"/>
+              </a:spcBef>
+              <a:buFont typeface="Arial" panose="020B0604020202020204" pitchFamily="34" charset="0"/>
+              <a:buChar char="•"/>
+            </a:pPr>
+            <a:r>
+              <a:rPr lang="en" baseline="0" dirty="0" smtClean="0"/>
+              <a:t>Bullet #2b: …due to the correlation of many functions with either profit or risk</a:t>
+            </a:r>
             <a:endParaRPr lang="en" dirty="0"/>
           </a:p>
         </p:txBody>
@@ -4200,12 +4378,8 @@
               <a:t>#4: </a:t>
             </a:r>
             <a:r>
-              <a:rPr lang="en-US" baseline="0" dirty="0" err="1" smtClean="0"/>
-              <a:t>Hypervolume</a:t>
-            </a:r>
-            <a:r>
               <a:rPr lang="en-US" baseline="0" dirty="0" smtClean="0"/>
-              <a:t> compares the areas underneath the Pareto from curves</a:t>
+              <a:t>Hypervolume compares the areas underneath the Pareto from curves</a:t>
             </a:r>
           </a:p>
           <a:p>
@@ -4218,9 +4392,50 @@
             </a:pPr>
             <a:r>
               <a:rPr lang="en-US" baseline="0" dirty="0" smtClean="0"/>
-              <a:t>Requires the calculation or knowledge of ideal and reference points</a:t>
-            </a:r>
-            <a:endParaRPr dirty="0"/>
+              <a:t>Requires the calculation or knowledge of ideal and reference </a:t>
+            </a:r>
+            <a:r>
+              <a:rPr lang="en-US" baseline="0" dirty="0" smtClean="0"/>
+              <a:t>points</a:t>
+            </a:r>
+          </a:p>
+          <a:p>
+            <a:pPr marL="171450" marR="0" lvl="0" indent="-171450" algn="l" defTabSz="914400" rtl="0" eaLnBrk="1" fontAlgn="auto" latinLnBrk="0" hangingPunct="1">
+              <a:lnSpc>
+                <a:spcPct val="100000"/>
+              </a:lnSpc>
+              <a:spcBef>
+                <a:spcPts val="0"/>
+              </a:spcBef>
+              <a:spcAft>
+                <a:spcPts val="0"/>
+              </a:spcAft>
+              <a:buClrTx/>
+              <a:buSzTx/>
+              <a:buFont typeface="Arial" panose="020B0604020202020204" pitchFamily="34" charset="0"/>
+              <a:buChar char="•"/>
+              <a:tabLst/>
+              <a:defRPr/>
+            </a:pPr>
+            <a:r>
+              <a:rPr lang="en-US" baseline="0" dirty="0" smtClean="0"/>
+              <a:t>Bullet #5: </a:t>
+            </a:r>
+            <a:r>
+              <a:rPr lang="en" sz="1200" dirty="0" smtClean="0"/>
+              <a:t>Answers the question of how broadly the results can be applied</a:t>
+            </a:r>
+            <a:r>
+              <a:rPr lang="en" sz="1200" baseline="0" dirty="0"/>
+              <a:t> </a:t>
+            </a:r>
+            <a:r>
+              <a:rPr lang="en" sz="1200" baseline="0" dirty="0" smtClean="0">
+                <a:sym typeface="Wingdings" panose="05000000000000000000" pitchFamily="2" charset="2"/>
+              </a:rPr>
+              <a:t> We already did this a little bit with our current data (shortened the time period) and the results varied</a:t>
+            </a:r>
+            <a:endParaRPr lang="en" sz="1200" dirty="0" smtClean="0"/>
           </a:p>
         </p:txBody>
       </p:sp>
@@ -4336,7 +4551,7 @@
               </a:spcBef>
               <a:buNone/>
             </a:pPr>
-            <a:endParaRPr/>
+            <a:endParaRPr dirty="0"/>
           </a:p>
         </p:txBody>
       </p:sp>
@@ -4452,7 +4667,7 @@
               </a:spcBef>
               <a:buNone/>
             </a:pPr>
-            <a:endParaRPr/>
+            <a:endParaRPr dirty="0"/>
           </a:p>
         </p:txBody>
       </p:sp>
@@ -4568,7 +4783,7 @@
               </a:spcBef>
               <a:buNone/>
             </a:pPr>
-            <a:endParaRPr/>
+            <a:endParaRPr dirty="0"/>
           </a:p>
         </p:txBody>
       </p:sp>
@@ -4684,7 +4899,7 @@
               </a:spcBef>
               <a:buNone/>
             </a:pPr>
-            <a:endParaRPr/>
+            <a:endParaRPr dirty="0"/>
           </a:p>
         </p:txBody>
       </p:sp>
@@ -4787,7 +5002,7 @@
               <a:pPr/>
               <a:t>5</a:t>
             </a:fld>
-            <a:endParaRPr lang="en-US"/>
+            <a:endParaRPr lang="en-US" dirty="0"/>
           </a:p>
         </p:txBody>
       </p:sp>
@@ -5896,7 +6111,7 @@
               </a:spcBef>
               <a:buNone/>
             </a:pPr>
-            <a:endParaRPr/>
+            <a:endParaRPr dirty="0"/>
           </a:p>
         </p:txBody>
       </p:sp>
@@ -6292,7 +6507,7 @@
               </a:pPr>
               <a:t>12/7/2015</a:t>
             </a:fld>
-            <a:endParaRPr lang="en-US"/>
+            <a:endParaRPr lang="en-US" dirty="0"/>
           </a:p>
         </p:txBody>
       </p:sp>
@@ -6328,7 +6543,7 @@
               <a:defRPr/>
             </a:pPr>
             <a:r>
-              <a:rPr lang="en-US"/>
+              <a:rPr lang="en-US" dirty="0"/>
               <a:t>Footer</a:t>
             </a:r>
           </a:p>
@@ -6380,7 +6595,7 @@
               </a:pPr>
               <a:t>‹#›</a:t>
             </a:fld>
-            <a:endParaRPr lang="en-US"/>
+            <a:endParaRPr lang="en-US" dirty="0"/>
           </a:p>
         </p:txBody>
       </p:sp>
@@ -6621,7 +6836,7 @@
               </a:pPr>
               <a:t>12/7/2015</a:t>
             </a:fld>
-            <a:endParaRPr lang="en-US"/>
+            <a:endParaRPr lang="en-US" dirty="0"/>
           </a:p>
         </p:txBody>
       </p:sp>
@@ -6657,7 +6872,7 @@
               <a:defRPr/>
             </a:pPr>
             <a:r>
-              <a:rPr lang="en-US"/>
+              <a:rPr lang="en-US" dirty="0"/>
               <a:t>Footer</a:t>
             </a:r>
           </a:p>
@@ -6709,7 +6924,7 @@
               </a:pPr>
               <a:t>‹#›</a:t>
             </a:fld>
-            <a:endParaRPr lang="en-US"/>
+            <a:endParaRPr lang="en-US" dirty="0"/>
           </a:p>
         </p:txBody>
       </p:sp>
@@ -6959,7 +7174,7 @@
               </a:pPr>
               <a:t>12/7/2015</a:t>
             </a:fld>
-            <a:endParaRPr lang="en-US"/>
+            <a:endParaRPr lang="en-US" dirty="0"/>
           </a:p>
         </p:txBody>
       </p:sp>
@@ -6995,7 +7210,7 @@
               <a:defRPr/>
             </a:pPr>
             <a:r>
-              <a:rPr lang="en-US"/>
+              <a:rPr lang="en-US" dirty="0"/>
               <a:t>Footer</a:t>
             </a:r>
           </a:p>
@@ -7047,7 +7262,7 @@
               </a:pPr>
               <a:t>‹#›</a:t>
             </a:fld>
-            <a:endParaRPr lang="en-US"/>
+            <a:endParaRPr lang="en-US" dirty="0"/>
           </a:p>
         </p:txBody>
       </p:sp>
@@ -7427,7 +7642,7 @@
               </a:pPr>
               <a:t>12/7/2015</a:t>
             </a:fld>
-            <a:endParaRPr lang="en-US"/>
+            <a:endParaRPr lang="en-US" dirty="0"/>
           </a:p>
         </p:txBody>
       </p:sp>
@@ -7463,7 +7678,7 @@
               <a:defRPr/>
             </a:pPr>
             <a:r>
-              <a:rPr lang="en-US"/>
+              <a:rPr lang="en-US" dirty="0"/>
               <a:t>Footer</a:t>
             </a:r>
           </a:p>
@@ -7515,7 +7730,7 @@
               </a:pPr>
               <a:t>‹#›</a:t>
             </a:fld>
-            <a:endParaRPr lang="en-US"/>
+            <a:endParaRPr lang="en-US" dirty="0"/>
           </a:p>
         </p:txBody>
       </p:sp>
@@ -7765,7 +7980,7 @@
               </a:pPr>
               <a:t>12/7/2015</a:t>
             </a:fld>
-            <a:endParaRPr lang="en-US"/>
+            <a:endParaRPr lang="en-US" dirty="0"/>
           </a:p>
         </p:txBody>
       </p:sp>
@@ -7801,7 +8016,7 @@
               <a:defRPr/>
             </a:pPr>
             <a:r>
-              <a:rPr lang="en-US"/>
+              <a:rPr lang="en-US" dirty="0"/>
               <a:t>Footer</a:t>
             </a:r>
           </a:p>
@@ -7853,7 +8068,7 @@
               </a:pPr>
               <a:t>‹#›</a:t>
             </a:fld>
-            <a:endParaRPr lang="en-US"/>
+            <a:endParaRPr lang="en-US" dirty="0"/>
           </a:p>
         </p:txBody>
       </p:sp>
@@ -8149,7 +8364,7 @@
               </a:spcBef>
               <a:buNone/>
             </a:pPr>
-            <a:endParaRPr/>
+            <a:endParaRPr dirty="0"/>
           </a:p>
         </p:txBody>
       </p:sp>
@@ -8823,7 +9038,7 @@
               <a:defRPr/>
             </a:pPr>
             <a:r>
-              <a:rPr lang="en-US"/>
+              <a:rPr lang="en-US" dirty="0"/>
               <a:t>Footer</a:t>
             </a:r>
           </a:p>
@@ -9566,7 +9781,7 @@
                   <a:schemeClr val="dk1"/>
                 </a:solidFill>
               </a:rPr>
-              <a:t>848 Fall 2015: </a:t>
+              <a:t>848 Fall 2015: Survey </a:t>
             </a:r>
             <a:r>
               <a:rPr lang="en" sz="2000" dirty="0" smtClean="0">
@@ -9574,7 +9789,7 @@
                   <a:schemeClr val="dk1"/>
                 </a:solidFill>
               </a:rPr>
-              <a:t>Suvery of Evolutionary </a:t>
+              <a:t>of Evolutionary </a:t>
             </a:r>
             <a:r>
               <a:rPr lang="en" sz="2000" dirty="0" smtClean="0">
@@ -11207,6 +11422,13 @@
   <p:clrMapOvr>
     <a:masterClrMapping/>
   </p:clrMapOvr>
+  <p:timing>
+    <p:tnLst>
+      <p:par>
+        <p:cTn id="1" dur="indefinite" restart="never" nodeType="tmRoot"/>
+      </p:par>
+    </p:tnLst>
+  </p:timing>
 </p:sld>
 </file>
 
@@ -11360,12 +11582,12 @@
                     <a:p>
                       <a:pPr algn="l" rtl="0" fontAlgn="ctr"/>
                       <a:r>
-                        <a:rPr lang="en-US" sz="1600" b="1" u="none" strike="noStrike">
+                        <a:rPr lang="en-US" sz="1600" b="1" u="none" strike="noStrike" dirty="0">
                           <a:effectLst/>
                         </a:rPr>
                         <a:t>Minimum</a:t>
                       </a:r>
-                      <a:endParaRPr lang="en-US" sz="1600" b="1" i="0" u="none" strike="noStrike">
+                      <a:endParaRPr lang="en-US" sz="1600" b="1" i="0" u="none" strike="noStrike" dirty="0">
                         <a:solidFill>
                           <a:srgbClr val="FFFFFF"/>
                         </a:solidFill>
@@ -11383,12 +11605,12 @@
                     <a:p>
                       <a:pPr algn="l" rtl="0" fontAlgn="ctr"/>
                       <a:r>
-                        <a:rPr lang="en-US" sz="1600" b="1" u="none" strike="noStrike">
+                        <a:rPr lang="en-US" sz="1600" b="1" u="none" strike="noStrike" dirty="0">
                           <a:effectLst/>
                         </a:rPr>
                         <a:t>Maximum </a:t>
                       </a:r>
-                      <a:endParaRPr lang="en-US" sz="1600" b="1" i="0" u="none" strike="noStrike">
+                      <a:endParaRPr lang="en-US" sz="1600" b="1" i="0" u="none" strike="noStrike" dirty="0">
                         <a:solidFill>
                           <a:srgbClr val="FFFFFF"/>
                         </a:solidFill>
@@ -11431,12 +11653,12 @@
                     <a:p>
                       <a:pPr algn="l" rtl="0" fontAlgn="ctr"/>
                       <a:r>
-                        <a:rPr lang="en-US" sz="1600" u="none" strike="noStrike">
+                        <a:rPr lang="en-US" sz="1600" u="none" strike="noStrike" dirty="0">
                           <a:effectLst/>
                         </a:rPr>
                         <a:t>DEMAC</a:t>
                       </a:r>
-                      <a:endParaRPr lang="en-US" sz="1600" b="0" i="0" u="none" strike="noStrike">
+                      <a:endParaRPr lang="en-US" sz="1600" b="0" i="0" u="none" strike="noStrike" dirty="0">
                         <a:solidFill>
                           <a:srgbClr val="000000"/>
                         </a:solidFill>
@@ -11454,12 +11676,12 @@
                     <a:p>
                       <a:pPr algn="l" rtl="0" fontAlgn="ctr"/>
                       <a:r>
-                        <a:rPr lang="en-US" sz="1600" u="none" strike="noStrike">
+                        <a:rPr lang="en-US" sz="1600" u="none" strike="noStrike" dirty="0">
                           <a:effectLst/>
                         </a:rPr>
                         <a:t>Short Lookback</a:t>
                       </a:r>
-                      <a:endParaRPr lang="en-US" sz="1600" b="0" i="0" u="none" strike="noStrike">
+                      <a:endParaRPr lang="en-US" sz="1600" b="0" i="0" u="none" strike="noStrike" dirty="0">
                         <a:solidFill>
                           <a:srgbClr val="000000"/>
                         </a:solidFill>
@@ -11477,363 +11699,12 @@
                     <a:p>
                       <a:pPr algn="ctr" fontAlgn="ctr"/>
                       <a:r>
-                        <a:rPr lang="en-US" sz="1600" u="none" strike="noStrike">
+                        <a:rPr lang="en-US" sz="1600" u="none" strike="noStrike" dirty="0">
                           <a:effectLst/>
                         </a:rPr>
                         <a:t>1</a:t>
                       </a:r>
-                      <a:endParaRPr lang="en-US" sz="1600" b="0" i="0" u="none" strike="noStrike">
-                        <a:solidFill>
-                          <a:srgbClr val="000000"/>
-                        </a:solidFill>
-                        <a:effectLst/>
-                        <a:latin typeface="Calibri" panose="020F0502020204030204" pitchFamily="34" charset="0"/>
-                      </a:endParaRPr>
-                    </a:p>
-                  </a:txBody>
-                  <a:tcPr marL="6390" marR="6390" marT="6390" marB="0" anchor="ctr"/>
-                </a:tc>
-                <a:tc>
-                  <a:txBody>
-                    <a:bodyPr/>
-                    <a:lstStyle/>
-                    <a:p>
-                      <a:pPr algn="ctr" fontAlgn="ctr"/>
-                      <a:r>
-                        <a:rPr lang="en-US" sz="1600" u="none" strike="noStrike">
-                          <a:effectLst/>
-                        </a:rPr>
-                        <a:t>100</a:t>
-                      </a:r>
-                      <a:endParaRPr lang="en-US" sz="1600" b="0" i="0" u="none" strike="noStrike">
-                        <a:solidFill>
-                          <a:srgbClr val="000000"/>
-                        </a:solidFill>
-                        <a:effectLst/>
-                        <a:latin typeface="Calibri" panose="020F0502020204030204" pitchFamily="34" charset="0"/>
-                      </a:endParaRPr>
-                    </a:p>
-                  </a:txBody>
-                  <a:tcPr marL="6390" marR="6390" marT="6390" marB="0" anchor="ctr"/>
-                </a:tc>
-                <a:tc>
-                  <a:txBody>
-                    <a:bodyPr/>
-                    <a:lstStyle/>
-                    <a:p>
-                      <a:pPr algn="ctr" fontAlgn="ctr"/>
-                      <a:r>
-                        <a:rPr lang="en-US" sz="1600" u="none" strike="noStrike">
-                          <a:effectLst/>
-                        </a:rPr>
-                        <a:t>20</a:t>
-                      </a:r>
-                      <a:endParaRPr lang="en-US" sz="1600" b="0" i="0" u="none" strike="noStrike">
-                        <a:solidFill>
-                          <a:srgbClr val="000000"/>
-                        </a:solidFill>
-                        <a:effectLst/>
-                        <a:latin typeface="Calibri" panose="020F0502020204030204" pitchFamily="34" charset="0"/>
-                      </a:endParaRPr>
-                    </a:p>
-                  </a:txBody>
-                  <a:tcPr marL="6390" marR="6390" marT="6390" marB="0" anchor="ctr"/>
-                </a:tc>
-              </a:tr>
-              <a:tr h="283603">
-                <a:tc>
-                  <a:txBody>
-                    <a:bodyPr/>
-                    <a:lstStyle/>
-                    <a:p>
-                      <a:pPr algn="l" rtl="0" fontAlgn="ctr"/>
-                      <a:r>
-                        <a:rPr lang="en-US" sz="1600" u="none" strike="noStrike">
-                          <a:effectLst/>
-                        </a:rPr>
-                        <a:t>DEMAC</a:t>
-                      </a:r>
-                      <a:endParaRPr lang="en-US" sz="1600" b="0" i="0" u="none" strike="noStrike">
-                        <a:solidFill>
-                          <a:srgbClr val="000000"/>
-                        </a:solidFill>
-                        <a:effectLst/>
-                        <a:latin typeface="Calibri" panose="020F0502020204030204" pitchFamily="34" charset="0"/>
-                      </a:endParaRPr>
-                    </a:p>
-                  </a:txBody>
-                  <a:tcPr marL="6390" marR="6390" marT="6390" marB="0" anchor="ctr"/>
-                </a:tc>
-                <a:tc>
-                  <a:txBody>
-                    <a:bodyPr/>
-                    <a:lstStyle/>
-                    <a:p>
-                      <a:pPr algn="l" rtl="0" fontAlgn="ctr"/>
-                      <a:r>
-                        <a:rPr lang="en-US" sz="1600" u="none" strike="noStrike">
-                          <a:effectLst/>
-                        </a:rPr>
-                        <a:t>Long Lookback</a:t>
-                      </a:r>
-                      <a:endParaRPr lang="en-US" sz="1600" b="0" i="0" u="none" strike="noStrike">
-                        <a:solidFill>
-                          <a:srgbClr val="000000"/>
-                        </a:solidFill>
-                        <a:effectLst/>
-                        <a:latin typeface="Calibri" panose="020F0502020204030204" pitchFamily="34" charset="0"/>
-                      </a:endParaRPr>
-                    </a:p>
-                  </a:txBody>
-                  <a:tcPr marL="6390" marR="6390" marT="6390" marB="0" anchor="ctr"/>
-                </a:tc>
-                <a:tc>
-                  <a:txBody>
-                    <a:bodyPr/>
-                    <a:lstStyle/>
-                    <a:p>
-                      <a:pPr algn="ctr" fontAlgn="ctr"/>
-                      <a:r>
-                        <a:rPr lang="en-US" sz="1600" u="none" strike="noStrike">
-                          <a:effectLst/>
-                        </a:rPr>
-                        <a:t>1</a:t>
-                      </a:r>
-                      <a:endParaRPr lang="en-US" sz="1600" b="0" i="0" u="none" strike="noStrike">
-                        <a:solidFill>
-                          <a:srgbClr val="000000"/>
-                        </a:solidFill>
-                        <a:effectLst/>
-                        <a:latin typeface="Calibri" panose="020F0502020204030204" pitchFamily="34" charset="0"/>
-                      </a:endParaRPr>
-                    </a:p>
-                  </a:txBody>
-                  <a:tcPr marL="6390" marR="6390" marT="6390" marB="0" anchor="ctr"/>
-                </a:tc>
-                <a:tc>
-                  <a:txBody>
-                    <a:bodyPr/>
-                    <a:lstStyle/>
-                    <a:p>
-                      <a:pPr algn="ctr" fontAlgn="ctr"/>
-                      <a:r>
-                        <a:rPr lang="en-US" sz="1600" u="none" strike="noStrike">
-                          <a:effectLst/>
-                        </a:rPr>
-                        <a:t>200</a:t>
-                      </a:r>
-                      <a:endParaRPr lang="en-US" sz="1600" b="0" i="0" u="none" strike="noStrike">
-                        <a:solidFill>
-                          <a:srgbClr val="000000"/>
-                        </a:solidFill>
-                        <a:effectLst/>
-                        <a:latin typeface="Calibri" panose="020F0502020204030204" pitchFamily="34" charset="0"/>
-                      </a:endParaRPr>
-                    </a:p>
-                  </a:txBody>
-                  <a:tcPr marL="6390" marR="6390" marT="6390" marB="0" anchor="ctr"/>
-                </a:tc>
-                <a:tc>
-                  <a:txBody>
-                    <a:bodyPr/>
-                    <a:lstStyle/>
-                    <a:p>
-                      <a:pPr algn="ctr" fontAlgn="ctr"/>
-                      <a:r>
-                        <a:rPr lang="en-US" sz="1600" u="none" strike="noStrike">
-                          <a:effectLst/>
-                        </a:rPr>
-                        <a:t>50</a:t>
-                      </a:r>
-                      <a:endParaRPr lang="en-US" sz="1600" b="0" i="0" u="none" strike="noStrike">
-                        <a:solidFill>
-                          <a:srgbClr val="000000"/>
-                        </a:solidFill>
-                        <a:effectLst/>
-                        <a:latin typeface="Calibri" panose="020F0502020204030204" pitchFamily="34" charset="0"/>
-                      </a:endParaRPr>
-                    </a:p>
-                  </a:txBody>
-                  <a:tcPr marL="6390" marR="6390" marT="6390" marB="0" anchor="ctr"/>
-                </a:tc>
-              </a:tr>
-              <a:tr h="283603">
-                <a:tc>
-                  <a:txBody>
-                    <a:bodyPr/>
-                    <a:lstStyle/>
-                    <a:p>
-                      <a:pPr algn="l" rtl="0" fontAlgn="ctr"/>
-                      <a:r>
-                        <a:rPr lang="en-US" sz="1600" u="none" strike="noStrike">
-                          <a:effectLst/>
-                        </a:rPr>
-                        <a:t>MACD</a:t>
-                      </a:r>
-                      <a:endParaRPr lang="en-US" sz="1600" b="0" i="0" u="none" strike="noStrike">
-                        <a:solidFill>
-                          <a:srgbClr val="000000"/>
-                        </a:solidFill>
-                        <a:effectLst/>
-                        <a:latin typeface="Calibri" panose="020F0502020204030204" pitchFamily="34" charset="0"/>
-                      </a:endParaRPr>
-                    </a:p>
-                  </a:txBody>
-                  <a:tcPr marL="6390" marR="6390" marT="6390" marB="0" anchor="ctr"/>
-                </a:tc>
-                <a:tc>
-                  <a:txBody>
-                    <a:bodyPr/>
-                    <a:lstStyle/>
-                    <a:p>
-                      <a:pPr algn="l" rtl="0" fontAlgn="ctr"/>
-                      <a:r>
-                        <a:rPr lang="en-US" sz="1600" u="none" strike="noStrike">
-                          <a:effectLst/>
-                        </a:rPr>
-                        <a:t>Short Lookback</a:t>
-                      </a:r>
-                      <a:endParaRPr lang="en-US" sz="1600" b="0" i="0" u="none" strike="noStrike">
-                        <a:solidFill>
-                          <a:srgbClr val="000000"/>
-                        </a:solidFill>
-                        <a:effectLst/>
-                        <a:latin typeface="Calibri" panose="020F0502020204030204" pitchFamily="34" charset="0"/>
-                      </a:endParaRPr>
-                    </a:p>
-                  </a:txBody>
-                  <a:tcPr marL="6390" marR="6390" marT="6390" marB="0" anchor="ctr"/>
-                </a:tc>
-                <a:tc>
-                  <a:txBody>
-                    <a:bodyPr/>
-                    <a:lstStyle/>
-                    <a:p>
-                      <a:pPr algn="ctr" fontAlgn="ctr"/>
-                      <a:r>
-                        <a:rPr lang="en-US" sz="1600" u="none" strike="noStrike">
-                          <a:effectLst/>
-                        </a:rPr>
-                        <a:t>3</a:t>
-                      </a:r>
-                      <a:endParaRPr lang="en-US" sz="1600" b="0" i="0" u="none" strike="noStrike">
-                        <a:solidFill>
-                          <a:srgbClr val="000000"/>
-                        </a:solidFill>
-                        <a:effectLst/>
-                        <a:latin typeface="Calibri" panose="020F0502020204030204" pitchFamily="34" charset="0"/>
-                      </a:endParaRPr>
-                    </a:p>
-                  </a:txBody>
-                  <a:tcPr marL="6390" marR="6390" marT="6390" marB="0" anchor="ctr"/>
-                </a:tc>
-                <a:tc>
-                  <a:txBody>
-                    <a:bodyPr/>
-                    <a:lstStyle/>
-                    <a:p>
-                      <a:pPr algn="ctr" fontAlgn="ctr"/>
-                      <a:r>
-                        <a:rPr lang="en-US" sz="1600" u="none" strike="noStrike">
-                          <a:effectLst/>
-                        </a:rPr>
-                        <a:t>100</a:t>
-                      </a:r>
-                      <a:endParaRPr lang="en-US" sz="1600" b="0" i="0" u="none" strike="noStrike">
-                        <a:solidFill>
-                          <a:srgbClr val="000000"/>
-                        </a:solidFill>
-                        <a:effectLst/>
-                        <a:latin typeface="Calibri" panose="020F0502020204030204" pitchFamily="34" charset="0"/>
-                      </a:endParaRPr>
-                    </a:p>
-                  </a:txBody>
-                  <a:tcPr marL="6390" marR="6390" marT="6390" marB="0" anchor="ctr"/>
-                </a:tc>
-                <a:tc>
-                  <a:txBody>
-                    <a:bodyPr/>
-                    <a:lstStyle/>
-                    <a:p>
-                      <a:pPr algn="ctr" fontAlgn="ctr"/>
-                      <a:r>
-                        <a:rPr lang="en-US" sz="1600" u="none" strike="noStrike">
-                          <a:effectLst/>
-                        </a:rPr>
-                        <a:t>12</a:t>
-                      </a:r>
-                      <a:endParaRPr lang="en-US" sz="1600" b="0" i="0" u="none" strike="noStrike">
-                        <a:solidFill>
-                          <a:srgbClr val="000000"/>
-                        </a:solidFill>
-                        <a:effectLst/>
-                        <a:latin typeface="Calibri" panose="020F0502020204030204" pitchFamily="34" charset="0"/>
-                      </a:endParaRPr>
-                    </a:p>
-                  </a:txBody>
-                  <a:tcPr marL="6390" marR="6390" marT="6390" marB="0" anchor="ctr"/>
-                </a:tc>
-              </a:tr>
-              <a:tr h="283603">
-                <a:tc>
-                  <a:txBody>
-                    <a:bodyPr/>
-                    <a:lstStyle/>
-                    <a:p>
-                      <a:pPr algn="l" rtl="0" fontAlgn="ctr"/>
-                      <a:r>
-                        <a:rPr lang="en-US" sz="1600" u="none" strike="noStrike">
-                          <a:effectLst/>
-                        </a:rPr>
-                        <a:t>MACD</a:t>
-                      </a:r>
-                      <a:endParaRPr lang="en-US" sz="1600" b="0" i="0" u="none" strike="noStrike">
-                        <a:solidFill>
-                          <a:srgbClr val="000000"/>
-                        </a:solidFill>
-                        <a:effectLst/>
-                        <a:latin typeface="Calibri" panose="020F0502020204030204" pitchFamily="34" charset="0"/>
-                      </a:endParaRPr>
-                    </a:p>
-                  </a:txBody>
-                  <a:tcPr marL="6390" marR="6390" marT="6390" marB="0" anchor="ctr"/>
-                </a:tc>
-                <a:tc>
-                  <a:txBody>
-                    <a:bodyPr/>
-                    <a:lstStyle/>
-                    <a:p>
-                      <a:pPr algn="l" rtl="0" fontAlgn="ctr"/>
-                      <a:r>
-                        <a:rPr lang="en-US" sz="1600" u="none" strike="noStrike">
-                          <a:effectLst/>
-                        </a:rPr>
-                        <a:t>Long Lookback</a:t>
-                      </a:r>
-                      <a:endParaRPr lang="en-US" sz="1600" b="0" i="0" u="none" strike="noStrike">
-                        <a:solidFill>
-                          <a:srgbClr val="000000"/>
-                        </a:solidFill>
-                        <a:effectLst/>
-                        <a:latin typeface="Calibri" panose="020F0502020204030204" pitchFamily="34" charset="0"/>
-                      </a:endParaRPr>
-                    </a:p>
-                  </a:txBody>
-                  <a:tcPr marL="6390" marR="6390" marT="6390" marB="0" anchor="ctr"/>
-                </a:tc>
-                <a:tc>
-                  <a:txBody>
-                    <a:bodyPr/>
-                    <a:lstStyle/>
-                    <a:p>
-                      <a:pPr algn="ctr" fontAlgn="ctr"/>
-                      <a:r>
-                        <a:rPr lang="en-US" sz="1600" u="none" strike="noStrike">
-                          <a:effectLst/>
-                        </a:rPr>
-                        <a:t>3</a:t>
-                      </a:r>
-                      <a:endParaRPr lang="en-US" sz="1600" b="0" i="0" u="none" strike="noStrike">
+                      <a:endParaRPr lang="en-US" sz="1600" b="0" i="0" u="none" strike="noStrike" dirty="0">
                         <a:solidFill>
                           <a:srgbClr val="000000"/>
                         </a:solidFill>
@@ -11874,12 +11745,12 @@
                     <a:p>
                       <a:pPr algn="ctr" fontAlgn="ctr"/>
                       <a:r>
-                        <a:rPr lang="en-US" sz="1600" u="none" strike="noStrike">
+                        <a:rPr lang="en-US" sz="1600" u="none" strike="noStrike" dirty="0">
                           <a:effectLst/>
                         </a:rPr>
-                        <a:t>26</a:t>
+                        <a:t>20</a:t>
                       </a:r>
-                      <a:endParaRPr lang="en-US" sz="1600" b="0" i="0" u="none" strike="noStrike">
+                      <a:endParaRPr lang="en-US" sz="1600" b="0" i="0" u="none" strike="noStrike" dirty="0">
                         <a:solidFill>
                           <a:srgbClr val="000000"/>
                         </a:solidFill>
@@ -11899,12 +11770,12 @@
                     <a:p>
                       <a:pPr algn="l" rtl="0" fontAlgn="ctr"/>
                       <a:r>
-                        <a:rPr lang="en-US" sz="1600" u="none" strike="noStrike">
+                        <a:rPr lang="en-US" sz="1600" u="none" strike="noStrike" dirty="0">
                           <a:effectLst/>
                         </a:rPr>
-                        <a:t>MACD</a:t>
+                        <a:t>DEMAC</a:t>
                       </a:r>
-                      <a:endParaRPr lang="en-US" sz="1600" b="0" i="0" u="none" strike="noStrike">
+                      <a:endParaRPr lang="en-US" sz="1600" b="0" i="0" u="none" strike="noStrike" dirty="0">
                         <a:solidFill>
                           <a:srgbClr val="000000"/>
                         </a:solidFill>
@@ -11922,12 +11793,12 @@
                     <a:p>
                       <a:pPr algn="l" rtl="0" fontAlgn="ctr"/>
                       <a:r>
-                        <a:rPr lang="en-US" sz="1600" u="none" strike="noStrike">
+                        <a:rPr lang="en-US" sz="1600" u="none" strike="noStrike" dirty="0">
                           <a:effectLst/>
                         </a:rPr>
-                        <a:t>Signal Lookback</a:t>
+                        <a:t>Long Lookback</a:t>
                       </a:r>
-                      <a:endParaRPr lang="en-US" sz="1600" b="0" i="0" u="none" strike="noStrike">
+                      <a:endParaRPr lang="en-US" sz="1600" b="0" i="0" u="none" strike="noStrike" dirty="0">
                         <a:solidFill>
                           <a:srgbClr val="000000"/>
                         </a:solidFill>
@@ -11945,12 +11816,363 @@
                     <a:p>
                       <a:pPr algn="ctr" fontAlgn="ctr"/>
                       <a:r>
-                        <a:rPr lang="en-US" sz="1600" u="none" strike="noStrike">
+                        <a:rPr lang="en-US" sz="1600" u="none" strike="noStrike" dirty="0">
                           <a:effectLst/>
                         </a:rPr>
                         <a:t>1</a:t>
                       </a:r>
-                      <a:endParaRPr lang="en-US" sz="1600" b="0" i="0" u="none" strike="noStrike">
+                      <a:endParaRPr lang="en-US" sz="1600" b="0" i="0" u="none" strike="noStrike" dirty="0">
+                        <a:solidFill>
+                          <a:srgbClr val="000000"/>
+                        </a:solidFill>
+                        <a:effectLst/>
+                        <a:latin typeface="Calibri" panose="020F0502020204030204" pitchFamily="34" charset="0"/>
+                      </a:endParaRPr>
+                    </a:p>
+                  </a:txBody>
+                  <a:tcPr marL="6390" marR="6390" marT="6390" marB="0" anchor="ctr"/>
+                </a:tc>
+                <a:tc>
+                  <a:txBody>
+                    <a:bodyPr/>
+                    <a:lstStyle/>
+                    <a:p>
+                      <a:pPr algn="ctr" fontAlgn="ctr"/>
+                      <a:r>
+                        <a:rPr lang="en-US" sz="1600" u="none" strike="noStrike" dirty="0">
+                          <a:effectLst/>
+                        </a:rPr>
+                        <a:t>200</a:t>
+                      </a:r>
+                      <a:endParaRPr lang="en-US" sz="1600" b="0" i="0" u="none" strike="noStrike" dirty="0">
+                        <a:solidFill>
+                          <a:srgbClr val="000000"/>
+                        </a:solidFill>
+                        <a:effectLst/>
+                        <a:latin typeface="Calibri" panose="020F0502020204030204" pitchFamily="34" charset="0"/>
+                      </a:endParaRPr>
+                    </a:p>
+                  </a:txBody>
+                  <a:tcPr marL="6390" marR="6390" marT="6390" marB="0" anchor="ctr"/>
+                </a:tc>
+                <a:tc>
+                  <a:txBody>
+                    <a:bodyPr/>
+                    <a:lstStyle/>
+                    <a:p>
+                      <a:pPr algn="ctr" fontAlgn="ctr"/>
+                      <a:r>
+                        <a:rPr lang="en-US" sz="1600" u="none" strike="noStrike" dirty="0">
+                          <a:effectLst/>
+                        </a:rPr>
+                        <a:t>50</a:t>
+                      </a:r>
+                      <a:endParaRPr lang="en-US" sz="1600" b="0" i="0" u="none" strike="noStrike" dirty="0">
+                        <a:solidFill>
+                          <a:srgbClr val="000000"/>
+                        </a:solidFill>
+                        <a:effectLst/>
+                        <a:latin typeface="Calibri" panose="020F0502020204030204" pitchFamily="34" charset="0"/>
+                      </a:endParaRPr>
+                    </a:p>
+                  </a:txBody>
+                  <a:tcPr marL="6390" marR="6390" marT="6390" marB="0" anchor="ctr"/>
+                </a:tc>
+              </a:tr>
+              <a:tr h="283603">
+                <a:tc>
+                  <a:txBody>
+                    <a:bodyPr/>
+                    <a:lstStyle/>
+                    <a:p>
+                      <a:pPr algn="l" rtl="0" fontAlgn="ctr"/>
+                      <a:r>
+                        <a:rPr lang="en-US" sz="1600" u="none" strike="noStrike" dirty="0">
+                          <a:effectLst/>
+                        </a:rPr>
+                        <a:t>MACD</a:t>
+                      </a:r>
+                      <a:endParaRPr lang="en-US" sz="1600" b="0" i="0" u="none" strike="noStrike" dirty="0">
+                        <a:solidFill>
+                          <a:srgbClr val="000000"/>
+                        </a:solidFill>
+                        <a:effectLst/>
+                        <a:latin typeface="Calibri" panose="020F0502020204030204" pitchFamily="34" charset="0"/>
+                      </a:endParaRPr>
+                    </a:p>
+                  </a:txBody>
+                  <a:tcPr marL="6390" marR="6390" marT="6390" marB="0" anchor="ctr"/>
+                </a:tc>
+                <a:tc>
+                  <a:txBody>
+                    <a:bodyPr/>
+                    <a:lstStyle/>
+                    <a:p>
+                      <a:pPr algn="l" rtl="0" fontAlgn="ctr"/>
+                      <a:r>
+                        <a:rPr lang="en-US" sz="1600" u="none" strike="noStrike" dirty="0">
+                          <a:effectLst/>
+                        </a:rPr>
+                        <a:t>Short Lookback</a:t>
+                      </a:r>
+                      <a:endParaRPr lang="en-US" sz="1600" b="0" i="0" u="none" strike="noStrike" dirty="0">
+                        <a:solidFill>
+                          <a:srgbClr val="000000"/>
+                        </a:solidFill>
+                        <a:effectLst/>
+                        <a:latin typeface="Calibri" panose="020F0502020204030204" pitchFamily="34" charset="0"/>
+                      </a:endParaRPr>
+                    </a:p>
+                  </a:txBody>
+                  <a:tcPr marL="6390" marR="6390" marT="6390" marB="0" anchor="ctr"/>
+                </a:tc>
+                <a:tc>
+                  <a:txBody>
+                    <a:bodyPr/>
+                    <a:lstStyle/>
+                    <a:p>
+                      <a:pPr algn="ctr" fontAlgn="ctr"/>
+                      <a:r>
+                        <a:rPr lang="en-US" sz="1600" u="none" strike="noStrike" dirty="0">
+                          <a:effectLst/>
+                        </a:rPr>
+                        <a:t>3</a:t>
+                      </a:r>
+                      <a:endParaRPr lang="en-US" sz="1600" b="0" i="0" u="none" strike="noStrike" dirty="0">
+                        <a:solidFill>
+                          <a:srgbClr val="000000"/>
+                        </a:solidFill>
+                        <a:effectLst/>
+                        <a:latin typeface="Calibri" panose="020F0502020204030204" pitchFamily="34" charset="0"/>
+                      </a:endParaRPr>
+                    </a:p>
+                  </a:txBody>
+                  <a:tcPr marL="6390" marR="6390" marT="6390" marB="0" anchor="ctr"/>
+                </a:tc>
+                <a:tc>
+                  <a:txBody>
+                    <a:bodyPr/>
+                    <a:lstStyle/>
+                    <a:p>
+                      <a:pPr algn="ctr" fontAlgn="ctr"/>
+                      <a:r>
+                        <a:rPr lang="en-US" sz="1600" u="none" strike="noStrike" dirty="0">
+                          <a:effectLst/>
+                        </a:rPr>
+                        <a:t>100</a:t>
+                      </a:r>
+                      <a:endParaRPr lang="en-US" sz="1600" b="0" i="0" u="none" strike="noStrike" dirty="0">
+                        <a:solidFill>
+                          <a:srgbClr val="000000"/>
+                        </a:solidFill>
+                        <a:effectLst/>
+                        <a:latin typeface="Calibri" panose="020F0502020204030204" pitchFamily="34" charset="0"/>
+                      </a:endParaRPr>
+                    </a:p>
+                  </a:txBody>
+                  <a:tcPr marL="6390" marR="6390" marT="6390" marB="0" anchor="ctr"/>
+                </a:tc>
+                <a:tc>
+                  <a:txBody>
+                    <a:bodyPr/>
+                    <a:lstStyle/>
+                    <a:p>
+                      <a:pPr algn="ctr" fontAlgn="ctr"/>
+                      <a:r>
+                        <a:rPr lang="en-US" sz="1600" u="none" strike="noStrike" dirty="0">
+                          <a:effectLst/>
+                        </a:rPr>
+                        <a:t>12</a:t>
+                      </a:r>
+                      <a:endParaRPr lang="en-US" sz="1600" b="0" i="0" u="none" strike="noStrike" dirty="0">
+                        <a:solidFill>
+                          <a:srgbClr val="000000"/>
+                        </a:solidFill>
+                        <a:effectLst/>
+                        <a:latin typeface="Calibri" panose="020F0502020204030204" pitchFamily="34" charset="0"/>
+                      </a:endParaRPr>
+                    </a:p>
+                  </a:txBody>
+                  <a:tcPr marL="6390" marR="6390" marT="6390" marB="0" anchor="ctr"/>
+                </a:tc>
+              </a:tr>
+              <a:tr h="283603">
+                <a:tc>
+                  <a:txBody>
+                    <a:bodyPr/>
+                    <a:lstStyle/>
+                    <a:p>
+                      <a:pPr algn="l" rtl="0" fontAlgn="ctr"/>
+                      <a:r>
+                        <a:rPr lang="en-US" sz="1600" u="none" strike="noStrike" dirty="0">
+                          <a:effectLst/>
+                        </a:rPr>
+                        <a:t>MACD</a:t>
+                      </a:r>
+                      <a:endParaRPr lang="en-US" sz="1600" b="0" i="0" u="none" strike="noStrike" dirty="0">
+                        <a:solidFill>
+                          <a:srgbClr val="000000"/>
+                        </a:solidFill>
+                        <a:effectLst/>
+                        <a:latin typeface="Calibri" panose="020F0502020204030204" pitchFamily="34" charset="0"/>
+                      </a:endParaRPr>
+                    </a:p>
+                  </a:txBody>
+                  <a:tcPr marL="6390" marR="6390" marT="6390" marB="0" anchor="ctr"/>
+                </a:tc>
+                <a:tc>
+                  <a:txBody>
+                    <a:bodyPr/>
+                    <a:lstStyle/>
+                    <a:p>
+                      <a:pPr algn="l" rtl="0" fontAlgn="ctr"/>
+                      <a:r>
+                        <a:rPr lang="en-US" sz="1600" u="none" strike="noStrike" dirty="0">
+                          <a:effectLst/>
+                        </a:rPr>
+                        <a:t>Long Lookback</a:t>
+                      </a:r>
+                      <a:endParaRPr lang="en-US" sz="1600" b="0" i="0" u="none" strike="noStrike" dirty="0">
+                        <a:solidFill>
+                          <a:srgbClr val="000000"/>
+                        </a:solidFill>
+                        <a:effectLst/>
+                        <a:latin typeface="Calibri" panose="020F0502020204030204" pitchFamily="34" charset="0"/>
+                      </a:endParaRPr>
+                    </a:p>
+                  </a:txBody>
+                  <a:tcPr marL="6390" marR="6390" marT="6390" marB="0" anchor="ctr"/>
+                </a:tc>
+                <a:tc>
+                  <a:txBody>
+                    <a:bodyPr/>
+                    <a:lstStyle/>
+                    <a:p>
+                      <a:pPr algn="ctr" fontAlgn="ctr"/>
+                      <a:r>
+                        <a:rPr lang="en-US" sz="1600" u="none" strike="noStrike" dirty="0">
+                          <a:effectLst/>
+                        </a:rPr>
+                        <a:t>3</a:t>
+                      </a:r>
+                      <a:endParaRPr lang="en-US" sz="1600" b="0" i="0" u="none" strike="noStrike" dirty="0">
+                        <a:solidFill>
+                          <a:srgbClr val="000000"/>
+                        </a:solidFill>
+                        <a:effectLst/>
+                        <a:latin typeface="Calibri" panose="020F0502020204030204" pitchFamily="34" charset="0"/>
+                      </a:endParaRPr>
+                    </a:p>
+                  </a:txBody>
+                  <a:tcPr marL="6390" marR="6390" marT="6390" marB="0" anchor="ctr"/>
+                </a:tc>
+                <a:tc>
+                  <a:txBody>
+                    <a:bodyPr/>
+                    <a:lstStyle/>
+                    <a:p>
+                      <a:pPr algn="ctr" fontAlgn="ctr"/>
+                      <a:r>
+                        <a:rPr lang="en-US" sz="1600" u="none" strike="noStrike" dirty="0">
+                          <a:effectLst/>
+                        </a:rPr>
+                        <a:t>100</a:t>
+                      </a:r>
+                      <a:endParaRPr lang="en-US" sz="1600" b="0" i="0" u="none" strike="noStrike" dirty="0">
+                        <a:solidFill>
+                          <a:srgbClr val="000000"/>
+                        </a:solidFill>
+                        <a:effectLst/>
+                        <a:latin typeface="Calibri" panose="020F0502020204030204" pitchFamily="34" charset="0"/>
+                      </a:endParaRPr>
+                    </a:p>
+                  </a:txBody>
+                  <a:tcPr marL="6390" marR="6390" marT="6390" marB="0" anchor="ctr"/>
+                </a:tc>
+                <a:tc>
+                  <a:txBody>
+                    <a:bodyPr/>
+                    <a:lstStyle/>
+                    <a:p>
+                      <a:pPr algn="ctr" fontAlgn="ctr"/>
+                      <a:r>
+                        <a:rPr lang="en-US" sz="1600" u="none" strike="noStrike" dirty="0">
+                          <a:effectLst/>
+                        </a:rPr>
+                        <a:t>26</a:t>
+                      </a:r>
+                      <a:endParaRPr lang="en-US" sz="1600" b="0" i="0" u="none" strike="noStrike" dirty="0">
+                        <a:solidFill>
+                          <a:srgbClr val="000000"/>
+                        </a:solidFill>
+                        <a:effectLst/>
+                        <a:latin typeface="Calibri" panose="020F0502020204030204" pitchFamily="34" charset="0"/>
+                      </a:endParaRPr>
+                    </a:p>
+                  </a:txBody>
+                  <a:tcPr marL="6390" marR="6390" marT="6390" marB="0" anchor="ctr"/>
+                </a:tc>
+              </a:tr>
+              <a:tr h="283603">
+                <a:tc>
+                  <a:txBody>
+                    <a:bodyPr/>
+                    <a:lstStyle/>
+                    <a:p>
+                      <a:pPr algn="l" rtl="0" fontAlgn="ctr"/>
+                      <a:r>
+                        <a:rPr lang="en-US" sz="1600" u="none" strike="noStrike" dirty="0">
+                          <a:effectLst/>
+                        </a:rPr>
+                        <a:t>MACD</a:t>
+                      </a:r>
+                      <a:endParaRPr lang="en-US" sz="1600" b="0" i="0" u="none" strike="noStrike" dirty="0">
+                        <a:solidFill>
+                          <a:srgbClr val="000000"/>
+                        </a:solidFill>
+                        <a:effectLst/>
+                        <a:latin typeface="Calibri" panose="020F0502020204030204" pitchFamily="34" charset="0"/>
+                      </a:endParaRPr>
+                    </a:p>
+                  </a:txBody>
+                  <a:tcPr marL="6390" marR="6390" marT="6390" marB="0" anchor="ctr"/>
+                </a:tc>
+                <a:tc>
+                  <a:txBody>
+                    <a:bodyPr/>
+                    <a:lstStyle/>
+                    <a:p>
+                      <a:pPr algn="l" rtl="0" fontAlgn="ctr"/>
+                      <a:r>
+                        <a:rPr lang="en-US" sz="1600" u="none" strike="noStrike" dirty="0">
+                          <a:effectLst/>
+                        </a:rPr>
+                        <a:t>Signal Lookback</a:t>
+                      </a:r>
+                      <a:endParaRPr lang="en-US" sz="1600" b="0" i="0" u="none" strike="noStrike" dirty="0">
+                        <a:solidFill>
+                          <a:srgbClr val="000000"/>
+                        </a:solidFill>
+                        <a:effectLst/>
+                        <a:latin typeface="Calibri" panose="020F0502020204030204" pitchFamily="34" charset="0"/>
+                      </a:endParaRPr>
+                    </a:p>
+                  </a:txBody>
+                  <a:tcPr marL="6390" marR="6390" marT="6390" marB="0" anchor="ctr"/>
+                </a:tc>
+                <a:tc>
+                  <a:txBody>
+                    <a:bodyPr/>
+                    <a:lstStyle/>
+                    <a:p>
+                      <a:pPr algn="ctr" fontAlgn="ctr"/>
+                      <a:r>
+                        <a:rPr lang="en-US" sz="1600" u="none" strike="noStrike" dirty="0">
+                          <a:effectLst/>
+                        </a:rPr>
+                        <a:t>1</a:t>
+                      </a:r>
+                      <a:endParaRPr lang="en-US" sz="1600" b="0" i="0" u="none" strike="noStrike" dirty="0">
                         <a:solidFill>
                           <a:srgbClr val="000000"/>
                         </a:solidFill>
@@ -11995,12 +12217,12 @@
                     <a:p>
                       <a:pPr algn="ctr" fontAlgn="ctr"/>
                       <a:r>
-                        <a:rPr lang="en-US" sz="1600" u="none" strike="noStrike">
+                        <a:rPr lang="en-US" sz="1600" u="none" strike="noStrike" dirty="0">
                           <a:effectLst/>
                         </a:rPr>
                         <a:t>9</a:t>
                       </a:r>
-                      <a:endParaRPr lang="en-US" sz="1600" b="0" i="0" u="none" strike="noStrike">
+                      <a:endParaRPr lang="en-US" sz="1600" b="0" i="0" u="none" strike="noStrike" dirty="0">
                         <a:solidFill>
                           <a:srgbClr val="000000"/>
                         </a:solidFill>
@@ -12020,12 +12242,12 @@
                     <a:p>
                       <a:pPr algn="l" fontAlgn="t"/>
                       <a:r>
-                        <a:rPr lang="en-US" sz="1600" u="none" strike="noStrike">
+                        <a:rPr lang="en-US" sz="1600" u="none" strike="noStrike" dirty="0">
                           <a:effectLst/>
                         </a:rPr>
                         <a:t>RSI</a:t>
                       </a:r>
-                      <a:endParaRPr lang="en-US" sz="1600" b="0" i="0" u="none" strike="noStrike">
+                      <a:endParaRPr lang="en-US" sz="1600" b="0" i="0" u="none" strike="noStrike" dirty="0">
                         <a:solidFill>
                           <a:srgbClr val="000000"/>
                         </a:solidFill>
@@ -12043,12 +12265,12 @@
                     <a:p>
                       <a:pPr algn="l" fontAlgn="t"/>
                       <a:r>
-                        <a:rPr lang="en-US" sz="1600" u="none" strike="noStrike">
+                        <a:rPr lang="en-US" sz="1600" u="none" strike="noStrike" dirty="0">
                           <a:effectLst/>
                         </a:rPr>
                         <a:t>Lookback</a:t>
                       </a:r>
-                      <a:endParaRPr lang="en-US" sz="1600" b="0" i="0" u="none" strike="noStrike">
+                      <a:endParaRPr lang="en-US" sz="1600" b="0" i="0" u="none" strike="noStrike" dirty="0">
                         <a:solidFill>
                           <a:srgbClr val="000000"/>
                         </a:solidFill>
@@ -12066,12 +12288,12 @@
                     <a:p>
                       <a:pPr algn="ctr" fontAlgn="ctr"/>
                       <a:r>
-                        <a:rPr lang="en-US" sz="1600" u="none" strike="noStrike">
+                        <a:rPr lang="en-US" sz="1600" u="none" strike="noStrike" dirty="0">
                           <a:effectLst/>
                         </a:rPr>
                         <a:t>3</a:t>
                       </a:r>
-                      <a:endParaRPr lang="en-US" sz="1600" b="0" i="0" u="none" strike="noStrike">
+                      <a:endParaRPr lang="en-US" sz="1600" b="0" i="0" u="none" strike="noStrike" dirty="0">
                         <a:solidFill>
                           <a:srgbClr val="000000"/>
                         </a:solidFill>
@@ -12089,12 +12311,12 @@
                     <a:p>
                       <a:pPr algn="ctr" fontAlgn="ctr"/>
                       <a:r>
-                        <a:rPr lang="en-US" sz="1600" u="none" strike="noStrike">
+                        <a:rPr lang="en-US" sz="1600" u="none" strike="noStrike" dirty="0">
                           <a:effectLst/>
                         </a:rPr>
                         <a:t>100</a:t>
                       </a:r>
-                      <a:endParaRPr lang="en-US" sz="1600" b="0" i="0" u="none" strike="noStrike">
+                      <a:endParaRPr lang="en-US" sz="1600" b="0" i="0" u="none" strike="noStrike" dirty="0">
                         <a:solidFill>
                           <a:srgbClr val="000000"/>
                         </a:solidFill>
@@ -12112,12 +12334,12 @@
                     <a:p>
                       <a:pPr algn="ctr" fontAlgn="ctr"/>
                       <a:r>
-                        <a:rPr lang="en-US" sz="1600" u="none" strike="noStrike">
+                        <a:rPr lang="en-US" sz="1600" u="none" strike="noStrike" dirty="0">
                           <a:effectLst/>
                         </a:rPr>
                         <a:t>14</a:t>
                       </a:r>
-                      <a:endParaRPr lang="en-US" sz="1600" b="0" i="0" u="none" strike="noStrike">
+                      <a:endParaRPr lang="en-US" sz="1600" b="0" i="0" u="none" strike="noStrike" dirty="0">
                         <a:solidFill>
                           <a:srgbClr val="000000"/>
                         </a:solidFill>
@@ -12137,12 +12359,12 @@
                     <a:p>
                       <a:pPr algn="l" fontAlgn="t"/>
                       <a:r>
-                        <a:rPr lang="en-US" sz="1600" u="none" strike="noStrike">
+                        <a:rPr lang="en-US" sz="1600" u="none" strike="noStrike" dirty="0">
                           <a:effectLst/>
                         </a:rPr>
                         <a:t>RSI</a:t>
                       </a:r>
-                      <a:endParaRPr lang="en-US" sz="1600" b="0" i="0" u="none" strike="noStrike">
+                      <a:endParaRPr lang="en-US" sz="1600" b="0" i="0" u="none" strike="noStrike" dirty="0">
                         <a:solidFill>
                           <a:srgbClr val="000000"/>
                         </a:solidFill>
@@ -12160,12 +12382,12 @@
                     <a:p>
                       <a:pPr algn="l" fontAlgn="t"/>
                       <a:r>
-                        <a:rPr lang="en-US" sz="1600" u="none" strike="noStrike">
+                        <a:rPr lang="en-US" sz="1600" u="none" strike="noStrike" dirty="0">
                           <a:effectLst/>
                         </a:rPr>
                         <a:t>Lower Boundary</a:t>
                       </a:r>
-                      <a:endParaRPr lang="en-US" sz="1600" b="0" i="0" u="none" strike="noStrike">
+                      <a:endParaRPr lang="en-US" sz="1600" b="0" i="0" u="none" strike="noStrike" dirty="0">
                         <a:solidFill>
                           <a:srgbClr val="000000"/>
                         </a:solidFill>
@@ -12183,12 +12405,12 @@
                     <a:p>
                       <a:pPr algn="ctr" fontAlgn="ctr"/>
                       <a:r>
-                        <a:rPr lang="en-US" sz="1600" u="none" strike="noStrike">
+                        <a:rPr lang="en-US" sz="1600" u="none" strike="noStrike" dirty="0">
                           <a:effectLst/>
                         </a:rPr>
                         <a:t>10</a:t>
                       </a:r>
-                      <a:endParaRPr lang="en-US" sz="1600" b="0" i="0" u="none" strike="noStrike">
+                      <a:endParaRPr lang="en-US" sz="1600" b="0" i="0" u="none" strike="noStrike" dirty="0">
                         <a:solidFill>
                           <a:srgbClr val="000000"/>
                         </a:solidFill>
@@ -12206,12 +12428,12 @@
                     <a:p>
                       <a:pPr algn="ctr" fontAlgn="ctr"/>
                       <a:r>
-                        <a:rPr lang="en-US" sz="1600" u="none" strike="noStrike">
+                        <a:rPr lang="en-US" sz="1600" u="none" strike="noStrike" dirty="0">
                           <a:effectLst/>
                         </a:rPr>
                         <a:t>40</a:t>
                       </a:r>
-                      <a:endParaRPr lang="en-US" sz="1600" b="0" i="0" u="none" strike="noStrike">
+                      <a:endParaRPr lang="en-US" sz="1600" b="0" i="0" u="none" strike="noStrike" dirty="0">
                         <a:solidFill>
                           <a:srgbClr val="000000"/>
                         </a:solidFill>
@@ -12229,12 +12451,12 @@
                     <a:p>
                       <a:pPr algn="ctr" fontAlgn="ctr"/>
                       <a:r>
-                        <a:rPr lang="en-US" sz="1600" u="none" strike="noStrike">
+                        <a:rPr lang="en-US" sz="1600" u="none" strike="noStrike" dirty="0">
                           <a:effectLst/>
                         </a:rPr>
                         <a:t>30</a:t>
                       </a:r>
-                      <a:endParaRPr lang="en-US" sz="1600" b="0" i="0" u="none" strike="noStrike">
+                      <a:endParaRPr lang="en-US" sz="1600" b="0" i="0" u="none" strike="noStrike" dirty="0">
                         <a:solidFill>
                           <a:srgbClr val="000000"/>
                         </a:solidFill>
@@ -12254,12 +12476,12 @@
                     <a:p>
                       <a:pPr algn="l" rtl="0" fontAlgn="ctr"/>
                       <a:r>
-                        <a:rPr lang="en-US" sz="1600" u="none" strike="noStrike">
+                        <a:rPr lang="en-US" sz="1600" u="none" strike="noStrike" dirty="0">
                           <a:effectLst/>
                         </a:rPr>
                         <a:t>RSI</a:t>
                       </a:r>
-                      <a:endParaRPr lang="en-US" sz="1600" b="0" i="0" u="none" strike="noStrike">
+                      <a:endParaRPr lang="en-US" sz="1600" b="0" i="0" u="none" strike="noStrike" dirty="0">
                         <a:solidFill>
                           <a:srgbClr val="000000"/>
                         </a:solidFill>
@@ -12277,12 +12499,12 @@
                     <a:p>
                       <a:pPr algn="l" rtl="0" fontAlgn="ctr"/>
                       <a:r>
-                        <a:rPr lang="en-US" sz="1600" u="none" strike="noStrike">
+                        <a:rPr lang="en-US" sz="1600" u="none" strike="noStrike" dirty="0">
                           <a:effectLst/>
                         </a:rPr>
                         <a:t>Upper Boundary</a:t>
                       </a:r>
-                      <a:endParaRPr lang="en-US" sz="1600" b="0" i="0" u="none" strike="noStrike">
+                      <a:endParaRPr lang="en-US" sz="1600" b="0" i="0" u="none" strike="noStrike" dirty="0">
                         <a:solidFill>
                           <a:srgbClr val="000000"/>
                         </a:solidFill>
@@ -12300,12 +12522,12 @@
                     <a:p>
                       <a:pPr algn="ctr" fontAlgn="ctr"/>
                       <a:r>
-                        <a:rPr lang="en-US" sz="1600" u="none" strike="noStrike">
+                        <a:rPr lang="en-US" sz="1600" u="none" strike="noStrike" dirty="0">
                           <a:effectLst/>
                         </a:rPr>
                         <a:t>60</a:t>
                       </a:r>
-                      <a:endParaRPr lang="en-US" sz="1600" b="0" i="0" u="none" strike="noStrike">
+                      <a:endParaRPr lang="en-US" sz="1600" b="0" i="0" u="none" strike="noStrike" dirty="0">
                         <a:solidFill>
                           <a:srgbClr val="000000"/>
                         </a:solidFill>
@@ -12323,12 +12545,12 @@
                     <a:p>
                       <a:pPr algn="ctr" fontAlgn="ctr"/>
                       <a:r>
-                        <a:rPr lang="en-US" sz="1600" u="none" strike="noStrike">
+                        <a:rPr lang="en-US" sz="1600" u="none" strike="noStrike" dirty="0">
                           <a:effectLst/>
                         </a:rPr>
                         <a:t>90</a:t>
                       </a:r>
-                      <a:endParaRPr lang="en-US" sz="1600" b="0" i="0" u="none" strike="noStrike">
+                      <a:endParaRPr lang="en-US" sz="1600" b="0" i="0" u="none" strike="noStrike" dirty="0">
                         <a:solidFill>
                           <a:srgbClr val="000000"/>
                         </a:solidFill>
@@ -12346,12 +12568,12 @@
                     <a:p>
                       <a:pPr algn="ctr" fontAlgn="ctr"/>
                       <a:r>
-                        <a:rPr lang="en-US" sz="1600" u="none" strike="noStrike">
+                        <a:rPr lang="en-US" sz="1600" u="none" strike="noStrike" dirty="0">
                           <a:effectLst/>
                         </a:rPr>
                         <a:t>70</a:t>
                       </a:r>
-                      <a:endParaRPr lang="en-US" sz="1600" b="0" i="0" u="none" strike="noStrike">
+                      <a:endParaRPr lang="en-US" sz="1600" b="0" i="0" u="none" strike="noStrike" dirty="0">
                         <a:solidFill>
                           <a:srgbClr val="000000"/>
                         </a:solidFill>
@@ -12371,12 +12593,12 @@
                     <a:p>
                       <a:pPr algn="l" rtl="0" fontAlgn="ctr"/>
                       <a:r>
-                        <a:rPr lang="en-US" sz="1600" u="none" strike="noStrike">
+                        <a:rPr lang="en-US" sz="1600" u="none" strike="noStrike" dirty="0">
                           <a:effectLst/>
                         </a:rPr>
                         <a:t>MARSI</a:t>
                       </a:r>
-                      <a:endParaRPr lang="en-US" sz="1600" b="0" i="0" u="none" strike="noStrike">
+                      <a:endParaRPr lang="en-US" sz="1600" b="0" i="0" u="none" strike="noStrike" dirty="0">
                         <a:solidFill>
                           <a:srgbClr val="000000"/>
                         </a:solidFill>
@@ -12394,12 +12616,12 @@
                     <a:p>
                       <a:pPr algn="l" rtl="0" fontAlgn="ctr"/>
                       <a:r>
-                        <a:rPr lang="en-US" sz="1600" u="none" strike="noStrike">
+                        <a:rPr lang="en-US" sz="1600" u="none" strike="noStrike" dirty="0">
                           <a:effectLst/>
                         </a:rPr>
                         <a:t>RSI Lookback</a:t>
                       </a:r>
-                      <a:endParaRPr lang="en-US" sz="1600" b="0" i="0" u="none" strike="noStrike">
+                      <a:endParaRPr lang="en-US" sz="1600" b="0" i="0" u="none" strike="noStrike" dirty="0">
                         <a:solidFill>
                           <a:srgbClr val="000000"/>
                         </a:solidFill>
@@ -12417,12 +12639,12 @@
                     <a:p>
                       <a:pPr algn="ctr" fontAlgn="ctr"/>
                       <a:r>
-                        <a:rPr lang="en-US" sz="1600" u="none" strike="noStrike">
+                        <a:rPr lang="en-US" sz="1600" u="none" strike="noStrike" dirty="0">
                           <a:effectLst/>
                         </a:rPr>
                         <a:t>3</a:t>
                       </a:r>
-                      <a:endParaRPr lang="en-US" sz="1600" b="0" i="0" u="none" strike="noStrike">
+                      <a:endParaRPr lang="en-US" sz="1600" b="0" i="0" u="none" strike="noStrike" dirty="0">
                         <a:solidFill>
                           <a:srgbClr val="000000"/>
                         </a:solidFill>
@@ -12440,12 +12662,12 @@
                     <a:p>
                       <a:pPr algn="ctr" fontAlgn="ctr"/>
                       <a:r>
-                        <a:rPr lang="en-US" sz="1600" u="none" strike="noStrike">
+                        <a:rPr lang="en-US" sz="1600" u="none" strike="noStrike" dirty="0">
                           <a:effectLst/>
                         </a:rPr>
                         <a:t>100</a:t>
                       </a:r>
-                      <a:endParaRPr lang="en-US" sz="1600" b="0" i="0" u="none" strike="noStrike">
+                      <a:endParaRPr lang="en-US" sz="1600" b="0" i="0" u="none" strike="noStrike" dirty="0">
                         <a:solidFill>
                           <a:srgbClr val="000000"/>
                         </a:solidFill>
@@ -12488,12 +12710,12 @@
                     <a:p>
                       <a:pPr algn="l" rtl="0" fontAlgn="ctr"/>
                       <a:r>
-                        <a:rPr lang="en-US" sz="1600" u="none" strike="noStrike">
+                        <a:rPr lang="en-US" sz="1600" u="none" strike="noStrike" dirty="0">
                           <a:effectLst/>
                         </a:rPr>
                         <a:t>MARSI</a:t>
                       </a:r>
-                      <a:endParaRPr lang="en-US" sz="1600" b="0" i="0" u="none" strike="noStrike">
+                      <a:endParaRPr lang="en-US" sz="1600" b="0" i="0" u="none" strike="noStrike" dirty="0">
                         <a:solidFill>
                           <a:srgbClr val="000000"/>
                         </a:solidFill>
@@ -12511,12 +12733,12 @@
                     <a:p>
                       <a:pPr algn="l" rtl="0" fontAlgn="ctr"/>
                       <a:r>
-                        <a:rPr lang="en-US" sz="1600" u="none" strike="noStrike">
+                        <a:rPr lang="en-US" sz="1600" u="none" strike="noStrike" dirty="0">
                           <a:effectLst/>
                         </a:rPr>
                         <a:t>Lower Boundary</a:t>
                       </a:r>
-                      <a:endParaRPr lang="en-US" sz="1600" b="0" i="0" u="none" strike="noStrike">
+                      <a:endParaRPr lang="en-US" sz="1600" b="0" i="0" u="none" strike="noStrike" dirty="0">
                         <a:solidFill>
                           <a:srgbClr val="000000"/>
                         </a:solidFill>
@@ -12534,12 +12756,12 @@
                     <a:p>
                       <a:pPr algn="ctr" fontAlgn="ctr"/>
                       <a:r>
-                        <a:rPr lang="en-US" sz="1600" u="none" strike="noStrike">
+                        <a:rPr lang="en-US" sz="1600" u="none" strike="noStrike" dirty="0">
                           <a:effectLst/>
                         </a:rPr>
                         <a:t>10</a:t>
                       </a:r>
-                      <a:endParaRPr lang="en-US" sz="1600" b="0" i="0" u="none" strike="noStrike">
+                      <a:endParaRPr lang="en-US" sz="1600" b="0" i="0" u="none" strike="noStrike" dirty="0">
                         <a:solidFill>
                           <a:srgbClr val="000000"/>
                         </a:solidFill>
@@ -12557,12 +12779,12 @@
                     <a:p>
                       <a:pPr algn="ctr" fontAlgn="ctr"/>
                       <a:r>
-                        <a:rPr lang="en-US" sz="1600" u="none" strike="noStrike">
+                        <a:rPr lang="en-US" sz="1600" u="none" strike="noStrike" dirty="0">
                           <a:effectLst/>
                         </a:rPr>
                         <a:t>40</a:t>
                       </a:r>
-                      <a:endParaRPr lang="en-US" sz="1600" b="0" i="0" u="none" strike="noStrike">
+                      <a:endParaRPr lang="en-US" sz="1600" b="0" i="0" u="none" strike="noStrike" dirty="0">
                         <a:solidFill>
                           <a:srgbClr val="000000"/>
                         </a:solidFill>
@@ -12605,12 +12827,12 @@
                     <a:p>
                       <a:pPr algn="l" rtl="0" fontAlgn="ctr"/>
                       <a:r>
-                        <a:rPr lang="en-US" sz="1600" u="none" strike="noStrike">
+                        <a:rPr lang="en-US" sz="1600" u="none" strike="noStrike" dirty="0">
                           <a:effectLst/>
                         </a:rPr>
                         <a:t>MARSI</a:t>
                       </a:r>
-                      <a:endParaRPr lang="en-US" sz="1600" b="0" i="0" u="none" strike="noStrike">
+                      <a:endParaRPr lang="en-US" sz="1600" b="0" i="0" u="none" strike="noStrike" dirty="0">
                         <a:solidFill>
                           <a:srgbClr val="000000"/>
                         </a:solidFill>
@@ -12628,12 +12850,12 @@
                     <a:p>
                       <a:pPr algn="l" rtl="0" fontAlgn="ctr"/>
                       <a:r>
-                        <a:rPr lang="en-US" sz="1600" u="none" strike="noStrike">
+                        <a:rPr lang="en-US" sz="1600" u="none" strike="noStrike" dirty="0">
                           <a:effectLst/>
                         </a:rPr>
                         <a:t>Upper Boundary</a:t>
                       </a:r>
-                      <a:endParaRPr lang="en-US" sz="1600" b="0" i="0" u="none" strike="noStrike">
+                      <a:endParaRPr lang="en-US" sz="1600" b="0" i="0" u="none" strike="noStrike" dirty="0">
                         <a:solidFill>
                           <a:srgbClr val="000000"/>
                         </a:solidFill>
@@ -12651,12 +12873,12 @@
                     <a:p>
                       <a:pPr algn="ctr" fontAlgn="ctr"/>
                       <a:r>
-                        <a:rPr lang="en-US" sz="1600" u="none" strike="noStrike">
+                        <a:rPr lang="en-US" sz="1600" u="none" strike="noStrike" dirty="0">
                           <a:effectLst/>
                         </a:rPr>
                         <a:t>60</a:t>
                       </a:r>
-                      <a:endParaRPr lang="en-US" sz="1600" b="0" i="0" u="none" strike="noStrike">
+                      <a:endParaRPr lang="en-US" sz="1600" b="0" i="0" u="none" strike="noStrike" dirty="0">
                         <a:solidFill>
                           <a:srgbClr val="000000"/>
                         </a:solidFill>
@@ -12674,12 +12896,12 @@
                     <a:p>
                       <a:pPr algn="ctr" fontAlgn="ctr"/>
                       <a:r>
-                        <a:rPr lang="en-US" sz="1600" u="none" strike="noStrike">
+                        <a:rPr lang="en-US" sz="1600" u="none" strike="noStrike" dirty="0">
                           <a:effectLst/>
                         </a:rPr>
                         <a:t>90</a:t>
                       </a:r>
-                      <a:endParaRPr lang="en-US" sz="1600" b="0" i="0" u="none" strike="noStrike">
+                      <a:endParaRPr lang="en-US" sz="1600" b="0" i="0" u="none" strike="noStrike" dirty="0">
                         <a:solidFill>
                           <a:srgbClr val="000000"/>
                         </a:solidFill>
@@ -12722,12 +12944,12 @@
                     <a:p>
                       <a:pPr algn="l" fontAlgn="t"/>
                       <a:r>
-                        <a:rPr lang="en-US" sz="1600" u="none" strike="noStrike">
+                        <a:rPr lang="en-US" sz="1600" u="none" strike="noStrike" dirty="0">
                           <a:effectLst/>
                         </a:rPr>
                         <a:t>MARSI</a:t>
                       </a:r>
-                      <a:endParaRPr lang="en-US" sz="1600" b="0" i="0" u="none" strike="noStrike">
+                      <a:endParaRPr lang="en-US" sz="1600" b="0" i="0" u="none" strike="noStrike" dirty="0">
                         <a:solidFill>
                           <a:srgbClr val="000000"/>
                         </a:solidFill>
@@ -12745,12 +12967,12 @@
                     <a:p>
                       <a:pPr algn="l" fontAlgn="t"/>
                       <a:r>
-                        <a:rPr lang="en-US" sz="1600" u="none" strike="noStrike">
+                        <a:rPr lang="en-US" sz="1600" u="none" strike="noStrike" dirty="0">
                           <a:effectLst/>
                         </a:rPr>
                         <a:t>Average Lookback</a:t>
                       </a:r>
-                      <a:endParaRPr lang="en-US" sz="1600" b="0" i="0" u="none" strike="noStrike">
+                      <a:endParaRPr lang="en-US" sz="1600" b="0" i="0" u="none" strike="noStrike" dirty="0">
                         <a:solidFill>
                           <a:srgbClr val="000000"/>
                         </a:solidFill>
@@ -12768,12 +12990,12 @@
                     <a:p>
                       <a:pPr algn="ctr" fontAlgn="ctr"/>
                       <a:r>
-                        <a:rPr lang="en-US" sz="1600" u="none" strike="noStrike">
+                        <a:rPr lang="en-US" sz="1600" u="none" strike="noStrike" dirty="0">
                           <a:effectLst/>
                         </a:rPr>
                         <a:t>1</a:t>
                       </a:r>
-                      <a:endParaRPr lang="en-US" sz="1600" b="0" i="0" u="none" strike="noStrike">
+                      <a:endParaRPr lang="en-US" sz="1600" b="0" i="0" u="none" strike="noStrike" dirty="0">
                         <a:solidFill>
                           <a:srgbClr val="000000"/>
                         </a:solidFill>
@@ -12791,12 +13013,12 @@
                     <a:p>
                       <a:pPr algn="ctr" fontAlgn="ctr"/>
                       <a:r>
-                        <a:rPr lang="en-US" sz="1600" u="none" strike="noStrike">
+                        <a:rPr lang="en-US" sz="1600" u="none" strike="noStrike" dirty="0">
                           <a:effectLst/>
                         </a:rPr>
                         <a:t>100</a:t>
                       </a:r>
-                      <a:endParaRPr lang="en-US" sz="1600" b="0" i="0" u="none" strike="noStrike">
+                      <a:endParaRPr lang="en-US" sz="1600" b="0" i="0" u="none" strike="noStrike" dirty="0">
                         <a:solidFill>
                           <a:srgbClr val="000000"/>
                         </a:solidFill>
@@ -13090,12 +13312,12 @@
                     <a:p>
                       <a:pPr algn="l" rtl="0" fontAlgn="ctr"/>
                       <a:r>
-                        <a:rPr lang="en-US" sz="2000" u="none" strike="noStrike">
+                        <a:rPr lang="en-US" sz="2000" u="none" strike="noStrike" dirty="0">
                           <a:effectLst/>
                         </a:rPr>
                         <a:t>Value</a:t>
                       </a:r>
-                      <a:endParaRPr lang="en-US" sz="2000" b="1" i="0" u="none" strike="noStrike">
+                      <a:endParaRPr lang="en-US" sz="2000" b="1" i="0" u="none" strike="noStrike" dirty="0">
                         <a:solidFill>
                           <a:srgbClr val="FFFFFF"/>
                         </a:solidFill>
@@ -13115,12 +13337,12 @@
                     <a:p>
                       <a:pPr algn="l" rtl="0" fontAlgn="ctr"/>
                       <a:r>
-                        <a:rPr lang="en-US" sz="2000" u="none" strike="noStrike">
+                        <a:rPr lang="en-US" sz="2000" u="none" strike="noStrike" dirty="0">
                           <a:effectLst/>
                         </a:rPr>
                         <a:t>Number of Generations</a:t>
                       </a:r>
-                      <a:endParaRPr lang="en-US" sz="2000" b="0" i="0" u="none" strike="noStrike">
+                      <a:endParaRPr lang="en-US" sz="2000" b="0" i="0" u="none" strike="noStrike" dirty="0">
                         <a:solidFill>
                           <a:srgbClr val="000000"/>
                         </a:solidFill>
@@ -13138,12 +13360,12 @@
                     <a:p>
                       <a:pPr algn="l" rtl="0" fontAlgn="ctr"/>
                       <a:r>
-                        <a:rPr lang="en-US" sz="2000" u="none" strike="noStrike">
+                        <a:rPr lang="en-US" sz="2000" u="none" strike="noStrike" dirty="0">
                           <a:effectLst/>
                         </a:rPr>
                         <a:t>200</a:t>
                       </a:r>
-                      <a:endParaRPr lang="en-US" sz="2000" b="0" i="0" u="none" strike="noStrike">
+                      <a:endParaRPr lang="en-US" sz="2000" b="0" i="0" u="none" strike="noStrike" dirty="0">
                         <a:solidFill>
                           <a:srgbClr val="000000"/>
                         </a:solidFill>
@@ -13277,12 +13499,12 @@
                     <a:p>
                       <a:pPr algn="l" rtl="0" fontAlgn="ctr"/>
                       <a:r>
-                        <a:rPr lang="en-US" sz="2000" u="none" strike="noStrike">
+                        <a:rPr lang="en-US" sz="2000" u="none" strike="noStrike" dirty="0">
                           <a:effectLst/>
                         </a:rPr>
                         <a:t>Real Crossover Probability</a:t>
                       </a:r>
-                      <a:endParaRPr lang="en-US" sz="2000" b="0" i="0" u="none" strike="noStrike">
+                      <a:endParaRPr lang="en-US" sz="2000" b="0" i="0" u="none" strike="noStrike" dirty="0">
                         <a:solidFill>
                           <a:srgbClr val="000000"/>
                         </a:solidFill>
@@ -13300,12 +13522,12 @@
                     <a:p>
                       <a:pPr algn="l" rtl="0" fontAlgn="ctr"/>
                       <a:r>
-                        <a:rPr lang="en-US" sz="2000" u="none" strike="noStrike">
+                        <a:rPr lang="en-US" sz="2000" u="none" strike="noStrike" dirty="0">
                           <a:effectLst/>
                         </a:rPr>
                         <a:t>0.80</a:t>
                       </a:r>
-                      <a:endParaRPr lang="en-US" sz="2000" b="0" i="0" u="none" strike="noStrike">
+                      <a:endParaRPr lang="en-US" sz="2000" b="0" i="0" u="none" strike="noStrike" dirty="0">
                         <a:solidFill>
                           <a:srgbClr val="000000"/>
                         </a:solidFill>
@@ -13325,12 +13547,12 @@
                     <a:p>
                       <a:pPr algn="l" rtl="0" fontAlgn="ctr"/>
                       <a:r>
-                        <a:rPr lang="en-US" sz="2000" u="none" strike="noStrike">
+                        <a:rPr lang="en-US" sz="2000" u="none" strike="noStrike" dirty="0">
                           <a:effectLst/>
                         </a:rPr>
                         <a:t>Real Mutation Probability </a:t>
                       </a:r>
-                      <a:endParaRPr lang="en-US" sz="2000" b="0" i="0" u="none" strike="noStrike">
+                      <a:endParaRPr lang="en-US" sz="2000" b="0" i="0" u="none" strike="noStrike" dirty="0">
                         <a:solidFill>
                           <a:srgbClr val="000000"/>
                         </a:solidFill>
@@ -14683,12 +14905,12 @@
                     <a:p>
                       <a:pPr algn="l" rtl="0" fontAlgn="ctr"/>
                       <a:r>
-                        <a:rPr lang="en-US" sz="1600" u="none" strike="noStrike">
+                        <a:rPr lang="en-US" sz="1600" u="none" strike="noStrike" dirty="0">
                           <a:effectLst/>
                         </a:rPr>
                         <a:t>Sharpe Ratio</a:t>
                       </a:r>
-                      <a:endParaRPr lang="en-US" sz="1600" b="0" i="0" u="none" strike="noStrike">
+                      <a:endParaRPr lang="en-US" sz="1600" b="0" i="0" u="none" strike="noStrike" dirty="0">
                         <a:solidFill>
                           <a:srgbClr val="000000"/>
                         </a:solidFill>
@@ -15138,7 +15360,7 @@
           <p:nvPr>
             <p:extLst>
               <p:ext uri="{D42A27DB-BD31-4B8C-83A1-F6EECF244321}">
-                <p14:modId xmlns:p14="http://schemas.microsoft.com/office/powerpoint/2010/main" val="3978625938"/>
+                <p14:modId xmlns:p14="http://schemas.microsoft.com/office/powerpoint/2010/main" val="566744318"/>
               </p:ext>
             </p:extLst>
           </p:nvPr>
@@ -15309,12 +15531,12 @@
                     <a:p>
                       <a:pPr algn="l" rtl="0" fontAlgn="ctr"/>
                       <a:r>
-                        <a:rPr lang="en-US" sz="1600" u="none" strike="noStrike">
+                        <a:rPr lang="en-US" sz="1600" u="none" strike="noStrike" dirty="0">
                           <a:effectLst/>
                         </a:rPr>
                         <a:t>DEMAC</a:t>
                       </a:r>
-                      <a:endParaRPr lang="en-US" sz="1600" b="0" i="0" u="none" strike="noStrike">
+                      <a:endParaRPr lang="en-US" sz="1600" b="0" i="0" u="none" strike="noStrike" dirty="0">
                         <a:solidFill>
                           <a:srgbClr val="000000"/>
                         </a:solidFill>
@@ -15332,35 +15554,12 @@
                     <a:p>
                       <a:pPr algn="l" rtl="0" fontAlgn="ctr"/>
                       <a:r>
-                        <a:rPr lang="en-US" sz="1600" u="none" strike="noStrike">
+                        <a:rPr lang="en-US" sz="1600" u="none" strike="noStrike" dirty="0">
                           <a:effectLst/>
                         </a:rPr>
                         <a:t>Short Lookback</a:t>
                       </a:r>
-                      <a:endParaRPr lang="en-US" sz="1600" b="0" i="0" u="none" strike="noStrike">
-                        <a:solidFill>
-                          <a:srgbClr val="000000"/>
-                        </a:solidFill>
-                        <a:effectLst/>
-                        <a:latin typeface="Calibri" panose="020F0502020204030204" pitchFamily="34" charset="0"/>
-                      </a:endParaRPr>
-                    </a:p>
-                  </a:txBody>
-                  <a:tcPr marL="6044" marR="6044" marT="6044" marB="0" anchor="ctr"/>
-                </a:tc>
-                <a:tc>
-                  <a:txBody>
-                    <a:bodyPr/>
-                    <a:lstStyle/>
-                    <a:p>
-                      <a:pPr algn="ctr" fontAlgn="ctr"/>
-                      <a:r>
-                        <a:rPr lang="en-US" sz="1600" u="none" strike="noStrike">
-                          <a:effectLst/>
-                        </a:rPr>
-                        <a:t>20</a:t>
-                      </a:r>
-                      <a:endParaRPr lang="en-US" sz="1600" b="0" i="0" u="none" strike="noStrike">
+                      <a:endParaRPr lang="en-US" sz="1600" b="0" i="0" u="none" strike="noStrike" dirty="0">
                         <a:solidFill>
                           <a:srgbClr val="000000"/>
                         </a:solidFill>
@@ -15381,8 +15580,25 @@
                         <a:rPr lang="en-US" sz="1600" u="none" strike="noStrike" dirty="0">
                           <a:effectLst/>
                         </a:rPr>
-                        <a:t> </a:t>
+                        <a:t>20</a:t>
                       </a:r>
+                      <a:endParaRPr lang="en-US" sz="1600" b="0" i="0" u="none" strike="noStrike" dirty="0">
+                        <a:solidFill>
+                          <a:srgbClr val="000000"/>
+                        </a:solidFill>
+                        <a:effectLst/>
+                        <a:latin typeface="Calibri" panose="020F0502020204030204" pitchFamily="34" charset="0"/>
+                      </a:endParaRPr>
+                    </a:p>
+                  </a:txBody>
+                  <a:tcPr marL="6044" marR="6044" marT="6044" marB="0" anchor="ctr"/>
+                </a:tc>
+                <a:tc>
+                  <a:txBody>
+                    <a:bodyPr/>
+                    <a:lstStyle/>
+                    <a:p>
+                      <a:pPr algn="ctr" fontAlgn="ctr"/>
                       <a:r>
                         <a:rPr lang="en-US" sz="1600" u="none" strike="noStrike" dirty="0" smtClean="0">
                           <a:effectLst/>
@@ -17101,7 +17317,7 @@
           <p:nvPr>
             <p:extLst>
               <p:ext uri="{D42A27DB-BD31-4B8C-83A1-F6EECF244321}">
-                <p14:modId xmlns:p14="http://schemas.microsoft.com/office/powerpoint/2010/main" val="1948711349"/>
+                <p14:modId xmlns:p14="http://schemas.microsoft.com/office/powerpoint/2010/main" val="596864681"/>
               </p:ext>
             </p:extLst>
           </p:nvPr>
@@ -17194,12 +17410,12 @@
                     <a:p>
                       <a:pPr algn="l" fontAlgn="b"/>
                       <a:r>
-                        <a:rPr lang="en-US" sz="1800" u="none" strike="noStrike">
+                        <a:rPr lang="en-US" sz="1800" u="none" strike="noStrike" dirty="0">
                           <a:effectLst/>
                         </a:rPr>
                         <a:t>Maximum</a:t>
                       </a:r>
-                      <a:endParaRPr lang="en-US" sz="1800" b="0" i="0" u="none" strike="noStrike">
+                      <a:endParaRPr lang="en-US" sz="1800" b="0" i="0" u="none" strike="noStrike" dirty="0">
                         <a:solidFill>
                           <a:srgbClr val="000000"/>
                         </a:solidFill>
@@ -17242,56 +17458,10 @@
                     <a:p>
                       <a:pPr algn="l" fontAlgn="b"/>
                       <a:r>
-                        <a:rPr lang="en-US" sz="1800" u="none" strike="noStrike">
-                          <a:effectLst/>
-                        </a:rPr>
-                        <a:t>Annual Return</a:t>
-                      </a:r>
-                      <a:endParaRPr lang="en-US" sz="1800" b="0" i="0" u="none" strike="noStrike">
-                        <a:solidFill>
-                          <a:srgbClr val="000000"/>
-                        </a:solidFill>
-                        <a:effectLst/>
-                        <a:latin typeface="Calibri" panose="020F0502020204030204" pitchFamily="34" charset="0"/>
-                      </a:endParaRPr>
-                    </a:p>
-                  </a:txBody>
-                  <a:tcPr marL="7620" marR="7620" marT="7620" marB="0" anchor="b"/>
-                </a:tc>
-                <a:tc>
-                  <a:txBody>
-                    <a:bodyPr/>
-                    <a:lstStyle/>
-                    <a:p>
-                      <a:pPr algn="l" fontAlgn="b"/>
-                      <a:r>
-                        <a:rPr lang="en-US" sz="1800" u="none" strike="noStrike">
-                          <a:effectLst/>
-                        </a:rPr>
-                        <a:t> 12.4389%</a:t>
-                      </a:r>
-                      <a:endParaRPr lang="en-US" sz="1800" b="0" i="0" u="none" strike="noStrike">
-                        <a:solidFill>
-                          <a:srgbClr val="000000"/>
-                        </a:solidFill>
-                        <a:effectLst/>
-                        <a:latin typeface="Calibri" panose="020F0502020204030204" pitchFamily="34" charset="0"/>
-                      </a:endParaRPr>
-                    </a:p>
-                  </a:txBody>
-                  <a:tcPr marL="7620" marR="7620" marT="7620" marB="0" anchor="b"/>
-                </a:tc>
-                <a:tc>
-                  <a:txBody>
-                    <a:bodyPr/>
-                    <a:lstStyle/>
-                    <a:p>
-                      <a:pPr algn="r" fontAlgn="b"/>
-                      <a:r>
                         <a:rPr lang="en-US" sz="1800" u="none" strike="noStrike" dirty="0">
                           <a:effectLst/>
                         </a:rPr>
-                        <a:t>0.008436</a:t>
+                        <a:t>Annual Return</a:t>
                       </a:r>
                       <a:endParaRPr lang="en-US" sz="1800" b="0" i="0" u="none" strike="noStrike" dirty="0">
                         <a:solidFill>
@@ -17309,12 +17479,12 @@
                     <a:bodyPr/>
                     <a:lstStyle/>
                     <a:p>
-                      <a:pPr algn="r" fontAlgn="b"/>
+                      <a:pPr algn="ctr" fontAlgn="b"/>
                       <a:r>
                         <a:rPr lang="en-US" sz="1800" u="none" strike="noStrike" dirty="0">
                           <a:effectLst/>
                         </a:rPr>
-                        <a:t>0.318321</a:t>
+                        <a:t> 12.4389%</a:t>
                       </a:r>
                       <a:endParaRPr lang="en-US" sz="1800" b="0" i="0" u="none" strike="noStrike" dirty="0">
                         <a:solidFill>
@@ -17332,20 +17502,81 @@
                     <a:bodyPr/>
                     <a:lstStyle/>
                     <a:p>
-                      <a:pPr algn="r" fontAlgn="b"/>
+                      <a:pPr algn="ctr" rtl="0" fontAlgn="ctr"/>
                       <a:r>
-                        <a:rPr lang="en-US" sz="1800" u="none" strike="noStrike" dirty="0">
+                        <a:rPr lang="en-US" sz="1800" u="none" strike="noStrike" kern="1200" dirty="0" smtClean="0">
+                          <a:solidFill>
+                            <a:schemeClr val="dk1"/>
+                          </a:solidFill>
                           <a:effectLst/>
+                          <a:latin typeface="+mn-lt"/>
+                          <a:ea typeface="+mn-ea"/>
+                          <a:cs typeface="+mn-cs"/>
+                        </a:rPr>
+                        <a:t>0.8436%</a:t>
+                      </a:r>
+                      <a:endParaRPr lang="en-US" sz="1800" u="none" strike="noStrike" kern="1200" dirty="0">
+                        <a:solidFill>
+                          <a:schemeClr val="dk1"/>
+                        </a:solidFill>
+                        <a:effectLst/>
+                        <a:latin typeface="+mn-lt"/>
+                        <a:ea typeface="+mn-ea"/>
+                        <a:cs typeface="+mn-cs"/>
+                      </a:endParaRPr>
+                    </a:p>
+                  </a:txBody>
+                  <a:tcPr marL="7620" marR="7620" marT="7620" marB="0" anchor="b"/>
+                </a:tc>
+                <a:tc>
+                  <a:txBody>
+                    <a:bodyPr/>
+                    <a:lstStyle/>
+                    <a:p>
+                      <a:pPr algn="ctr" rtl="0" fontAlgn="ctr"/>
+                      <a:r>
+                        <a:rPr lang="en-US" sz="1800" u="none" strike="noStrike" kern="1200" dirty="0" smtClean="0">
+                          <a:solidFill>
+                            <a:schemeClr val="dk1"/>
+                          </a:solidFill>
+                          <a:effectLst/>
+                          <a:latin typeface="+mn-lt"/>
+                          <a:ea typeface="+mn-ea"/>
+                          <a:cs typeface="+mn-cs"/>
+                        </a:rPr>
+                        <a:t>31.8321%</a:t>
+                      </a:r>
+                      <a:endParaRPr lang="en-US" sz="1800" u="none" strike="noStrike" kern="1200" dirty="0">
+                        <a:solidFill>
+                          <a:schemeClr val="dk1"/>
+                        </a:solidFill>
+                        <a:effectLst/>
+                        <a:latin typeface="+mn-lt"/>
+                        <a:ea typeface="+mn-ea"/>
+                        <a:cs typeface="+mn-cs"/>
+                      </a:endParaRPr>
+                    </a:p>
+                  </a:txBody>
+                  <a:tcPr marL="7620" marR="7620" marT="7620" marB="0" anchor="b"/>
+                </a:tc>
+                <a:tc>
+                  <a:txBody>
+                    <a:bodyPr/>
+                    <a:lstStyle/>
+                    <a:p>
+                      <a:pPr algn="ctr" fontAlgn="b"/>
+                      <a:r>
+                        <a:rPr lang="en-US" sz="1800" u="none" strike="noStrike" kern="1200" dirty="0">
+                          <a:solidFill>
+                            <a:schemeClr val="dk1"/>
+                          </a:solidFill>
+                          <a:effectLst/>
+                          <a:latin typeface="+mn-lt"/>
+                          <a:ea typeface="+mn-ea"/>
+                          <a:cs typeface="+mn-cs"/>
                         </a:rPr>
                         <a:t>59.12%</a:t>
                       </a:r>
-                      <a:endParaRPr lang="en-US" sz="1800" b="0" i="0" u="none" strike="noStrike" dirty="0">
-                        <a:solidFill>
-                          <a:srgbClr val="000000"/>
-                        </a:solidFill>
-                        <a:effectLst/>
-                        <a:latin typeface="Calibri" panose="020F0502020204030204" pitchFamily="34" charset="0"/>
-                      </a:endParaRPr>
                     </a:p>
                   </a:txBody>
                   <a:tcPr marL="7620" marR="7620" marT="7620" marB="0" anchor="b"/>
@@ -17359,12 +17590,12 @@
                     <a:p>
                       <a:pPr algn="l" fontAlgn="b"/>
                       <a:r>
-                        <a:rPr lang="en-US" sz="1800" u="none" strike="noStrike">
+                        <a:rPr lang="en-US" sz="1800" u="none" strike="noStrike" dirty="0">
                           <a:effectLst/>
                         </a:rPr>
                         <a:t>Sharpe Ratio</a:t>
                       </a:r>
-                      <a:endParaRPr lang="en-US" sz="1800" b="0" i="0" u="none" strike="noStrike">
+                      <a:endParaRPr lang="en-US" sz="1800" b="0" i="0" u="none" strike="noStrike" dirty="0">
                         <a:solidFill>
                           <a:srgbClr val="000000"/>
                         </a:solidFill>
@@ -17380,14 +17611,14 @@
                     <a:bodyPr/>
                     <a:lstStyle/>
                     <a:p>
-                      <a:pPr algn="l" fontAlgn="b"/>
+                      <a:pPr algn="ctr" fontAlgn="b"/>
                       <a:r>
-                        <a:rPr lang="en-US" sz="1800" u="none" strike="noStrike">
+                        <a:rPr lang="en-US" sz="1800" u="none" strike="noStrike" dirty="0">
                           <a:effectLst/>
                         </a:rPr>
                         <a:t> 1.3536</a:t>
                       </a:r>
-                      <a:endParaRPr lang="en-US" sz="1800" b="0" i="0" u="none" strike="noStrike">
+                      <a:endParaRPr lang="en-US" sz="1800" b="0" i="0" u="none" strike="noStrike" dirty="0">
                         <a:solidFill>
                           <a:srgbClr val="000000"/>
                         </a:solidFill>
@@ -17403,14 +17634,14 @@
                     <a:bodyPr/>
                     <a:lstStyle/>
                     <a:p>
-                      <a:pPr algn="r" fontAlgn="b"/>
+                      <a:pPr algn="ctr" fontAlgn="b"/>
                       <a:r>
-                        <a:rPr lang="en-US" sz="1800" u="none" strike="noStrike">
+                        <a:rPr lang="en-US" sz="1800" u="none" strike="noStrike" dirty="0">
                           <a:effectLst/>
                         </a:rPr>
                         <a:t>0.6838</a:t>
                       </a:r>
-                      <a:endParaRPr lang="en-US" sz="1800" b="0" i="0" u="none" strike="noStrike">
+                      <a:endParaRPr lang="en-US" sz="1800" b="0" i="0" u="none" strike="noStrike" dirty="0">
                         <a:solidFill>
                           <a:srgbClr val="000000"/>
                         </a:solidFill>
@@ -17426,14 +17657,14 @@
                     <a:bodyPr/>
                     <a:lstStyle/>
                     <a:p>
-                      <a:pPr algn="r" fontAlgn="b"/>
+                      <a:pPr algn="ctr" fontAlgn="b"/>
                       <a:r>
-                        <a:rPr lang="en-US" sz="1800" u="none" strike="noStrike">
+                        <a:rPr lang="en-US" sz="1800" u="none" strike="noStrike" dirty="0">
                           <a:effectLst/>
                         </a:rPr>
                         <a:t>3.044</a:t>
                       </a:r>
-                      <a:endParaRPr lang="en-US" sz="1800" b="0" i="0" u="none" strike="noStrike">
+                      <a:endParaRPr lang="en-US" sz="1800" b="0" i="0" u="none" strike="noStrike" dirty="0">
                         <a:solidFill>
                           <a:srgbClr val="000000"/>
                         </a:solidFill>
@@ -17449,7 +17680,7 @@
                     <a:bodyPr/>
                     <a:lstStyle/>
                     <a:p>
-                      <a:pPr algn="r" fontAlgn="b"/>
+                      <a:pPr algn="ctr" fontAlgn="b"/>
                       <a:r>
                         <a:rPr lang="en-US" sz="1800" u="none" strike="noStrike" dirty="0">
                           <a:effectLst/>
@@ -18069,12 +18300,12 @@
                     <a:p>
                       <a:pPr algn="l" rtl="0" fontAlgn="ctr"/>
                       <a:r>
-                        <a:rPr lang="en-US" sz="1600" u="none" strike="noStrike">
+                        <a:rPr lang="en-US" sz="1600" u="none" strike="noStrike" dirty="0">
                           <a:effectLst/>
                         </a:rPr>
                         <a:t>Sharpe Ratio</a:t>
                       </a:r>
-                      <a:endParaRPr lang="en-US" sz="1600" b="0" i="0" u="none" strike="noStrike">
+                      <a:endParaRPr lang="en-US" sz="1600" b="0" i="0" u="none" strike="noStrike" dirty="0">
                         <a:solidFill>
                           <a:srgbClr val="000000"/>
                         </a:solidFill>
@@ -18501,11 +18732,11 @@
             </a:r>
             <a:r>
               <a:rPr lang="en" sz="1800" dirty="0"/>
-              <a:t>on the values of the </a:t>
+              <a:t>on </a:t>
             </a:r>
             <a:r>
               <a:rPr lang="en" sz="1800" dirty="0" smtClean="0"/>
-              <a:t>dataset</a:t>
+              <a:t>the dataset</a:t>
             </a:r>
           </a:p>
           <a:p>
@@ -18571,8 +18802,13 @@
             </a:r>
             <a:r>
               <a:rPr lang="en" sz="1800" dirty="0" smtClean="0"/>
-              <a:t>of integer values using real-valued paramters</a:t>
-            </a:r>
+              <a:t>of integer values using real-valued </a:t>
+            </a:r>
+            <a:r>
+              <a:rPr lang="en" sz="1800" dirty="0" smtClean="0"/>
+              <a:t>parameters</a:t>
+            </a:r>
+            <a:endParaRPr lang="en" sz="1800" dirty="0" smtClean="0"/>
           </a:p>
           <a:p>
             <a:pPr marL="857250" lvl="1" indent="-228600">
@@ -18773,6 +19009,13 @@
   <p:clrMapOvr>
     <a:masterClrMapping/>
   </p:clrMapOvr>
+  <p:timing>
+    <p:tnLst>
+      <p:par>
+        <p:cTn id="1" dur="indefinite" restart="never" nodeType="tmRoot"/>
+      </p:par>
+    </p:tnLst>
+  </p:timing>
 </p:sld>
 </file>
 
@@ -18868,8 +19111,42 @@
             </a:pPr>
             <a:r>
               <a:rPr lang="en" sz="2000" dirty="0" smtClean="0"/>
-              <a:t>TODO</a:t>
-            </a:r>
+              <a:t>Findings from the data:</a:t>
+            </a:r>
+            <a:endParaRPr lang="en" sz="2000" dirty="0" smtClean="0"/>
+          </a:p>
+          <a:p>
+            <a:pPr marL="857250" lvl="1" indent="-228600">
+              <a:spcAft>
+                <a:spcPts val="800"/>
+              </a:spcAft>
+              <a:buChar char="●"/>
+            </a:pPr>
+            <a:r>
+              <a:rPr lang="en" sz="1800" dirty="0" smtClean="0"/>
+              <a:t>Search space for the problem is highly irregular</a:t>
+            </a:r>
+          </a:p>
+          <a:p>
+            <a:pPr marL="857250" lvl="1" indent="-228600">
+              <a:spcAft>
+                <a:spcPts val="800"/>
+              </a:spcAft>
+              <a:buChar char="●"/>
+            </a:pPr>
+            <a:r>
+              <a:rPr lang="en" sz="1800" dirty="0" smtClean="0"/>
+              <a:t>On average, many of the evolved parameters are different from the standard values used</a:t>
+            </a:r>
+          </a:p>
+          <a:p>
+            <a:pPr marL="857250" lvl="1" indent="-228600">
+              <a:spcAft>
+                <a:spcPts val="800"/>
+              </a:spcAft>
+              <a:buChar char="●"/>
+            </a:pPr>
+            <a:endParaRPr lang="en" sz="1800" dirty="0" smtClean="0"/>
           </a:p>
           <a:p>
             <a:pPr marL="457200" lvl="0" indent="-228600" rtl="0">
@@ -18881,7 +19158,35 @@
               </a:spcAft>
               <a:buChar char="●"/>
             </a:pPr>
-            <a:endParaRPr lang="en" sz="2000" dirty="0"/>
+            <a:r>
+              <a:rPr lang="en" sz="2000" dirty="0" smtClean="0"/>
+              <a:t>General GA conclusions:</a:t>
+            </a:r>
+          </a:p>
+          <a:p>
+            <a:pPr marL="857250" lvl="1" indent="-228600">
+              <a:spcAft>
+                <a:spcPts val="800"/>
+              </a:spcAft>
+              <a:buChar char="●"/>
+            </a:pPr>
+            <a:r>
+              <a:rPr lang="en" sz="1800" dirty="0" smtClean="0"/>
+              <a:t>Multi-objective optimization methods are able to provide alternative solutions not offered by classical financial strategies</a:t>
+            </a:r>
+          </a:p>
+          <a:p>
+            <a:pPr marL="857250" lvl="1" indent="-228600">
+              <a:spcAft>
+                <a:spcPts val="800"/>
+              </a:spcAft>
+              <a:buChar char="●"/>
+            </a:pPr>
+            <a:r>
+              <a:rPr lang="en" sz="1800" dirty="0" smtClean="0"/>
+              <a:t>Many-objective optimization for this application is hard</a:t>
+            </a:r>
+            <a:endParaRPr lang="en" sz="1800" dirty="0"/>
           </a:p>
         </p:txBody>
       </p:sp>
@@ -19074,20 +19379,21 @@
             </a:pPr>
             <a:r>
               <a:rPr lang="en" sz="2000" dirty="0" smtClean="0"/>
-              <a:t>Run with the GA on a second dataset to determine dependence of the results on the dataset </a:t>
-            </a:r>
-          </a:p>
-          <a:p>
-            <a:pPr marL="857250" lvl="1" indent="-228600">
-              <a:spcAft>
-                <a:spcPts val="800"/>
-              </a:spcAft>
-              <a:buChar char="●"/>
-            </a:pPr>
-            <a:r>
-              <a:rPr lang="en" sz="1800" dirty="0" smtClean="0"/>
-              <a:t>Answers the question of how broadly the results can be applied</a:t>
-            </a:r>
+              <a:t>Run with the GA on a second dataset to determine </a:t>
+            </a:r>
+            <a:r>
+              <a:rPr lang="en" sz="2000" dirty="0" smtClean="0"/>
+              <a:t>sensitivity </a:t>
+            </a:r>
+            <a:r>
+              <a:rPr lang="en" sz="2000" dirty="0" smtClean="0"/>
+              <a:t>of the results </a:t>
+            </a:r>
+            <a:r>
+              <a:rPr lang="en" sz="2000" dirty="0" smtClean="0"/>
+              <a:t>to the input data</a:t>
+            </a:r>
+            <a:endParaRPr lang="en" sz="2000" dirty="0" smtClean="0"/>
           </a:p>
         </p:txBody>
       </p:sp>
@@ -19183,7 +19489,7 @@
 </file>
 
 <file path=ppt/slides/slide33.xml><?xml version="1.0" encoding="utf-8"?>
-<p:sld xmlns:a="http://schemas.openxmlformats.org/drawingml/2006/main" xmlns:r="http://schemas.openxmlformats.org/officeDocument/2006/relationships" xmlns:p="http://schemas.openxmlformats.org/presentationml/2006/main" show="0">
+<p:sld xmlns:a="http://schemas.openxmlformats.org/drawingml/2006/main" xmlns:r="http://schemas.openxmlformats.org/officeDocument/2006/relationships" xmlns:p="http://schemas.openxmlformats.org/presentationml/2006/main">
   <p:cSld>
     <p:spTree>
       <p:nvGrpSpPr>
@@ -19249,8 +19555,8 @@
         </p:nvSpPr>
         <p:spPr>
           <a:xfrm>
-            <a:off x="311701" y="1536633"/>
-            <a:ext cx="8520599" cy="4555200"/>
+            <a:off x="271061" y="1536633"/>
+            <a:ext cx="8669739" cy="4555200"/>
           </a:xfrm>
           <a:prstGeom prst="rect">
             <a:avLst/>
@@ -19276,6 +19582,51 @@
               <a:rPr lang="en" sz="2000" dirty="0"/>
               <a:t>H. Jain and K. Deb. An Evolutionary Many-Objective Optimization Algorithm Using Reference-point Based Non-dominated Sorting Approach, Part II: Handling Constraints and Extending to an Adaptive Approach. </a:t>
             </a:r>
+            <a:r>
+              <a:rPr lang="en-US" sz="2000" i="1" dirty="0" smtClean="0"/>
+              <a:t>IEEE </a:t>
+            </a:r>
+            <a:r>
+              <a:rPr lang="en-US" sz="2000" i="1" dirty="0"/>
+              <a:t>Trans. Evol. Comput</a:t>
+            </a:r>
+            <a:r>
+              <a:rPr lang="en-US" sz="2000" i="1" dirty="0" smtClean="0"/>
+              <a:t>.</a:t>
+            </a:r>
+            <a:r>
+              <a:rPr lang="en-US" sz="2000" dirty="0" smtClean="0"/>
+              <a:t>,</a:t>
+            </a:r>
+            <a:r>
+              <a:rPr lang="en-US" sz="2000" dirty="0"/>
+              <a:t> </a:t>
+            </a:r>
+            <a:r>
+              <a:rPr lang="en-US" sz="2000" dirty="0" smtClean="0"/>
+              <a:t>vol</a:t>
+            </a:r>
+            <a:r>
+              <a:rPr lang="en-US" sz="2000" dirty="0"/>
+              <a:t>. 18, </a:t>
+            </a:r>
+            <a:r>
+              <a:rPr lang="en-US" sz="2000" dirty="0" smtClean="0"/>
+              <a:t>no</a:t>
+            </a:r>
+            <a:r>
+              <a:rPr lang="en-US" sz="2000" dirty="0"/>
+              <a:t>. 4, </a:t>
+            </a:r>
+            <a:r>
+              <a:rPr lang="en-US" sz="2000" dirty="0" smtClean="0"/>
+              <a:t>pp.602-622 2014</a:t>
+            </a:r>
+            <a:r>
+              <a:rPr lang="en-US" sz="2000" dirty="0"/>
+              <a:t> </a:t>
+            </a:r>
+            <a:endParaRPr lang="en" sz="2000" dirty="0"/>
           </a:p>
           <a:p>
             <a:pPr>
@@ -19294,8 +19645,17 @@
             </a:r>
             <a:r>
               <a:rPr lang="en" sz="2000" dirty="0" smtClean="0"/>
-              <a:t>.</a:t>
-            </a:r>
+              <a:t>. </a:t>
+            </a:r>
+            <a:r>
+              <a:rPr lang="en" sz="2000" i="1" dirty="0" smtClean="0"/>
+              <a:t>2015 IEEE Congress on Evolutionary Computation.</a:t>
+            </a:r>
+            <a:r>
+              <a:rPr lang="en" sz="2000" dirty="0" smtClean="0"/>
+              <a:t>, pp.2915-2922 2015</a:t>
+            </a:r>
+            <a:endParaRPr lang="en" sz="2000" dirty="0" smtClean="0"/>
           </a:p>
           <a:p>
             <a:pPr>
@@ -19310,8 +19670,65 @@
             </a:r>
             <a:r>
               <a:rPr lang="en" sz="2000" dirty="0"/>
-              <a:t>K. Deb. An Evolutionary Many-Objective Optimization Algorithm Using Reference-point Based Non-dominated Sorting Approach, Part I: Solving Problems with Box Constraints.</a:t>
-            </a:r>
+              <a:t>K. </a:t>
+            </a:r>
+            <a:r>
+              <a:rPr lang="en" sz="2000" dirty="0" smtClean="0"/>
+              <a:t>Deb and H. Jain. </a:t>
+            </a:r>
+            <a:r>
+              <a:rPr lang="en" sz="2000" dirty="0"/>
+              <a:t>An Evolutionary Many-Objective Optimization Algorithm Using Reference-point Based Non-dominated Sorting Approach, Part I: Solving Problems with Box </a:t>
+            </a:r>
+            <a:r>
+              <a:rPr lang="en" sz="2000" dirty="0" smtClean="0"/>
+              <a:t>Constraints. </a:t>
+            </a:r>
+            <a:r>
+              <a:rPr lang="en-US" sz="2000" i="1" dirty="0" smtClean="0"/>
+              <a:t>IEEE </a:t>
+            </a:r>
+            <a:r>
+              <a:rPr lang="en-US" sz="2000" i="1" dirty="0"/>
+              <a:t>Trans. Evol. Comput.</a:t>
+            </a:r>
+            <a:r>
+              <a:rPr lang="en-US" sz="2000" dirty="0"/>
+              <a:t>, </a:t>
+            </a:r>
+            <a:r>
+              <a:rPr lang="en-US" sz="2000" dirty="0" smtClean="0"/>
+              <a:t>vol</a:t>
+            </a:r>
+            <a:r>
+              <a:rPr lang="en-US" sz="2000" dirty="0"/>
+              <a:t>. </a:t>
+            </a:r>
+            <a:r>
+              <a:rPr lang="en-US" sz="2000" dirty="0" smtClean="0"/>
+              <a:t>18,</a:t>
+            </a:r>
+            <a:r>
+              <a:rPr lang="en-US" sz="2000" dirty="0"/>
+              <a:t> </a:t>
+            </a:r>
+            <a:r>
+              <a:rPr lang="en-US" sz="2000" dirty="0" smtClean="0"/>
+              <a:t>no</a:t>
+            </a:r>
+            <a:r>
+              <a:rPr lang="en-US" sz="2000" dirty="0"/>
+              <a:t>. 4,  </a:t>
+            </a:r>
+            <a:r>
+              <a:rPr lang="en-US" sz="2000" dirty="0" smtClean="0"/>
+              <a:t>pp.577-601 </a:t>
+            </a:r>
+            <a:r>
+              <a:rPr lang="en-US" sz="2000" dirty="0"/>
+              <a:t>2014</a:t>
+            </a:r>
+            <a:endParaRPr lang="en" sz="2000" dirty="0"/>
           </a:p>
           <a:p>
             <a:pPr rtl="0">
@@ -19346,7 +19763,7 @@
 </file>
 
 <file path=ppt/slides/slide34.xml><?xml version="1.0" encoding="utf-8"?>
-<p:sld xmlns:a="http://schemas.openxmlformats.org/drawingml/2006/main" xmlns:r="http://schemas.openxmlformats.org/officeDocument/2006/relationships" xmlns:p="http://schemas.openxmlformats.org/presentationml/2006/main" show="0">
+<p:sld xmlns:a="http://schemas.openxmlformats.org/drawingml/2006/main" xmlns:r="http://schemas.openxmlformats.org/officeDocument/2006/relationships" xmlns:p="http://schemas.openxmlformats.org/presentationml/2006/main">
   <p:cSld>
     <p:spTree>
       <p:nvGrpSpPr>
@@ -19433,12 +19850,49 @@
             </a:pPr>
             <a:r>
               <a:rPr lang="en" sz="2000" dirty="0"/>
-              <a:t>[4] K. Deb. A Fast and Elitist, Multiobjective Genetic Algorithm: NSGA-II</a:t>
+              <a:t>[4] K. </a:t>
             </a:r>
             <a:r>
               <a:rPr lang="en" sz="2000" dirty="0" smtClean="0"/>
-              <a:t>.</a:t>
-            </a:r>
+              <a:t>Deb, A. Pratap, S. Agarwal, and T. Meyarivan. </a:t>
+            </a:r>
+            <a:r>
+              <a:rPr lang="en" sz="2000" dirty="0"/>
+              <a:t>A Fast and Elitist, Multiobjective Genetic Algorithm: NSGA-II</a:t>
+            </a:r>
+            <a:r>
+              <a:rPr lang="en" sz="2000" dirty="0" smtClean="0"/>
+              <a:t>. </a:t>
+            </a:r>
+            <a:r>
+              <a:rPr lang="en-US" sz="2000" i="1" dirty="0"/>
+              <a:t>IEEE Trans. Evol. Comput.</a:t>
+            </a:r>
+            <a:r>
+              <a:rPr lang="en-US" sz="2000" dirty="0"/>
+              <a:t>, vol. 6</a:t>
+            </a:r>
+            <a:r>
+              <a:rPr lang="en-US" sz="2000" dirty="0" smtClean="0"/>
+              <a:t>,</a:t>
+            </a:r>
+            <a:r>
+              <a:rPr lang="en-US" sz="2000" dirty="0"/>
+              <a:t> no. </a:t>
+            </a:r>
+            <a:r>
+              <a:rPr lang="en-US" sz="2000" dirty="0" smtClean="0"/>
+              <a:t>2,</a:t>
+            </a:r>
+            <a:r>
+              <a:rPr lang="en-US" sz="2000" dirty="0"/>
+              <a:t> </a:t>
+            </a:r>
+            <a:r>
+              <a:rPr lang="en-US" sz="2000" dirty="0" smtClean="0"/>
+              <a:t>pp.182-197 2002</a:t>
+            </a:r>
+            <a:endParaRPr lang="en" sz="2000" dirty="0" smtClean="0"/>
           </a:p>
           <a:p>
             <a:pPr>
@@ -19465,8 +19919,24 @@
             </a:r>
             <a:r>
               <a:rPr lang="en" sz="2000" dirty="0" smtClean="0"/>
-              <a:t>.</a:t>
-            </a:r>
+              <a:t>. </a:t>
+            </a:r>
+            <a:r>
+              <a:rPr lang="en" sz="2000" i="1" dirty="0" smtClean="0"/>
+              <a:t>International Journal of Computer Applications</a:t>
+            </a:r>
+            <a:r>
+              <a:rPr lang="en" sz="2000" dirty="0" smtClean="0"/>
+              <a:t>., vol. 68, no. 20, </a:t>
+            </a:r>
+            <a:br>
+              <a:rPr lang="en" sz="2000" dirty="0" smtClean="0"/>
+            </a:br>
+            <a:r>
+              <a:rPr lang="en" sz="2000" dirty="0" smtClean="0"/>
+              <a:t>pp.41-48 2013</a:t>
+            </a:r>
+            <a:endParaRPr lang="en" sz="2000" dirty="0" smtClean="0"/>
           </a:p>
           <a:p>
             <a:pPr>
@@ -19483,6 +19953,15 @@
               <a:rPr lang="en" sz="2000" dirty="0"/>
               <a:t>N. Srinivas and K. Deb. Multiobjective Optimization Using Nondominated Sorting in Genetic Algorithms. </a:t>
             </a:r>
+            <a:r>
+              <a:rPr lang="en" sz="2000" i="1" dirty="0" smtClean="0"/>
+              <a:t>Evolutionary Computation.</a:t>
+            </a:r>
+            <a:r>
+              <a:rPr lang="en" sz="2000" dirty="0" smtClean="0"/>
+              <a:t>, vol. 2, no. 3, pp.221-248 1994</a:t>
+            </a:r>
+            <a:endParaRPr lang="en" sz="2000" dirty="0"/>
           </a:p>
           <a:p>
             <a:pPr>
@@ -19714,6 +20193,13 @@
   <p:clrMapOvr>
     <a:masterClrMapping/>
   </p:clrMapOvr>
+  <p:timing>
+    <p:tnLst>
+      <p:par>
+        <p:cTn id="1" dur="indefinite" restart="never" nodeType="tmRoot"/>
+      </p:par>
+    </p:tnLst>
+  </p:timing>
 </p:sld>
 </file>
 

</xml_diff>